<commit_message>
Updated lesson #8 presentation
</commit_message>
<xml_diff>
--- a/Presentation/lesson-08.pptx
+++ b/Presentation/lesson-08.pptx
@@ -12004,6 +12004,16 @@
               <a:rPr lang="en-US" dirty="0" smtClean="0"/>
               <a:t>]</a:t>
             </a:r>
+          </a:p>
+          <a:p>
+            <a:r>
+              <a:rPr lang="en-US" dirty="0" smtClean="0"/>
+              <a:t>Foreground/Background </a:t>
+            </a:r>
+            <a:r>
+              <a:rPr lang="ru-RU" dirty="0" smtClean="0"/>
+              <a:t>потоки</a:t>
+            </a:r>
             <a:endParaRPr lang="ru-RU" dirty="0"/>
           </a:p>
         </p:txBody>

</xml_diff>

<commit_message>
Added info about inter-process communication
</commit_message>
<xml_diff>
--- a/Presentation/lesson-08.pptx
+++ b/Presentation/lesson-08.pptx
@@ -5,7 +5,7 @@
     <p:sldMasterId id="2147483648" r:id="rId1"/>
   </p:sldMasterIdLst>
   <p:notesMasterIdLst>
-    <p:notesMasterId r:id="rId21"/>
+    <p:notesMasterId r:id="rId22"/>
   </p:notesMasterIdLst>
   <p:sldIdLst>
     <p:sldId id="256" r:id="rId2"/>
@@ -27,6 +27,7 @@
     <p:sldId id="272" r:id="rId18"/>
     <p:sldId id="273" r:id="rId19"/>
     <p:sldId id="274" r:id="rId20"/>
+    <p:sldId id="275" r:id="rId21"/>
   </p:sldIdLst>
   <p:sldSz cx="9144000" cy="6858000" type="screen4x3"/>
   <p:notesSz cx="6858000" cy="9144000"/>
@@ -11296,6 +11297,302 @@
 </p:sld>
 </file>
 
+<file path=ppt/slides/slide20.xml><?xml version="1.0" encoding="utf-8"?>
+<p:sld xmlns:a="http://schemas.openxmlformats.org/drawingml/2006/main" xmlns:r="http://schemas.openxmlformats.org/officeDocument/2006/relationships" xmlns:p="http://schemas.openxmlformats.org/presentationml/2006/main">
+  <p:cSld>
+    <p:spTree>
+      <p:nvGrpSpPr>
+        <p:cNvPr id="1" name=""/>
+        <p:cNvGrpSpPr/>
+        <p:nvPr/>
+      </p:nvGrpSpPr>
+      <p:grpSpPr>
+        <a:xfrm>
+          <a:off x="0" y="0"/>
+          <a:ext cx="0" cy="0"/>
+          <a:chOff x="0" y="0"/>
+          <a:chExt cx="0" cy="0"/>
+        </a:xfrm>
+      </p:grpSpPr>
+      <p:sp>
+        <p:nvSpPr>
+          <p:cNvPr id="2" name="TextBox 1"/>
+          <p:cNvSpPr txBox="1"/>
+          <p:nvPr/>
+        </p:nvSpPr>
+        <p:spPr>
+          <a:xfrm>
+            <a:off x="323528" y="764704"/>
+            <a:ext cx="8424936" cy="6001643"/>
+          </a:xfrm>
+          <a:prstGeom prst="rect">
+            <a:avLst/>
+          </a:prstGeom>
+          <a:noFill/>
+        </p:spPr>
+        <p:txBody>
+          <a:bodyPr wrap="square" rtlCol="0">
+            <a:spAutoFit/>
+          </a:bodyPr>
+          <a:lstStyle/>
+          <a:p>
+            <a:pPr marL="285750" indent="-285750">
+              <a:buFont typeface="Arial" pitchFamily="34" charset="0"/>
+              <a:buChar char="•"/>
+            </a:pPr>
+            <a:r>
+              <a:rPr lang="en-US" sz="2400" dirty="0" smtClean="0">
+                <a:solidFill>
+                  <a:srgbClr val="FFFF00"/>
+                </a:solidFill>
+              </a:rPr>
+              <a:t>.NET </a:t>
+            </a:r>
+            <a:r>
+              <a:rPr lang="en-US" sz="2400" dirty="0" err="1" smtClean="0">
+                <a:solidFill>
+                  <a:srgbClr val="FFFF00"/>
+                </a:solidFill>
+              </a:rPr>
+              <a:t>Remoting</a:t>
+            </a:r>
+            <a:endParaRPr lang="ru-RU" sz="2400" dirty="0" smtClean="0">
+              <a:solidFill>
+                <a:srgbClr val="FFFF00"/>
+              </a:solidFill>
+            </a:endParaRPr>
+          </a:p>
+          <a:p>
+            <a:pPr marL="742950" lvl="1" indent="-285750">
+              <a:buFont typeface="Arial" pitchFamily="34" charset="0"/>
+              <a:buChar char="•"/>
+            </a:pPr>
+            <a:r>
+              <a:rPr lang="ru-RU" sz="2400" dirty="0" smtClean="0"/>
+              <a:t>Устарело. Нужно только при ручной передаче данных между </a:t>
+            </a:r>
+            <a:r>
+              <a:rPr lang="en-US" sz="2400" dirty="0" err="1" smtClean="0"/>
+              <a:t>AppDomain</a:t>
+            </a:r>
+            <a:r>
+              <a:rPr lang="ru-RU" sz="2400" dirty="0" smtClean="0"/>
+              <a:t>-ами.</a:t>
+            </a:r>
+            <a:endParaRPr lang="en-US" sz="2400" dirty="0" smtClean="0"/>
+          </a:p>
+          <a:p>
+            <a:pPr marL="285750" indent="-285750">
+              <a:buFont typeface="Arial" pitchFamily="34" charset="0"/>
+              <a:buChar char="•"/>
+            </a:pPr>
+            <a:r>
+              <a:rPr lang="en-US" sz="2400" dirty="0" smtClean="0">
+                <a:solidFill>
+                  <a:srgbClr val="FFFF00"/>
+                </a:solidFill>
+              </a:rPr>
+              <a:t>WCF (Windows Communication Foundation)</a:t>
+            </a:r>
+          </a:p>
+          <a:p>
+            <a:pPr marL="285750" indent="-285750">
+              <a:buFont typeface="Arial" pitchFamily="34" charset="0"/>
+              <a:buChar char="•"/>
+            </a:pPr>
+            <a:r>
+              <a:rPr lang="en-US" sz="2400" dirty="0">
+                <a:solidFill>
+                  <a:srgbClr val="FFFF00"/>
+                </a:solidFill>
+              </a:rPr>
+              <a:t>Sockets</a:t>
+            </a:r>
+          </a:p>
+          <a:p>
+            <a:pPr marL="742950" lvl="1" indent="-285750">
+              <a:buFont typeface="Arial" pitchFamily="34" charset="0"/>
+              <a:buChar char="•"/>
+            </a:pPr>
+            <a:r>
+              <a:rPr lang="en-US" sz="2400" dirty="0" err="1"/>
+              <a:t>System.Net</a:t>
+            </a:r>
+            <a:endParaRPr lang="en-US" sz="2400" dirty="0"/>
+          </a:p>
+          <a:p>
+            <a:pPr marL="285750" indent="-285750">
+              <a:buFont typeface="Arial" pitchFamily="34" charset="0"/>
+              <a:buChar char="•"/>
+            </a:pPr>
+            <a:r>
+              <a:rPr lang="ru-RU" sz="2400" dirty="0" smtClean="0"/>
+              <a:t>Буфер </a:t>
+            </a:r>
+            <a:r>
+              <a:rPr lang="ru-RU" sz="2400" dirty="0"/>
+              <a:t>обмена </a:t>
+            </a:r>
+            <a:r>
+              <a:rPr lang="en-US" sz="2400" dirty="0"/>
+              <a:t>(Clipboard)</a:t>
+            </a:r>
+          </a:p>
+          <a:p>
+            <a:pPr marL="285750" indent="-285750">
+              <a:buFont typeface="Arial" pitchFamily="34" charset="0"/>
+              <a:buChar char="•"/>
+            </a:pPr>
+            <a:r>
+              <a:rPr lang="en-US" sz="2400" dirty="0"/>
+              <a:t>COM (Component Object Model)</a:t>
+            </a:r>
+          </a:p>
+          <a:p>
+            <a:pPr marL="285750" indent="-285750">
+              <a:buFont typeface="Arial" pitchFamily="34" charset="0"/>
+              <a:buChar char="•"/>
+            </a:pPr>
+            <a:r>
+              <a:rPr lang="en-US" sz="2400" dirty="0"/>
+              <a:t>Data </a:t>
+            </a:r>
+            <a:r>
+              <a:rPr lang="en-US" sz="2400" dirty="0" smtClean="0"/>
+              <a:t>copy</a:t>
+            </a:r>
+          </a:p>
+          <a:p>
+            <a:pPr marL="285750" indent="-285750">
+              <a:buFont typeface="Arial" pitchFamily="34" charset="0"/>
+              <a:buChar char="•"/>
+            </a:pPr>
+            <a:r>
+              <a:rPr lang="en-US" sz="2400" dirty="0" smtClean="0"/>
+              <a:t>DDE (Dynamic Data Exchange)</a:t>
+            </a:r>
+          </a:p>
+          <a:p>
+            <a:pPr marL="285750" indent="-285750">
+              <a:buFont typeface="Arial" pitchFamily="34" charset="0"/>
+              <a:buChar char="•"/>
+            </a:pPr>
+            <a:r>
+              <a:rPr lang="en-US" sz="2400" dirty="0" smtClean="0">
+                <a:solidFill>
+                  <a:srgbClr val="FFFF00"/>
+                </a:solidFill>
+              </a:rPr>
+              <a:t>File Mappings</a:t>
+            </a:r>
+          </a:p>
+          <a:p>
+            <a:pPr marL="742950" lvl="1" indent="-285750">
+              <a:buFont typeface="Arial" pitchFamily="34" charset="0"/>
+              <a:buChar char="•"/>
+            </a:pPr>
+            <a:r>
+              <a:rPr lang="en-US" sz="2400" dirty="0" err="1"/>
+              <a:t>System.IO.MemoryMappedFiles</a:t>
+            </a:r>
+            <a:endParaRPr lang="en-US" sz="2400" dirty="0" smtClean="0"/>
+          </a:p>
+          <a:p>
+            <a:pPr marL="285750" indent="-285750">
+              <a:buFont typeface="Arial" pitchFamily="34" charset="0"/>
+              <a:buChar char="•"/>
+            </a:pPr>
+            <a:r>
+              <a:rPr lang="en-US" sz="2400" dirty="0" err="1" smtClean="0"/>
+              <a:t>Mailslots</a:t>
+            </a:r>
+            <a:endParaRPr lang="en-US" sz="2400" dirty="0" smtClean="0"/>
+          </a:p>
+          <a:p>
+            <a:pPr marL="285750" indent="-285750">
+              <a:buFont typeface="Arial" pitchFamily="34" charset="0"/>
+              <a:buChar char="•"/>
+            </a:pPr>
+            <a:r>
+              <a:rPr lang="en-US" sz="2400" dirty="0" smtClean="0"/>
+              <a:t>Pipes</a:t>
+            </a:r>
+          </a:p>
+          <a:p>
+            <a:pPr marL="285750" indent="-285750">
+              <a:buFont typeface="Arial" pitchFamily="34" charset="0"/>
+              <a:buChar char="•"/>
+            </a:pPr>
+            <a:r>
+              <a:rPr lang="en-US" sz="2400" dirty="0" smtClean="0"/>
+              <a:t>RPC (Remote Procedure Call)</a:t>
+            </a:r>
+          </a:p>
+          <a:p>
+            <a:pPr algn="ctr"/>
+            <a:endParaRPr lang="en-US" sz="2400" dirty="0" smtClean="0"/>
+          </a:p>
+        </p:txBody>
+      </p:sp>
+      <p:sp>
+        <p:nvSpPr>
+          <p:cNvPr id="3" name="TextBox 2"/>
+          <p:cNvSpPr txBox="1"/>
+          <p:nvPr/>
+        </p:nvSpPr>
+        <p:spPr>
+          <a:xfrm>
+            <a:off x="51146" y="44624"/>
+            <a:ext cx="8969700" cy="1077218"/>
+          </a:xfrm>
+          <a:prstGeom prst="rect">
+            <a:avLst/>
+          </a:prstGeom>
+          <a:noFill/>
+        </p:spPr>
+        <p:txBody>
+          <a:bodyPr wrap="none" rtlCol="0">
+            <a:spAutoFit/>
+          </a:bodyPr>
+          <a:lstStyle/>
+          <a:p>
+            <a:pPr algn="ctr"/>
+            <a:r>
+              <a:rPr lang="ru-RU" sz="3200" b="1" dirty="0">
+                <a:solidFill>
+                  <a:schemeClr val="bg1"/>
+                </a:solidFill>
+                <a:cs typeface="Times New Roman" pitchFamily="18" charset="0"/>
+              </a:rPr>
+              <a:t>Механизмы взаимодействия между процессами</a:t>
+            </a:r>
+          </a:p>
+          <a:p>
+            <a:pPr algn="ctr"/>
+            <a:endParaRPr lang="en-US" sz="3200" dirty="0" smtClean="0"/>
+          </a:p>
+        </p:txBody>
+      </p:sp>
+    </p:spTree>
+    <p:extLst>
+      <p:ext uri="{BB962C8B-B14F-4D97-AF65-F5344CB8AC3E}">
+        <p14:creationId xmlns:p14="http://schemas.microsoft.com/office/powerpoint/2010/main" val="4075062194"/>
+      </p:ext>
+    </p:extLst>
+  </p:cSld>
+  <p:clrMapOvr>
+    <a:masterClrMapping/>
+  </p:clrMapOvr>
+  <p:timing>
+    <p:tnLst>
+      <p:par>
+        <p:cTn id="1" dur="indefinite" restart="never" nodeType="tmRoot"/>
+      </p:par>
+    </p:tnLst>
+  </p:timing>
+</p:sld>
+</file>
+
 <file path=ppt/slides/slide3.xml><?xml version="1.0" encoding="utf-8"?>
 <p:sld xmlns:a="http://schemas.openxmlformats.org/drawingml/2006/main" xmlns:r="http://schemas.openxmlformats.org/officeDocument/2006/relationships" xmlns:p="http://schemas.openxmlformats.org/presentationml/2006/main">
   <p:cSld>
@@ -11637,25 +11934,12 @@
           <a:p>
             <a:r>
               <a:rPr lang="ru-RU" dirty="0" smtClean="0"/>
-              <a:t>Код выполнящийся в контексте процесса, со своим </a:t>
-            </a:r>
-            <a:r>
-              <a:rPr lang="ru-RU" dirty="0" smtClean="0"/>
-              <a:t>стеком, приоритетом </a:t>
-            </a:r>
-            <a:r>
-              <a:rPr lang="ru-RU" dirty="0" smtClean="0"/>
-              <a:t>и контекстом безопасности (</a:t>
+              <a:t>Код выполнящийся в контексте процесса, со своим стеком, приоритетом и контекстом безопасности (</a:t>
             </a:r>
             <a:r>
               <a:rPr lang="en-US" dirty="0" smtClean="0"/>
-              <a:t>security context</a:t>
-            </a:r>
-            <a:r>
-              <a:rPr lang="en-US" dirty="0" smtClean="0"/>
-              <a:t>)</a:t>
-            </a:r>
-            <a:endParaRPr lang="en-US" dirty="0" smtClean="0"/>
+              <a:t>security context)</a:t>
+            </a:r>
           </a:p>
           <a:p>
             <a:r>

</xml_diff>

<commit_message>
Updated multi-threading presentation (lesson #8)
</commit_message>
<xml_diff>
--- a/Presentation/lesson-08.pptx
+++ b/Presentation/lesson-08.pptx
@@ -5,7 +5,7 @@
     <p:sldMasterId id="2147483648" r:id="rId1"/>
   </p:sldMasterIdLst>
   <p:notesMasterIdLst>
-    <p:notesMasterId r:id="rId22"/>
+    <p:notesMasterId r:id="rId27"/>
   </p:notesMasterIdLst>
   <p:sldIdLst>
     <p:sldId id="256" r:id="rId2"/>
@@ -25,9 +25,14 @@
     <p:sldId id="270" r:id="rId16"/>
     <p:sldId id="271" r:id="rId17"/>
     <p:sldId id="272" r:id="rId18"/>
-    <p:sldId id="273" r:id="rId19"/>
-    <p:sldId id="274" r:id="rId20"/>
-    <p:sldId id="275" r:id="rId21"/>
+    <p:sldId id="278" r:id="rId19"/>
+    <p:sldId id="273" r:id="rId20"/>
+    <p:sldId id="274" r:id="rId21"/>
+    <p:sldId id="275" r:id="rId22"/>
+    <p:sldId id="277" r:id="rId23"/>
+    <p:sldId id="279" r:id="rId24"/>
+    <p:sldId id="280" r:id="rId25"/>
+    <p:sldId id="276" r:id="rId26"/>
   </p:sldIdLst>
   <p:sldSz cx="9144000" cy="6858000" type="screen4x3"/>
   <p:notesSz cx="6858000" cy="9144000"/>
@@ -211,7 +216,7 @@
           <a:p>
             <a:fld id="{B24A7054-7FFB-49F4-A126-5DF6E687FF53}" type="datetimeFigureOut">
               <a:rPr lang="ru-RU" smtClean="0"/>
-              <a:t>06.11.2012</a:t>
+              <a:t>24.01.2013</a:t>
             </a:fld>
             <a:endParaRPr lang="ru-RU"/>
           </a:p>
@@ -1493,7 +1498,7 @@
           <a:p>
             <a:fld id="{8E6E6A2A-E9D3-4A0D-B04A-ABDD367A1E08}" type="datetimeFigureOut">
               <a:rPr lang="ru-RU" smtClean="0"/>
-              <a:t>06.11.2012</a:t>
+              <a:t>24.01.2013</a:t>
             </a:fld>
             <a:endParaRPr lang="ru-RU"/>
           </a:p>
@@ -2938,7 +2943,7 @@
           <a:p>
             <a:fld id="{AC3D3127-B7C4-45E3-9797-C527EC9FDD78}" type="datetimeFigureOut">
               <a:rPr lang="ru-RU" smtClean="0"/>
-              <a:t>06.11.2012</a:t>
+              <a:t>24.01.2013</a:t>
             </a:fld>
             <a:endParaRPr lang="ru-RU"/>
           </a:p>
@@ -10100,253 +10105,1239 @@
       </p:grpSpPr>
       <p:sp>
         <p:nvSpPr>
-          <p:cNvPr id="14338" name="Rectangle 3"/>
-          <p:cNvSpPr>
-            <a:spLocks noChangeArrowheads="1"/>
-          </p:cNvSpPr>
+          <p:cNvPr id="3" name="TextBox 2"/>
+          <p:cNvSpPr txBox="1"/>
           <p:nvPr/>
         </p:nvSpPr>
-        <p:spPr bwMode="auto">
+        <p:spPr>
           <a:xfrm>
-            <a:off x="152400" y="-4763"/>
-            <a:ext cx="8763000" cy="461963"/>
+            <a:off x="251520" y="44624"/>
+            <a:ext cx="8568952" cy="584775"/>
           </a:xfrm>
           <a:prstGeom prst="rect">
             <a:avLst/>
           </a:prstGeom>
           <a:noFill/>
-          <a:ln>
-            <a:noFill/>
-          </a:ln>
-          <a:extLst>
-            <a:ext uri="{909E8E84-426E-40DD-AFC4-6F175D3DCCD1}">
-              <a14:hiddenFill xmlns:a14="http://schemas.microsoft.com/office/drawing/2010/main">
-                <a:solidFill>
-                  <a:srgbClr val="FFFFFF"/>
-                </a:solidFill>
-              </a14:hiddenFill>
-            </a:ext>
-            <a:ext uri="{91240B29-F687-4F45-9708-019B960494DF}">
-              <a14:hiddenLine xmlns:a14="http://schemas.microsoft.com/office/drawing/2010/main" w="9525">
-                <a:solidFill>
-                  <a:srgbClr val="000000"/>
-                </a:solidFill>
-                <a:miter lim="800000"/>
-                <a:headEnd/>
-                <a:tailEnd/>
-              </a14:hiddenLine>
-            </a:ext>
-          </a:extLst>
         </p:spPr>
         <p:txBody>
-          <a:bodyPr anchor="ctr">
+          <a:bodyPr wrap="square" rtlCol="0">
             <a:spAutoFit/>
           </a:bodyPr>
           <a:lstStyle/>
           <a:p>
             <a:pPr algn="ctr"/>
             <a:r>
-              <a:rPr lang="ru-RU" sz="2400" b="1"/>
-              <a:t>Синхронизация на основе подачи сигналов</a:t>
-            </a:r>
-            <a:endParaRPr lang="ru-RU" sz="2400" b="1">
-              <a:solidFill>
-                <a:srgbClr val="000000"/>
-              </a:solidFill>
-              <a:cs typeface="Times New Roman" pitchFamily="18" charset="0"/>
-            </a:endParaRPr>
+              <a:rPr lang="ru-RU" sz="3200" dirty="0" smtClean="0"/>
+              <a:t>Класс </a:t>
+            </a:r>
+            <a:r>
+              <a:rPr lang="en-US" sz="3200" dirty="0" err="1"/>
+              <a:t>System.Threading.Interlocked</a:t>
+            </a:r>
+            <a:endParaRPr lang="en-US" sz="3200" dirty="0" smtClean="0"/>
           </a:p>
         </p:txBody>
       </p:sp>
       <p:sp>
         <p:nvSpPr>
-          <p:cNvPr id="14339" name="Rectangle 3"/>
-          <p:cNvSpPr>
-            <a:spLocks noChangeArrowheads="1"/>
-          </p:cNvSpPr>
+          <p:cNvPr id="5" name="TextBox 4"/>
+          <p:cNvSpPr txBox="1"/>
           <p:nvPr/>
         </p:nvSpPr>
-        <p:spPr bwMode="auto">
+        <p:spPr>
           <a:xfrm>
-            <a:off x="152400" y="457200"/>
-            <a:ext cx="8839200" cy="3292475"/>
+            <a:off x="323528" y="764704"/>
+            <a:ext cx="8424936" cy="830997"/>
           </a:xfrm>
           <a:prstGeom prst="rect">
             <a:avLst/>
           </a:prstGeom>
           <a:noFill/>
-          <a:ln>
-            <a:noFill/>
-          </a:ln>
-          <a:extLst>
-            <a:ext uri="{909E8E84-426E-40DD-AFC4-6F175D3DCCD1}">
-              <a14:hiddenFill xmlns:a14="http://schemas.microsoft.com/office/drawing/2010/main">
-                <a:solidFill>
-                  <a:srgbClr val="FFFFFF"/>
-                </a:solidFill>
-              </a14:hiddenFill>
-            </a:ext>
-            <a:ext uri="{91240B29-F687-4F45-9708-019B960494DF}">
-              <a14:hiddenLine xmlns:a14="http://schemas.microsoft.com/office/drawing/2010/main" w="9525">
-                <a:solidFill>
-                  <a:srgbClr val="000000"/>
-                </a:solidFill>
-                <a:miter lim="800000"/>
-                <a:headEnd/>
-                <a:tailEnd/>
-              </a14:hiddenLine>
-            </a:ext>
-          </a:extLst>
         </p:spPr>
         <p:txBody>
-          <a:bodyPr anchor="ctr">
+          <a:bodyPr wrap="square" rtlCol="0">
             <a:spAutoFit/>
           </a:bodyPr>
           <a:lstStyle/>
           <a:p>
             <a:r>
-              <a:rPr lang="ru-RU" sz="1600"/>
-              <a:t>	Потребность в </a:t>
-            </a:r>
-            <a:r>
-              <a:rPr lang="ru-RU" sz="1600" i="1"/>
-              <a:t>синхронизация на основе подачи сигналов</a:t>
-            </a:r>
-            <a:r>
-              <a:rPr lang="ru-RU" sz="1600"/>
-              <a:t> возникает, когда один поток ждёт прихода уведомления от другого потока. Для осуществления данной синхронизации используется базовый класс </a:t>
-            </a:r>
-            <a:r>
-              <a:rPr lang="en-US" sz="1600" b="1"/>
-              <a:t>EventWaitHandle</a:t>
-            </a:r>
-            <a:r>
-              <a:rPr lang="ru-RU" sz="1600"/>
-              <a:t> и его наследники </a:t>
-            </a:r>
-            <a:r>
-              <a:rPr lang="en-US" sz="1600" b="1"/>
-              <a:t>AutoResetEvent</a:t>
-            </a:r>
-            <a:r>
-              <a:rPr lang="en-US" sz="1600"/>
-              <a:t> </a:t>
-            </a:r>
-            <a:r>
-              <a:rPr lang="ru-RU" sz="1600"/>
-              <a:t>и </a:t>
-            </a:r>
-            <a:r>
-              <a:rPr lang="en-US" sz="1600" b="1"/>
-              <a:t>ManualResetEvent</a:t>
-            </a:r>
-            <a:r>
-              <a:rPr lang="ru-RU" sz="1600"/>
-              <a:t>. Имея доступ к объекту указанных классов, поток может вызвать его метод </a:t>
-            </a:r>
-            <a:r>
-              <a:rPr lang="ru-RU" sz="1600" b="1"/>
-              <a:t>WaitOne()</a:t>
-            </a:r>
-            <a:r>
-              <a:rPr lang="ru-RU" sz="1600"/>
-              <a:t>, чтобы остановиться и ждать сигнала. Для отправки сигнала применяется вызов метода </a:t>
-            </a:r>
-            <a:r>
-              <a:rPr lang="ru-RU" sz="1600" b="1"/>
-              <a:t>Set()</a:t>
-            </a:r>
-            <a:r>
-              <a:rPr lang="ru-RU" sz="1600"/>
-              <a:t>. Если используется </a:t>
-            </a:r>
-            <a:r>
-              <a:rPr lang="en-US" sz="1600" b="1"/>
-              <a:t>ManualResetEvent</a:t>
-            </a:r>
-            <a:r>
-              <a:rPr lang="ru-RU" sz="1600"/>
-              <a:t>, то все потоки, ожидающие сигнал, освобождаются и продолжают выполнение. При использовании </a:t>
-            </a:r>
-            <a:r>
-              <a:rPr lang="en-US" sz="1600" b="1"/>
-              <a:t>AutoResetEvent</a:t>
-            </a:r>
-            <a:r>
-              <a:rPr lang="ru-RU" sz="1600"/>
-              <a:t> ожидающие потоки освобождаются и запускаются последовательно, на манер очереди.</a:t>
-            </a:r>
-          </a:p>
-          <a:p>
-            <a:r>
-              <a:rPr lang="ru-RU" sz="1600"/>
-              <a:t>	 В качестве примера использования сигналов опишем шаблон проектирования «поставщик-потребитель». Данный шаблон представляет собой очередь, в которую независимые потоки (поставщики) помещают объекты, а один поток извлекает объекты и выполняет с ними заданное действие.</a:t>
-            </a:r>
-            <a:endParaRPr lang="be-BY" sz="1600"/>
+              <a:rPr lang="ru-RU" sz="2400" dirty="0" smtClean="0"/>
+              <a:t>Предоставляет набор методов для выполнения атомарных операций с элементарными типами.</a:t>
+            </a:r>
+            <a:endParaRPr lang="en-US" sz="2400" dirty="0" smtClean="0"/>
           </a:p>
         </p:txBody>
       </p:sp>
-      <p:sp>
-        <p:nvSpPr>
-          <p:cNvPr id="14340" name="Rectangle 3"/>
-          <p:cNvSpPr>
-            <a:spLocks noChangeArrowheads="1"/>
-          </p:cNvSpPr>
-          <p:nvPr/>
-        </p:nvSpPr>
-        <p:spPr bwMode="auto">
-          <a:xfrm>
-            <a:off x="152400" y="3886200"/>
-            <a:ext cx="8839200" cy="338138"/>
-          </a:xfrm>
-          <a:prstGeom prst="rect">
-            <a:avLst/>
-          </a:prstGeom>
-          <a:noFill/>
-          <a:ln>
-            <a:noFill/>
-          </a:ln>
-          <a:extLst>
-            <a:ext uri="{909E8E84-426E-40DD-AFC4-6F175D3DCCD1}">
-              <a14:hiddenFill xmlns:a14="http://schemas.microsoft.com/office/drawing/2010/main">
-                <a:solidFill>
-                  <a:srgbClr val="FFFFFF"/>
-                </a:solidFill>
-              </a14:hiddenFill>
-            </a:ext>
-            <a:ext uri="{91240B29-F687-4F45-9708-019B960494DF}">
-              <a14:hiddenLine xmlns:a14="http://schemas.microsoft.com/office/drawing/2010/main" w="9525">
-                <a:solidFill>
-                  <a:srgbClr val="000000"/>
-                </a:solidFill>
-                <a:miter lim="800000"/>
-                <a:headEnd/>
-                <a:tailEnd/>
-              </a14:hiddenLine>
-            </a:ext>
-          </a:extLst>
-        </p:spPr>
-        <p:txBody>
-          <a:bodyPr anchor="ctr">
-            <a:spAutoFit/>
-          </a:bodyPr>
-          <a:lstStyle/>
-          <a:p>
-            <a:pPr algn="ctr"/>
-            <a:r>
-              <a:rPr lang="ru-RU" sz="1600">
-                <a:hlinkClick r:id="rId2" action="ppaction://hlinkfile"/>
-              </a:rPr>
-              <a:t>Код класса поставщик-потребитель</a:t>
-            </a:r>
-            <a:endParaRPr lang="be-BY" sz="1600"/>
-          </a:p>
-        </p:txBody>
-      </p:sp>
+      <p:graphicFrame>
+        <p:nvGraphicFramePr>
+          <p:cNvPr id="6" name="Table 5"/>
+          <p:cNvGraphicFramePr>
+            <a:graphicFrameLocks noGrp="1"/>
+          </p:cNvGraphicFramePr>
+          <p:nvPr>
+            <p:extLst>
+              <p:ext uri="{D42A27DB-BD31-4B8C-83A1-F6EECF244321}">
+                <p14:modId xmlns:p14="http://schemas.microsoft.com/office/powerpoint/2010/main" val="497431108"/>
+              </p:ext>
+            </p:extLst>
+          </p:nvPr>
+        </p:nvGraphicFramePr>
+        <p:xfrm>
+          <a:off x="251520" y="1772816"/>
+          <a:ext cx="8568952" cy="4435836"/>
+        </p:xfrm>
+        <a:graphic>
+          <a:graphicData uri="http://schemas.openxmlformats.org/drawingml/2006/table">
+            <a:tbl>
+              <a:tblPr/>
+              <a:tblGrid>
+                <a:gridCol w="3312368"/>
+                <a:gridCol w="5256584"/>
+              </a:tblGrid>
+              <a:tr h="329161">
+                <a:tc>
+                  <a:txBody>
+                    <a:bodyPr/>
+                    <a:lstStyle/>
+                    <a:p>
+                      <a:r>
+                        <a:rPr lang="ru-RU" sz="1600" u="none" dirty="0" smtClean="0">
+                          <a:solidFill>
+                            <a:schemeClr val="bg1"/>
+                          </a:solidFill>
+                          <a:latin typeface="+mn-lt"/>
+                        </a:rPr>
+                        <a:t>Метод</a:t>
+                      </a:r>
+                      <a:endParaRPr lang="en-US" sz="1600" u="none" dirty="0">
+                        <a:solidFill>
+                          <a:schemeClr val="bg1"/>
+                        </a:solidFill>
+                        <a:latin typeface="+mn-lt"/>
+                      </a:endParaRPr>
+                    </a:p>
+                  </a:txBody>
+                  <a:tcPr marL="82290" marR="82290" marT="41145" marB="41145" anchor="ctr">
+                    <a:lnL w="12700" cap="flat" cmpd="sng" algn="ctr">
+                      <a:solidFill>
+                        <a:schemeClr val="tx1"/>
+                      </a:solidFill>
+                      <a:prstDash val="solid"/>
+                      <a:round/>
+                      <a:headEnd type="none" w="med" len="med"/>
+                      <a:tailEnd type="none" w="med" len="med"/>
+                    </a:lnL>
+                    <a:lnR w="12700" cap="flat" cmpd="sng" algn="ctr">
+                      <a:solidFill>
+                        <a:schemeClr val="tx1"/>
+                      </a:solidFill>
+                      <a:prstDash val="solid"/>
+                      <a:round/>
+                      <a:headEnd type="none" w="med" len="med"/>
+                      <a:tailEnd type="none" w="med" len="med"/>
+                    </a:lnR>
+                    <a:lnT w="12700" cap="flat" cmpd="sng" algn="ctr">
+                      <a:solidFill>
+                        <a:schemeClr val="tx1"/>
+                      </a:solidFill>
+                      <a:prstDash val="solid"/>
+                      <a:round/>
+                      <a:headEnd type="none" w="med" len="med"/>
+                      <a:tailEnd type="none" w="med" len="med"/>
+                    </a:lnT>
+                    <a:lnB w="12700" cap="flat" cmpd="sng" algn="ctr">
+                      <a:solidFill>
+                        <a:schemeClr val="tx1"/>
+                      </a:solidFill>
+                      <a:prstDash val="solid"/>
+                      <a:round/>
+                      <a:headEnd type="none" w="med" len="med"/>
+                      <a:tailEnd type="none" w="med" len="med"/>
+                    </a:lnB>
+                    <a:solidFill>
+                      <a:schemeClr val="bg1">
+                        <a:lumMod val="50000"/>
+                      </a:schemeClr>
+                    </a:solidFill>
+                  </a:tcPr>
+                </a:tc>
+                <a:tc>
+                  <a:txBody>
+                    <a:bodyPr/>
+                    <a:lstStyle/>
+                    <a:p>
+                      <a:r>
+                        <a:rPr lang="ru-RU" sz="1600" u="none" dirty="0" smtClean="0">
+                          <a:solidFill>
+                            <a:schemeClr val="bg1"/>
+                          </a:solidFill>
+                          <a:latin typeface="+mn-lt"/>
+                        </a:rPr>
+                        <a:t>Описание</a:t>
+                      </a:r>
+                      <a:endParaRPr lang="en-US" sz="1600" u="none" dirty="0">
+                        <a:solidFill>
+                          <a:schemeClr val="bg1"/>
+                        </a:solidFill>
+                        <a:latin typeface="+mn-lt"/>
+                      </a:endParaRPr>
+                    </a:p>
+                  </a:txBody>
+                  <a:tcPr marL="82290" marR="82290" marT="41145" marB="41145" anchor="ctr">
+                    <a:lnL w="12700" cap="flat" cmpd="sng" algn="ctr">
+                      <a:solidFill>
+                        <a:schemeClr val="tx1"/>
+                      </a:solidFill>
+                      <a:prstDash val="solid"/>
+                      <a:round/>
+                      <a:headEnd type="none" w="med" len="med"/>
+                      <a:tailEnd type="none" w="med" len="med"/>
+                    </a:lnL>
+                    <a:lnR w="12700" cap="flat" cmpd="sng" algn="ctr">
+                      <a:solidFill>
+                        <a:schemeClr val="tx1"/>
+                      </a:solidFill>
+                      <a:prstDash val="solid"/>
+                      <a:round/>
+                      <a:headEnd type="none" w="med" len="med"/>
+                      <a:tailEnd type="none" w="med" len="med"/>
+                    </a:lnR>
+                    <a:lnT w="12700" cap="flat" cmpd="sng" algn="ctr">
+                      <a:solidFill>
+                        <a:schemeClr val="tx1"/>
+                      </a:solidFill>
+                      <a:prstDash val="solid"/>
+                      <a:round/>
+                      <a:headEnd type="none" w="med" len="med"/>
+                      <a:tailEnd type="none" w="med" len="med"/>
+                    </a:lnT>
+                    <a:lnB w="12700" cap="flat" cmpd="sng" algn="ctr">
+                      <a:solidFill>
+                        <a:schemeClr val="tx1"/>
+                      </a:solidFill>
+                      <a:prstDash val="solid"/>
+                      <a:round/>
+                      <a:headEnd type="none" w="med" len="med"/>
+                      <a:tailEnd type="none" w="med" len="med"/>
+                    </a:lnB>
+                    <a:solidFill>
+                      <a:schemeClr val="bg1">
+                        <a:lumMod val="50000"/>
+                      </a:schemeClr>
+                    </a:solidFill>
+                  </a:tcPr>
+                </a:tc>
+              </a:tr>
+              <a:tr h="750959">
+                <a:tc>
+                  <a:txBody>
+                    <a:bodyPr/>
+                    <a:lstStyle/>
+                    <a:p>
+                      <a:r>
+                        <a:rPr lang="en-US" sz="1600" u="none" dirty="0" smtClean="0">
+                          <a:latin typeface="+mn-lt"/>
+                        </a:rPr>
+                        <a:t>Add(ref</a:t>
+                      </a:r>
+                      <a:r>
+                        <a:rPr lang="en-US" sz="1600" u="none" baseline="0" dirty="0" smtClean="0">
+                          <a:latin typeface="+mn-lt"/>
+                        </a:rPr>
+                        <a:t> </a:t>
+                      </a:r>
+                      <a:r>
+                        <a:rPr lang="en-US" sz="1600" u="none" dirty="0" err="1" smtClean="0">
+                          <a:latin typeface="+mn-lt"/>
+                        </a:rPr>
+                        <a:t>x,y</a:t>
+                      </a:r>
+                      <a:r>
+                        <a:rPr lang="en-US" sz="1600" u="none" dirty="0" smtClean="0">
+                          <a:latin typeface="+mn-lt"/>
+                        </a:rPr>
+                        <a:t>)</a:t>
+                      </a:r>
+                      <a:endParaRPr lang="en-US" sz="1600" u="none" dirty="0">
+                        <a:latin typeface="+mn-lt"/>
+                      </a:endParaRPr>
+                    </a:p>
+                  </a:txBody>
+                  <a:tcPr marL="82290" marR="82290" marT="41145" marB="41145" anchor="ctr">
+                    <a:lnL w="12700" cap="flat" cmpd="sng" algn="ctr">
+                      <a:solidFill>
+                        <a:schemeClr val="tx1"/>
+                      </a:solidFill>
+                      <a:prstDash val="solid"/>
+                      <a:round/>
+                      <a:headEnd type="none" w="med" len="med"/>
+                      <a:tailEnd type="none" w="med" len="med"/>
+                    </a:lnL>
+                    <a:lnR w="12700" cap="flat" cmpd="sng" algn="ctr">
+                      <a:solidFill>
+                        <a:schemeClr val="tx1"/>
+                      </a:solidFill>
+                      <a:prstDash val="solid"/>
+                      <a:round/>
+                      <a:headEnd type="none" w="med" len="med"/>
+                      <a:tailEnd type="none" w="med" len="med"/>
+                    </a:lnR>
+                    <a:lnT w="12700" cap="flat" cmpd="sng" algn="ctr">
+                      <a:solidFill>
+                        <a:schemeClr val="tx1"/>
+                      </a:solidFill>
+                      <a:prstDash val="solid"/>
+                      <a:round/>
+                      <a:headEnd type="none" w="med" len="med"/>
+                      <a:tailEnd type="none" w="med" len="med"/>
+                    </a:lnT>
+                    <a:lnB w="12700" cap="flat" cmpd="sng" algn="ctr">
+                      <a:solidFill>
+                        <a:schemeClr val="tx1"/>
+                      </a:solidFill>
+                      <a:prstDash val="solid"/>
+                      <a:round/>
+                      <a:headEnd type="none" w="med" len="med"/>
+                      <a:tailEnd type="none" w="med" len="med"/>
+                    </a:lnB>
+                  </a:tcPr>
+                </a:tc>
+                <a:tc>
+                  <a:txBody>
+                    <a:bodyPr/>
+                    <a:lstStyle/>
+                    <a:p>
+                      <a:r>
+                        <a:rPr lang="ru-RU" sz="1600" u="none" baseline="0" dirty="0" smtClean="0">
+                          <a:latin typeface="+mn-lt"/>
+                        </a:rPr>
+                        <a:t>Сложение</a:t>
+                      </a:r>
+                      <a:r>
+                        <a:rPr lang="en-US" sz="1600" u="none" baseline="0" dirty="0" smtClean="0">
+                          <a:latin typeface="+mn-lt"/>
+                        </a:rPr>
+                        <a:t>. </a:t>
+                      </a:r>
+                      <a:r>
+                        <a:rPr lang="ru-RU" sz="1600" u="none" baseline="0" dirty="0" smtClean="0">
+                          <a:latin typeface="+mn-lt"/>
+                        </a:rPr>
+                        <a:t>Результат помещается в первый аргумент. (</a:t>
+                      </a:r>
+                      <a:r>
+                        <a:rPr lang="en-US" sz="1600" u="none" baseline="0" dirty="0" err="1" smtClean="0">
+                          <a:latin typeface="+mn-lt"/>
+                        </a:rPr>
+                        <a:t>int</a:t>
+                      </a:r>
+                      <a:r>
+                        <a:rPr lang="en-US" sz="1600" u="none" baseline="0" dirty="0" smtClean="0">
+                          <a:latin typeface="+mn-lt"/>
+                        </a:rPr>
+                        <a:t>, long)</a:t>
+                      </a:r>
+                      <a:endParaRPr lang="en-US" sz="1600" u="none" dirty="0">
+                        <a:latin typeface="+mn-lt"/>
+                      </a:endParaRPr>
+                    </a:p>
+                  </a:txBody>
+                  <a:tcPr marL="82290" marR="82290" marT="41145" marB="41145" anchor="ctr">
+                    <a:lnL w="12700" cap="flat" cmpd="sng" algn="ctr">
+                      <a:solidFill>
+                        <a:schemeClr val="tx1"/>
+                      </a:solidFill>
+                      <a:prstDash val="solid"/>
+                      <a:round/>
+                      <a:headEnd type="none" w="med" len="med"/>
+                      <a:tailEnd type="none" w="med" len="med"/>
+                    </a:lnL>
+                    <a:lnR w="12700" cap="flat" cmpd="sng" algn="ctr">
+                      <a:solidFill>
+                        <a:schemeClr val="tx1"/>
+                      </a:solidFill>
+                      <a:prstDash val="solid"/>
+                      <a:round/>
+                      <a:headEnd type="none" w="med" len="med"/>
+                      <a:tailEnd type="none" w="med" len="med"/>
+                    </a:lnR>
+                    <a:lnT w="12700" cap="flat" cmpd="sng" algn="ctr">
+                      <a:solidFill>
+                        <a:schemeClr val="tx1"/>
+                      </a:solidFill>
+                      <a:prstDash val="solid"/>
+                      <a:round/>
+                      <a:headEnd type="none" w="med" len="med"/>
+                      <a:tailEnd type="none" w="med" len="med"/>
+                    </a:lnT>
+                    <a:lnB w="12700" cap="flat" cmpd="sng" algn="ctr">
+                      <a:solidFill>
+                        <a:schemeClr val="tx1"/>
+                      </a:solidFill>
+                      <a:prstDash val="solid"/>
+                      <a:round/>
+                      <a:headEnd type="none" w="med" len="med"/>
+                      <a:tailEnd type="none" w="med" len="med"/>
+                    </a:lnB>
+                  </a:tcPr>
+                </a:tc>
+              </a:tr>
+              <a:tr h="576032">
+                <a:tc>
+                  <a:txBody>
+                    <a:bodyPr/>
+                    <a:lstStyle/>
+                    <a:p>
+                      <a:r>
+                        <a:rPr lang="en-US" sz="1600" u="none" dirty="0" err="1" smtClean="0">
+                          <a:latin typeface="+mn-lt"/>
+                        </a:rPr>
+                        <a:t>CompareExchange</a:t>
+                      </a:r>
+                      <a:r>
+                        <a:rPr lang="en-US" sz="1600" u="none" dirty="0" smtClean="0">
+                          <a:latin typeface="+mn-lt"/>
+                        </a:rPr>
+                        <a:t>(ref</a:t>
+                      </a:r>
+                      <a:r>
+                        <a:rPr lang="en-US" sz="1600" u="none" baseline="0" dirty="0" smtClean="0">
+                          <a:latin typeface="+mn-lt"/>
+                        </a:rPr>
+                        <a:t> </a:t>
+                      </a:r>
+                      <a:r>
+                        <a:rPr lang="en-US" sz="1600" u="none" baseline="0" dirty="0" err="1" smtClean="0">
+                          <a:latin typeface="+mn-lt"/>
+                        </a:rPr>
+                        <a:t>loc</a:t>
+                      </a:r>
+                      <a:r>
+                        <a:rPr lang="en-US" sz="1600" u="none" baseline="0" dirty="0" smtClean="0">
+                          <a:latin typeface="+mn-lt"/>
+                        </a:rPr>
+                        <a:t>, value, </a:t>
+                      </a:r>
+                      <a:r>
+                        <a:rPr lang="en-US" sz="1600" u="none" baseline="0" dirty="0" err="1" smtClean="0">
+                          <a:latin typeface="+mn-lt"/>
+                        </a:rPr>
+                        <a:t>comparand</a:t>
+                      </a:r>
+                      <a:r>
+                        <a:rPr lang="en-US" sz="1600" u="none" baseline="0" dirty="0" smtClean="0">
+                          <a:latin typeface="+mn-lt"/>
+                        </a:rPr>
+                        <a:t>)</a:t>
+                      </a:r>
+                      <a:endParaRPr lang="en-US" sz="1600" u="none" dirty="0">
+                        <a:latin typeface="+mn-lt"/>
+                      </a:endParaRPr>
+                    </a:p>
+                  </a:txBody>
+                  <a:tcPr marL="82290" marR="82290" marT="41145" marB="41145" anchor="ctr">
+                    <a:lnL w="12700" cap="flat" cmpd="sng" algn="ctr">
+                      <a:solidFill>
+                        <a:schemeClr val="tx1"/>
+                      </a:solidFill>
+                      <a:prstDash val="solid"/>
+                      <a:round/>
+                      <a:headEnd type="none" w="med" len="med"/>
+                      <a:tailEnd type="none" w="med" len="med"/>
+                    </a:lnL>
+                    <a:lnR w="12700" cap="flat" cmpd="sng" algn="ctr">
+                      <a:solidFill>
+                        <a:schemeClr val="tx1"/>
+                      </a:solidFill>
+                      <a:prstDash val="solid"/>
+                      <a:round/>
+                      <a:headEnd type="none" w="med" len="med"/>
+                      <a:tailEnd type="none" w="med" len="med"/>
+                    </a:lnR>
+                    <a:lnT w="12700" cap="flat" cmpd="sng" algn="ctr">
+                      <a:solidFill>
+                        <a:schemeClr val="tx1"/>
+                      </a:solidFill>
+                      <a:prstDash val="solid"/>
+                      <a:round/>
+                      <a:headEnd type="none" w="med" len="med"/>
+                      <a:tailEnd type="none" w="med" len="med"/>
+                    </a:lnT>
+                    <a:lnB w="12700" cap="flat" cmpd="sng" algn="ctr">
+                      <a:solidFill>
+                        <a:schemeClr val="tx1"/>
+                      </a:solidFill>
+                      <a:prstDash val="solid"/>
+                      <a:round/>
+                      <a:headEnd type="none" w="med" len="med"/>
+                      <a:tailEnd type="none" w="med" len="med"/>
+                    </a:lnB>
+                  </a:tcPr>
+                </a:tc>
+                <a:tc>
+                  <a:txBody>
+                    <a:bodyPr/>
+                    <a:lstStyle/>
+                    <a:p>
+                      <a:r>
+                        <a:rPr lang="ru-RU" sz="1600" u="none" dirty="0" smtClean="0">
+                          <a:latin typeface="+mn-lt"/>
+                        </a:rPr>
+                        <a:t>Если</a:t>
+                      </a:r>
+                      <a:r>
+                        <a:rPr lang="ru-RU" sz="1600" u="none" baseline="0" dirty="0" smtClean="0">
+                          <a:latin typeface="+mn-lt"/>
+                        </a:rPr>
+                        <a:t> </a:t>
+                      </a:r>
+                      <a:r>
+                        <a:rPr lang="en-US" sz="1600" u="none" baseline="0" dirty="0" err="1" smtClean="0">
+                          <a:latin typeface="+mn-lt"/>
+                        </a:rPr>
+                        <a:t>loc</a:t>
+                      </a:r>
+                      <a:r>
+                        <a:rPr lang="en-US" sz="1600" u="none" baseline="0" dirty="0" smtClean="0">
+                          <a:latin typeface="+mn-lt"/>
+                        </a:rPr>
+                        <a:t> == </a:t>
+                      </a:r>
+                      <a:r>
+                        <a:rPr lang="en-US" sz="1600" u="none" baseline="0" dirty="0" err="1" smtClean="0">
+                          <a:latin typeface="+mn-lt"/>
+                        </a:rPr>
+                        <a:t>comparand</a:t>
+                      </a:r>
+                      <a:r>
+                        <a:rPr lang="en-US" sz="1600" u="none" baseline="0" dirty="0" smtClean="0">
+                          <a:latin typeface="+mn-lt"/>
+                        </a:rPr>
+                        <a:t>, </a:t>
+                      </a:r>
+                      <a:r>
+                        <a:rPr lang="ru-RU" sz="1600" u="none" baseline="0" dirty="0" smtClean="0">
+                          <a:latin typeface="+mn-lt"/>
+                        </a:rPr>
+                        <a:t>то в </a:t>
+                      </a:r>
+                      <a:r>
+                        <a:rPr lang="en-US" sz="1600" u="none" baseline="0" dirty="0" err="1" smtClean="0">
+                          <a:latin typeface="+mn-lt"/>
+                        </a:rPr>
+                        <a:t>loc</a:t>
+                      </a:r>
+                      <a:r>
+                        <a:rPr lang="en-US" sz="1600" u="none" baseline="0" dirty="0" smtClean="0">
+                          <a:latin typeface="+mn-lt"/>
+                        </a:rPr>
+                        <a:t> </a:t>
+                      </a:r>
+                      <a:r>
+                        <a:rPr lang="ru-RU" sz="1600" u="none" baseline="0" dirty="0" smtClean="0">
+                          <a:latin typeface="+mn-lt"/>
+                        </a:rPr>
+                        <a:t>записывается </a:t>
+                      </a:r>
+                      <a:r>
+                        <a:rPr lang="en-US" sz="1600" u="none" baseline="0" dirty="0" smtClean="0">
+                          <a:latin typeface="+mn-lt"/>
+                        </a:rPr>
+                        <a:t>value. (</a:t>
+                      </a:r>
+                      <a:r>
+                        <a:rPr lang="en-US" sz="1600" u="none" baseline="0" dirty="0" err="1" smtClean="0">
+                          <a:latin typeface="+mn-lt"/>
+                        </a:rPr>
+                        <a:t>int</a:t>
+                      </a:r>
+                      <a:r>
+                        <a:rPr lang="en-US" sz="1600" u="none" baseline="0" dirty="0" smtClean="0">
+                          <a:latin typeface="+mn-lt"/>
+                        </a:rPr>
+                        <a:t>, long, double, float, </a:t>
+                      </a:r>
+                      <a:r>
+                        <a:rPr lang="en-US" sz="1600" u="none" baseline="0" dirty="0" err="1" smtClean="0">
+                          <a:latin typeface="+mn-lt"/>
+                        </a:rPr>
+                        <a:t>IntPtr</a:t>
+                      </a:r>
+                      <a:r>
+                        <a:rPr lang="en-US" sz="1600" u="none" baseline="0" dirty="0" smtClean="0">
+                          <a:latin typeface="+mn-lt"/>
+                        </a:rPr>
+                        <a:t>, object)</a:t>
+                      </a:r>
+                      <a:endParaRPr lang="en-US" sz="1600" u="none" dirty="0">
+                        <a:latin typeface="+mn-lt"/>
+                      </a:endParaRPr>
+                    </a:p>
+                  </a:txBody>
+                  <a:tcPr marL="82290" marR="82290" marT="41145" marB="41145" anchor="ctr">
+                    <a:lnL w="12700" cap="flat" cmpd="sng" algn="ctr">
+                      <a:solidFill>
+                        <a:schemeClr val="tx1"/>
+                      </a:solidFill>
+                      <a:prstDash val="solid"/>
+                      <a:round/>
+                      <a:headEnd type="none" w="med" len="med"/>
+                      <a:tailEnd type="none" w="med" len="med"/>
+                    </a:lnL>
+                    <a:lnR w="12700" cap="flat" cmpd="sng" algn="ctr">
+                      <a:solidFill>
+                        <a:schemeClr val="tx1"/>
+                      </a:solidFill>
+                      <a:prstDash val="solid"/>
+                      <a:round/>
+                      <a:headEnd type="none" w="med" len="med"/>
+                      <a:tailEnd type="none" w="med" len="med"/>
+                    </a:lnR>
+                    <a:lnT w="12700" cap="flat" cmpd="sng" algn="ctr">
+                      <a:solidFill>
+                        <a:schemeClr val="tx1"/>
+                      </a:solidFill>
+                      <a:prstDash val="solid"/>
+                      <a:round/>
+                      <a:headEnd type="none" w="med" len="med"/>
+                      <a:tailEnd type="none" w="med" len="med"/>
+                    </a:lnT>
+                    <a:lnB w="12700" cap="flat" cmpd="sng" algn="ctr">
+                      <a:solidFill>
+                        <a:schemeClr val="tx1"/>
+                      </a:solidFill>
+                      <a:prstDash val="solid"/>
+                      <a:round/>
+                      <a:headEnd type="none" w="med" len="med"/>
+                      <a:tailEnd type="none" w="med" len="med"/>
+                    </a:lnB>
+                  </a:tcPr>
+                </a:tc>
+              </a:tr>
+              <a:tr h="576032">
+                <a:tc>
+                  <a:txBody>
+                    <a:bodyPr/>
+                    <a:lstStyle/>
+                    <a:p>
+                      <a:r>
+                        <a:rPr lang="en-US" sz="1600" u="none" dirty="0" smtClean="0">
+                          <a:latin typeface="+mn-lt"/>
+                        </a:rPr>
+                        <a:t>Decrement(ref </a:t>
+                      </a:r>
+                      <a:r>
+                        <a:rPr lang="en-US" sz="1600" u="none" dirty="0" err="1" smtClean="0">
+                          <a:latin typeface="+mn-lt"/>
+                        </a:rPr>
+                        <a:t>loc</a:t>
+                      </a:r>
+                      <a:r>
+                        <a:rPr lang="en-US" sz="1600" u="none" dirty="0" smtClean="0">
+                          <a:latin typeface="+mn-lt"/>
+                        </a:rPr>
+                        <a:t>)</a:t>
+                      </a:r>
+                      <a:endParaRPr lang="en-US" sz="1600" u="none" dirty="0">
+                        <a:latin typeface="+mn-lt"/>
+                      </a:endParaRPr>
+                    </a:p>
+                  </a:txBody>
+                  <a:tcPr marL="82290" marR="82290" marT="41145" marB="41145" anchor="ctr">
+                    <a:lnL w="12700" cap="flat" cmpd="sng" algn="ctr">
+                      <a:solidFill>
+                        <a:schemeClr val="tx1"/>
+                      </a:solidFill>
+                      <a:prstDash val="solid"/>
+                      <a:round/>
+                      <a:headEnd type="none" w="med" len="med"/>
+                      <a:tailEnd type="none" w="med" len="med"/>
+                    </a:lnL>
+                    <a:lnR w="12700" cap="flat" cmpd="sng" algn="ctr">
+                      <a:solidFill>
+                        <a:schemeClr val="tx1"/>
+                      </a:solidFill>
+                      <a:prstDash val="solid"/>
+                      <a:round/>
+                      <a:headEnd type="none" w="med" len="med"/>
+                      <a:tailEnd type="none" w="med" len="med"/>
+                    </a:lnR>
+                    <a:lnT w="12700" cap="flat" cmpd="sng" algn="ctr">
+                      <a:solidFill>
+                        <a:schemeClr val="tx1"/>
+                      </a:solidFill>
+                      <a:prstDash val="solid"/>
+                      <a:round/>
+                      <a:headEnd type="none" w="med" len="med"/>
+                      <a:tailEnd type="none" w="med" len="med"/>
+                    </a:lnT>
+                    <a:lnB w="12700" cap="flat" cmpd="sng" algn="ctr">
+                      <a:solidFill>
+                        <a:schemeClr val="tx1"/>
+                      </a:solidFill>
+                      <a:prstDash val="solid"/>
+                      <a:round/>
+                      <a:headEnd type="none" w="med" len="med"/>
+                      <a:tailEnd type="none" w="med" len="med"/>
+                    </a:lnB>
+                  </a:tcPr>
+                </a:tc>
+                <a:tc>
+                  <a:txBody>
+                    <a:bodyPr/>
+                    <a:lstStyle/>
+                    <a:p>
+                      <a:r>
+                        <a:rPr lang="ru-RU" sz="1600" u="none" baseline="0" dirty="0" smtClean="0">
+                          <a:latin typeface="+mn-lt"/>
+                        </a:rPr>
+                        <a:t>Уменьшение на единицу. (</a:t>
+                      </a:r>
+                      <a:r>
+                        <a:rPr lang="en-US" sz="1600" u="none" baseline="0" dirty="0" err="1" smtClean="0">
+                          <a:latin typeface="+mn-lt"/>
+                        </a:rPr>
+                        <a:t>int</a:t>
+                      </a:r>
+                      <a:r>
+                        <a:rPr lang="en-US" sz="1600" u="none" baseline="0" dirty="0" smtClean="0">
+                          <a:latin typeface="+mn-lt"/>
+                        </a:rPr>
+                        <a:t>, long)</a:t>
+                      </a:r>
+                      <a:endParaRPr lang="en-US" sz="1600" u="none" dirty="0">
+                        <a:latin typeface="+mn-lt"/>
+                      </a:endParaRPr>
+                    </a:p>
+                  </a:txBody>
+                  <a:tcPr marL="82290" marR="82290" marT="41145" marB="41145" anchor="ctr">
+                    <a:lnL w="12700" cap="flat" cmpd="sng" algn="ctr">
+                      <a:solidFill>
+                        <a:schemeClr val="tx1"/>
+                      </a:solidFill>
+                      <a:prstDash val="solid"/>
+                      <a:round/>
+                      <a:headEnd type="none" w="med" len="med"/>
+                      <a:tailEnd type="none" w="med" len="med"/>
+                    </a:lnL>
+                    <a:lnR w="12700" cap="flat" cmpd="sng" algn="ctr">
+                      <a:solidFill>
+                        <a:schemeClr val="tx1"/>
+                      </a:solidFill>
+                      <a:prstDash val="solid"/>
+                      <a:round/>
+                      <a:headEnd type="none" w="med" len="med"/>
+                      <a:tailEnd type="none" w="med" len="med"/>
+                    </a:lnR>
+                    <a:lnT w="12700" cap="flat" cmpd="sng" algn="ctr">
+                      <a:solidFill>
+                        <a:schemeClr val="tx1"/>
+                      </a:solidFill>
+                      <a:prstDash val="solid"/>
+                      <a:round/>
+                      <a:headEnd type="none" w="med" len="med"/>
+                      <a:tailEnd type="none" w="med" len="med"/>
+                    </a:lnT>
+                    <a:lnB w="12700" cap="flat" cmpd="sng" algn="ctr">
+                      <a:solidFill>
+                        <a:schemeClr val="tx1"/>
+                      </a:solidFill>
+                      <a:prstDash val="solid"/>
+                      <a:round/>
+                      <a:headEnd type="none" w="med" len="med"/>
+                      <a:tailEnd type="none" w="med" len="med"/>
+                    </a:lnB>
+                  </a:tcPr>
+                </a:tc>
+              </a:tr>
+              <a:tr h="576032">
+                <a:tc>
+                  <a:txBody>
+                    <a:bodyPr/>
+                    <a:lstStyle/>
+                    <a:p>
+                      <a:r>
+                        <a:rPr lang="en-US" sz="1600" u="none" dirty="0" smtClean="0">
+                          <a:latin typeface="+mn-lt"/>
+                        </a:rPr>
+                        <a:t>Exchange(ref</a:t>
+                      </a:r>
+                      <a:r>
+                        <a:rPr lang="en-US" sz="1600" u="none" baseline="0" dirty="0" smtClean="0">
+                          <a:latin typeface="+mn-lt"/>
+                        </a:rPr>
+                        <a:t> </a:t>
+                      </a:r>
+                      <a:r>
+                        <a:rPr lang="en-US" sz="1600" u="none" baseline="0" dirty="0" err="1" smtClean="0">
+                          <a:latin typeface="+mn-lt"/>
+                        </a:rPr>
+                        <a:t>loc</a:t>
+                      </a:r>
+                      <a:r>
+                        <a:rPr lang="en-US" sz="1600" u="none" baseline="0" dirty="0" smtClean="0">
+                          <a:latin typeface="+mn-lt"/>
+                        </a:rPr>
+                        <a:t>, value)</a:t>
+                      </a:r>
+                      <a:endParaRPr lang="en-US" sz="1600" u="none" dirty="0">
+                        <a:latin typeface="+mn-lt"/>
+                      </a:endParaRPr>
+                    </a:p>
+                  </a:txBody>
+                  <a:tcPr marL="82290" marR="82290" marT="41145" marB="41145" anchor="ctr">
+                    <a:lnL w="12700" cap="flat" cmpd="sng" algn="ctr">
+                      <a:solidFill>
+                        <a:schemeClr val="tx1"/>
+                      </a:solidFill>
+                      <a:prstDash val="solid"/>
+                      <a:round/>
+                      <a:headEnd type="none" w="med" len="med"/>
+                      <a:tailEnd type="none" w="med" len="med"/>
+                    </a:lnL>
+                    <a:lnR w="12700" cap="flat" cmpd="sng" algn="ctr">
+                      <a:solidFill>
+                        <a:schemeClr val="tx1"/>
+                      </a:solidFill>
+                      <a:prstDash val="solid"/>
+                      <a:round/>
+                      <a:headEnd type="none" w="med" len="med"/>
+                      <a:tailEnd type="none" w="med" len="med"/>
+                    </a:lnR>
+                    <a:lnT w="12700" cap="flat" cmpd="sng" algn="ctr">
+                      <a:solidFill>
+                        <a:schemeClr val="tx1"/>
+                      </a:solidFill>
+                      <a:prstDash val="solid"/>
+                      <a:round/>
+                      <a:headEnd type="none" w="med" len="med"/>
+                      <a:tailEnd type="none" w="med" len="med"/>
+                    </a:lnT>
+                    <a:lnB w="12700" cap="flat" cmpd="sng" algn="ctr">
+                      <a:solidFill>
+                        <a:schemeClr val="tx1"/>
+                      </a:solidFill>
+                      <a:prstDash val="solid"/>
+                      <a:round/>
+                      <a:headEnd type="none" w="med" len="med"/>
+                      <a:tailEnd type="none" w="med" len="med"/>
+                    </a:lnB>
+                  </a:tcPr>
+                </a:tc>
+                <a:tc>
+                  <a:txBody>
+                    <a:bodyPr/>
+                    <a:lstStyle/>
+                    <a:p>
+                      <a:r>
+                        <a:rPr lang="ru-RU" sz="1600" u="none" dirty="0" smtClean="0">
+                          <a:latin typeface="+mn-lt"/>
+                        </a:rPr>
+                        <a:t>Записывает</a:t>
+                      </a:r>
+                      <a:r>
+                        <a:rPr lang="ru-RU" sz="1600" u="none" baseline="0" dirty="0" smtClean="0">
+                          <a:latin typeface="+mn-lt"/>
+                        </a:rPr>
+                        <a:t> в </a:t>
+                      </a:r>
+                      <a:r>
+                        <a:rPr lang="en-US" sz="1600" u="none" baseline="0" dirty="0" err="1" smtClean="0">
+                          <a:latin typeface="+mn-lt"/>
+                        </a:rPr>
+                        <a:t>loc</a:t>
+                      </a:r>
+                      <a:r>
+                        <a:rPr lang="en-US" sz="1600" u="none" baseline="0" dirty="0" smtClean="0">
+                          <a:latin typeface="+mn-lt"/>
+                        </a:rPr>
+                        <a:t> </a:t>
+                      </a:r>
+                      <a:r>
+                        <a:rPr lang="ru-RU" sz="1600" u="none" baseline="0" dirty="0" smtClean="0">
+                          <a:latin typeface="+mn-lt"/>
+                        </a:rPr>
+                        <a:t>значение </a:t>
+                      </a:r>
+                      <a:r>
+                        <a:rPr lang="en-US" sz="1600" u="none" baseline="0" dirty="0" smtClean="0">
+                          <a:latin typeface="+mn-lt"/>
+                        </a:rPr>
+                        <a:t>value </a:t>
+                      </a:r>
+                      <a:r>
+                        <a:rPr lang="ru-RU" sz="1600" u="none" baseline="0" dirty="0" smtClean="0">
+                          <a:latin typeface="+mn-lt"/>
+                        </a:rPr>
+                        <a:t>и возвращает предыдущее значение. </a:t>
+                      </a:r>
+                      <a:r>
+                        <a:rPr lang="en-US" sz="1600" u="none" baseline="0" dirty="0" smtClean="0">
+                          <a:latin typeface="+mn-lt"/>
+                        </a:rPr>
+                        <a:t>(</a:t>
+                      </a:r>
+                      <a:r>
+                        <a:rPr lang="en-US" sz="1600" u="none" baseline="0" dirty="0" err="1" smtClean="0">
+                          <a:latin typeface="+mn-lt"/>
+                        </a:rPr>
+                        <a:t>int</a:t>
+                      </a:r>
+                      <a:r>
+                        <a:rPr lang="en-US" sz="1600" u="none" baseline="0" dirty="0" smtClean="0">
+                          <a:latin typeface="+mn-lt"/>
+                        </a:rPr>
+                        <a:t>, long, double, float, </a:t>
+                      </a:r>
+                      <a:r>
+                        <a:rPr lang="en-US" sz="1600" u="none" baseline="0" dirty="0" err="1" smtClean="0">
+                          <a:latin typeface="+mn-lt"/>
+                        </a:rPr>
+                        <a:t>IntPtr</a:t>
+                      </a:r>
+                      <a:r>
+                        <a:rPr lang="en-US" sz="1600" u="none" baseline="0" dirty="0" smtClean="0">
+                          <a:latin typeface="+mn-lt"/>
+                        </a:rPr>
+                        <a:t>, object)</a:t>
+                      </a:r>
+                      <a:endParaRPr lang="en-US" sz="1600" u="none" dirty="0">
+                        <a:latin typeface="+mn-lt"/>
+                      </a:endParaRPr>
+                    </a:p>
+                  </a:txBody>
+                  <a:tcPr marL="82290" marR="82290" marT="41145" marB="41145" anchor="ctr">
+                    <a:lnL w="12700" cap="flat" cmpd="sng" algn="ctr">
+                      <a:solidFill>
+                        <a:schemeClr val="tx1"/>
+                      </a:solidFill>
+                      <a:prstDash val="solid"/>
+                      <a:round/>
+                      <a:headEnd type="none" w="med" len="med"/>
+                      <a:tailEnd type="none" w="med" len="med"/>
+                    </a:lnL>
+                    <a:lnR w="12700" cap="flat" cmpd="sng" algn="ctr">
+                      <a:solidFill>
+                        <a:schemeClr val="tx1"/>
+                      </a:solidFill>
+                      <a:prstDash val="solid"/>
+                      <a:round/>
+                      <a:headEnd type="none" w="med" len="med"/>
+                      <a:tailEnd type="none" w="med" len="med"/>
+                    </a:lnR>
+                    <a:lnT w="12700" cap="flat" cmpd="sng" algn="ctr">
+                      <a:solidFill>
+                        <a:schemeClr val="tx1"/>
+                      </a:solidFill>
+                      <a:prstDash val="solid"/>
+                      <a:round/>
+                      <a:headEnd type="none" w="med" len="med"/>
+                      <a:tailEnd type="none" w="med" len="med"/>
+                    </a:lnT>
+                    <a:lnB w="12700" cap="flat" cmpd="sng" algn="ctr">
+                      <a:solidFill>
+                        <a:schemeClr val="tx1"/>
+                      </a:solidFill>
+                      <a:prstDash val="solid"/>
+                      <a:round/>
+                      <a:headEnd type="none" w="med" len="med"/>
+                      <a:tailEnd type="none" w="med" len="med"/>
+                    </a:lnB>
+                  </a:tcPr>
+                </a:tc>
+              </a:tr>
+              <a:tr h="576032">
+                <a:tc>
+                  <a:txBody>
+                    <a:bodyPr/>
+                    <a:lstStyle/>
+                    <a:p>
+                      <a:r>
+                        <a:rPr lang="en-US" sz="1600" u="none" dirty="0" smtClean="0">
+                          <a:latin typeface="+mn-lt"/>
+                        </a:rPr>
+                        <a:t>Increment(ref</a:t>
+                      </a:r>
+                      <a:r>
+                        <a:rPr lang="en-US" sz="1600" u="none" baseline="0" dirty="0" smtClean="0">
+                          <a:latin typeface="+mn-lt"/>
+                        </a:rPr>
+                        <a:t> </a:t>
+                      </a:r>
+                      <a:r>
+                        <a:rPr lang="en-US" sz="1600" u="none" baseline="0" dirty="0" err="1" smtClean="0">
+                          <a:latin typeface="+mn-lt"/>
+                        </a:rPr>
+                        <a:t>loc</a:t>
+                      </a:r>
+                      <a:r>
+                        <a:rPr lang="en-US" sz="1600" u="none" baseline="0" dirty="0" smtClean="0">
+                          <a:latin typeface="+mn-lt"/>
+                        </a:rPr>
+                        <a:t>)</a:t>
+                      </a:r>
+                      <a:endParaRPr lang="en-US" sz="1600" u="none" dirty="0">
+                        <a:latin typeface="+mn-lt"/>
+                      </a:endParaRPr>
+                    </a:p>
+                  </a:txBody>
+                  <a:tcPr marL="82290" marR="82290" marT="41145" marB="41145" anchor="ctr">
+                    <a:lnL w="12700" cap="flat" cmpd="sng" algn="ctr">
+                      <a:solidFill>
+                        <a:schemeClr val="tx1"/>
+                      </a:solidFill>
+                      <a:prstDash val="solid"/>
+                      <a:round/>
+                      <a:headEnd type="none" w="med" len="med"/>
+                      <a:tailEnd type="none" w="med" len="med"/>
+                    </a:lnL>
+                    <a:lnR w="12700" cap="flat" cmpd="sng" algn="ctr">
+                      <a:solidFill>
+                        <a:schemeClr val="tx1"/>
+                      </a:solidFill>
+                      <a:prstDash val="solid"/>
+                      <a:round/>
+                      <a:headEnd type="none" w="med" len="med"/>
+                      <a:tailEnd type="none" w="med" len="med"/>
+                    </a:lnR>
+                    <a:lnT w="12700" cap="flat" cmpd="sng" algn="ctr">
+                      <a:solidFill>
+                        <a:schemeClr val="tx1"/>
+                      </a:solidFill>
+                      <a:prstDash val="solid"/>
+                      <a:round/>
+                      <a:headEnd type="none" w="med" len="med"/>
+                      <a:tailEnd type="none" w="med" len="med"/>
+                    </a:lnT>
+                    <a:lnB w="12700" cap="flat" cmpd="sng" algn="ctr">
+                      <a:solidFill>
+                        <a:schemeClr val="tx1"/>
+                      </a:solidFill>
+                      <a:prstDash val="solid"/>
+                      <a:round/>
+                      <a:headEnd type="none" w="med" len="med"/>
+                      <a:tailEnd type="none" w="med" len="med"/>
+                    </a:lnB>
+                  </a:tcPr>
+                </a:tc>
+                <a:tc>
+                  <a:txBody>
+                    <a:bodyPr/>
+                    <a:lstStyle/>
+                    <a:p>
+                      <a:r>
+                        <a:rPr lang="ru-RU" sz="1600" u="none" dirty="0" smtClean="0">
+                          <a:latin typeface="+mn-lt"/>
+                        </a:rPr>
+                        <a:t>Увеличение на единицу. </a:t>
+                      </a:r>
+                      <a:r>
+                        <a:rPr lang="ru-RU" sz="1600" u="none" baseline="0" dirty="0" smtClean="0">
+                          <a:latin typeface="+mn-lt"/>
+                        </a:rPr>
+                        <a:t>(</a:t>
+                      </a:r>
+                      <a:r>
+                        <a:rPr lang="en-US" sz="1600" u="none" baseline="0" dirty="0" err="1" smtClean="0">
+                          <a:latin typeface="+mn-lt"/>
+                        </a:rPr>
+                        <a:t>int</a:t>
+                      </a:r>
+                      <a:r>
+                        <a:rPr lang="en-US" sz="1600" u="none" baseline="0" dirty="0" smtClean="0">
+                          <a:latin typeface="+mn-lt"/>
+                        </a:rPr>
+                        <a:t>, long)</a:t>
+                      </a:r>
+                      <a:endParaRPr lang="en-US" sz="1600" u="none" dirty="0">
+                        <a:latin typeface="+mn-lt"/>
+                      </a:endParaRPr>
+                    </a:p>
+                  </a:txBody>
+                  <a:tcPr marL="82290" marR="82290" marT="41145" marB="41145" anchor="ctr">
+                    <a:lnL w="12700" cap="flat" cmpd="sng" algn="ctr">
+                      <a:solidFill>
+                        <a:schemeClr val="tx1"/>
+                      </a:solidFill>
+                      <a:prstDash val="solid"/>
+                      <a:round/>
+                      <a:headEnd type="none" w="med" len="med"/>
+                      <a:tailEnd type="none" w="med" len="med"/>
+                    </a:lnL>
+                    <a:lnR w="12700" cap="flat" cmpd="sng" algn="ctr">
+                      <a:solidFill>
+                        <a:schemeClr val="tx1"/>
+                      </a:solidFill>
+                      <a:prstDash val="solid"/>
+                      <a:round/>
+                      <a:headEnd type="none" w="med" len="med"/>
+                      <a:tailEnd type="none" w="med" len="med"/>
+                    </a:lnR>
+                    <a:lnT w="12700" cap="flat" cmpd="sng" algn="ctr">
+                      <a:solidFill>
+                        <a:schemeClr val="tx1"/>
+                      </a:solidFill>
+                      <a:prstDash val="solid"/>
+                      <a:round/>
+                      <a:headEnd type="none" w="med" len="med"/>
+                      <a:tailEnd type="none" w="med" len="med"/>
+                    </a:lnT>
+                    <a:lnB w="12700" cap="flat" cmpd="sng" algn="ctr">
+                      <a:solidFill>
+                        <a:schemeClr val="tx1"/>
+                      </a:solidFill>
+                      <a:prstDash val="solid"/>
+                      <a:round/>
+                      <a:headEnd type="none" w="med" len="med"/>
+                      <a:tailEnd type="none" w="med" len="med"/>
+                    </a:lnB>
+                  </a:tcPr>
+                </a:tc>
+              </a:tr>
+              <a:tr h="576032">
+                <a:tc>
+                  <a:txBody>
+                    <a:bodyPr/>
+                    <a:lstStyle/>
+                    <a:p>
+                      <a:r>
+                        <a:rPr lang="en-US" sz="1600" u="none" dirty="0" smtClean="0">
+                          <a:latin typeface="+mn-lt"/>
+                        </a:rPr>
+                        <a:t>long</a:t>
+                      </a:r>
+                      <a:r>
+                        <a:rPr lang="en-US" sz="1600" u="none" baseline="0" dirty="0" smtClean="0">
+                          <a:latin typeface="+mn-lt"/>
+                        </a:rPr>
+                        <a:t> Read(ref long </a:t>
+                      </a:r>
+                      <a:r>
+                        <a:rPr lang="en-US" sz="1600" u="none" baseline="0" dirty="0" err="1" smtClean="0">
+                          <a:latin typeface="+mn-lt"/>
+                        </a:rPr>
+                        <a:t>loc</a:t>
+                      </a:r>
+                      <a:r>
+                        <a:rPr lang="en-US" sz="1600" u="none" baseline="0" dirty="0" smtClean="0">
+                          <a:latin typeface="+mn-lt"/>
+                        </a:rPr>
+                        <a:t>)</a:t>
+                      </a:r>
+                      <a:endParaRPr lang="en-US" sz="1600" u="none" dirty="0">
+                        <a:latin typeface="+mn-lt"/>
+                      </a:endParaRPr>
+                    </a:p>
+                  </a:txBody>
+                  <a:tcPr marL="82290" marR="82290" marT="41145" marB="41145" anchor="ctr">
+                    <a:lnL w="12700" cap="flat" cmpd="sng" algn="ctr">
+                      <a:solidFill>
+                        <a:schemeClr val="tx1"/>
+                      </a:solidFill>
+                      <a:prstDash val="solid"/>
+                      <a:round/>
+                      <a:headEnd type="none" w="med" len="med"/>
+                      <a:tailEnd type="none" w="med" len="med"/>
+                    </a:lnL>
+                    <a:lnR w="12700" cap="flat" cmpd="sng" algn="ctr">
+                      <a:solidFill>
+                        <a:schemeClr val="tx1"/>
+                      </a:solidFill>
+                      <a:prstDash val="solid"/>
+                      <a:round/>
+                      <a:headEnd type="none" w="med" len="med"/>
+                      <a:tailEnd type="none" w="med" len="med"/>
+                    </a:lnR>
+                    <a:lnT w="12700" cap="flat" cmpd="sng" algn="ctr">
+                      <a:solidFill>
+                        <a:schemeClr val="tx1"/>
+                      </a:solidFill>
+                      <a:prstDash val="solid"/>
+                      <a:round/>
+                      <a:headEnd type="none" w="med" len="med"/>
+                      <a:tailEnd type="none" w="med" len="med"/>
+                    </a:lnT>
+                    <a:lnB w="12700" cap="flat" cmpd="sng" algn="ctr">
+                      <a:solidFill>
+                        <a:schemeClr val="tx1"/>
+                      </a:solidFill>
+                      <a:prstDash val="solid"/>
+                      <a:round/>
+                      <a:headEnd type="none" w="med" len="med"/>
+                      <a:tailEnd type="none" w="med" len="med"/>
+                    </a:lnB>
+                  </a:tcPr>
+                </a:tc>
+                <a:tc>
+                  <a:txBody>
+                    <a:bodyPr/>
+                    <a:lstStyle/>
+                    <a:p>
+                      <a:r>
+                        <a:rPr lang="ru-RU" sz="1600" u="none" dirty="0" smtClean="0">
+                          <a:latin typeface="+mn-lt"/>
+                        </a:rPr>
+                        <a:t>Чтение</a:t>
+                      </a:r>
+                      <a:r>
+                        <a:rPr lang="ru-RU" sz="1600" u="none" baseline="0" dirty="0" smtClean="0">
+                          <a:latin typeface="+mn-lt"/>
+                        </a:rPr>
+                        <a:t> 64-х битного значения. Необходимо только на 32-х разрядных процессорах т.к. на 64-х битных процессорах это чтение является атомарным.</a:t>
+                      </a:r>
+                      <a:endParaRPr lang="en-US" sz="1600" u="none" dirty="0">
+                        <a:latin typeface="+mn-lt"/>
+                      </a:endParaRPr>
+                    </a:p>
+                  </a:txBody>
+                  <a:tcPr marL="82290" marR="82290" marT="41145" marB="41145" anchor="ctr">
+                    <a:lnL w="12700" cap="flat" cmpd="sng" algn="ctr">
+                      <a:solidFill>
+                        <a:schemeClr val="tx1"/>
+                      </a:solidFill>
+                      <a:prstDash val="solid"/>
+                      <a:round/>
+                      <a:headEnd type="none" w="med" len="med"/>
+                      <a:tailEnd type="none" w="med" len="med"/>
+                    </a:lnL>
+                    <a:lnR w="12700" cap="flat" cmpd="sng" algn="ctr">
+                      <a:solidFill>
+                        <a:schemeClr val="tx1"/>
+                      </a:solidFill>
+                      <a:prstDash val="solid"/>
+                      <a:round/>
+                      <a:headEnd type="none" w="med" len="med"/>
+                      <a:tailEnd type="none" w="med" len="med"/>
+                    </a:lnR>
+                    <a:lnT w="12700" cap="flat" cmpd="sng" algn="ctr">
+                      <a:solidFill>
+                        <a:schemeClr val="tx1"/>
+                      </a:solidFill>
+                      <a:prstDash val="solid"/>
+                      <a:round/>
+                      <a:headEnd type="none" w="med" len="med"/>
+                      <a:tailEnd type="none" w="med" len="med"/>
+                    </a:lnT>
+                    <a:lnB w="12700" cap="flat" cmpd="sng" algn="ctr">
+                      <a:solidFill>
+                        <a:schemeClr val="tx1"/>
+                      </a:solidFill>
+                      <a:prstDash val="solid"/>
+                      <a:round/>
+                      <a:headEnd type="none" w="med" len="med"/>
+                      <a:tailEnd type="none" w="med" len="med"/>
+                    </a:lnB>
+                  </a:tcPr>
+                </a:tc>
+              </a:tr>
+            </a:tbl>
+          </a:graphicData>
+        </a:graphic>
+      </p:graphicFrame>
     </p:spTree>
     <p:extLst>
       <p:ext uri="{BB962C8B-B14F-4D97-AF65-F5344CB8AC3E}">
-        <p14:creationId xmlns:p14="http://schemas.microsoft.com/office/powerpoint/2010/main" val="205154942"/>
+        <p14:creationId xmlns:p14="http://schemas.microsoft.com/office/powerpoint/2010/main" val="2185228848"/>
       </p:ext>
     </p:extLst>
   </p:cSld>
@@ -10382,7 +11373,7 @@
       </p:grpSpPr>
       <p:sp>
         <p:nvSpPr>
-          <p:cNvPr id="15362" name="Rectangle 3"/>
+          <p:cNvPr id="14338" name="Rectangle 3"/>
           <p:cNvSpPr>
             <a:spLocks noChangeArrowheads="1"/>
           </p:cNvSpPr>
@@ -10429,7 +11420,7 @@
             <a:pPr algn="ctr"/>
             <a:r>
               <a:rPr lang="ru-RU" sz="2400" b="1"/>
-              <a:t>Асинхронный вызов методов.</a:t>
+              <a:t>Синхронизация на основе подачи сигналов</a:t>
             </a:r>
             <a:endParaRPr lang="ru-RU" sz="2400" b="1">
               <a:solidFill>
@@ -10442,7 +11433,7 @@
       </p:sp>
       <p:sp>
         <p:nvSpPr>
-          <p:cNvPr id="15363" name="Rectangle 3"/>
+          <p:cNvPr id="14339" name="Rectangle 3"/>
           <p:cNvSpPr>
             <a:spLocks noChangeArrowheads="1"/>
           </p:cNvSpPr>
@@ -10451,7 +11442,7 @@
         <p:spPr bwMode="auto">
           <a:xfrm>
             <a:off x="152400" y="457200"/>
-            <a:ext cx="8839200" cy="1077913"/>
+            <a:ext cx="8839200" cy="3292475"/>
           </a:xfrm>
           <a:prstGeom prst="rect">
             <a:avLst/>
@@ -10488,31 +11479,81 @@
           <a:p>
             <a:r>
               <a:rPr lang="ru-RU" sz="1600"/>
-              <a:t>	Для асинхронного вызова методов применяется метод делегата </a:t>
+              <a:t>	Потребность в </a:t>
+            </a:r>
+            <a:r>
+              <a:rPr lang="ru-RU" sz="1600" i="1"/>
+              <a:t>синхронизация на основе подачи сигналов</a:t>
+            </a:r>
+            <a:r>
+              <a:rPr lang="ru-RU" sz="1600"/>
+              <a:t> возникает, когда один поток ждёт прихода уведомления от другого потока. Для осуществления данной синхронизации используется базовый класс </a:t>
             </a:r>
             <a:r>
               <a:rPr lang="en-US" sz="1600" b="1"/>
-              <a:t>BeginInvoke()</a:t>
-            </a:r>
-          </a:p>
-          <a:p>
+              <a:t>EventWaitHandle</a:t>
+            </a:r>
             <a:r>
               <a:rPr lang="ru-RU" sz="1600"/>
-              <a:t>При этом, метод, инкапсулированный в делегате вызывается в собственном потоке.</a:t>
-            </a:r>
-          </a:p>
-          <a:p>
+              <a:t> и его наследники </a:t>
+            </a:r>
+            <a:r>
+              <a:rPr lang="en-US" sz="1600" b="1"/>
+              <a:t>AutoResetEvent</a:t>
+            </a:r>
+            <a:r>
+              <a:rPr lang="en-US" sz="1600"/>
+              <a:t> </a:t>
+            </a:r>
             <a:r>
               <a:rPr lang="ru-RU" sz="1600"/>
-              <a:t>	В качестве параметра в метод </a:t>
+              <a:t>и </a:t>
             </a:r>
             <a:r>
               <a:rPr lang="en-US" sz="1600" b="1"/>
-              <a:t>BeginInvoke()</a:t>
+              <a:t>ManualResetEvent</a:t>
             </a:r>
             <a:r>
               <a:rPr lang="ru-RU" sz="1600"/>
-              <a:t>  также можно передать делегат на метод, который будет вызван при завершении работы асинхронно вызванного метода.</a:t>
+              <a:t>. Имея доступ к объекту указанных классов, поток может вызвать его метод </a:t>
+            </a:r>
+            <a:r>
+              <a:rPr lang="ru-RU" sz="1600" b="1"/>
+              <a:t>WaitOne()</a:t>
+            </a:r>
+            <a:r>
+              <a:rPr lang="ru-RU" sz="1600"/>
+              <a:t>, чтобы остановиться и ждать сигнала. Для отправки сигнала применяется вызов метода </a:t>
+            </a:r>
+            <a:r>
+              <a:rPr lang="ru-RU" sz="1600" b="1"/>
+              <a:t>Set()</a:t>
+            </a:r>
+            <a:r>
+              <a:rPr lang="ru-RU" sz="1600"/>
+              <a:t>. Если используется </a:t>
+            </a:r>
+            <a:r>
+              <a:rPr lang="en-US" sz="1600" b="1"/>
+              <a:t>ManualResetEvent</a:t>
+            </a:r>
+            <a:r>
+              <a:rPr lang="ru-RU" sz="1600"/>
+              <a:t>, то все потоки, ожидающие сигнал, освобождаются и продолжают выполнение. При использовании </a:t>
+            </a:r>
+            <a:r>
+              <a:rPr lang="en-US" sz="1600" b="1"/>
+              <a:t>AutoResetEvent</a:t>
+            </a:r>
+            <a:r>
+              <a:rPr lang="ru-RU" sz="1600"/>
+              <a:t> ожидающие потоки освобождаются и запускаются последовательно, на манер очереди.</a:t>
+            </a:r>
+          </a:p>
+          <a:p>
+            <a:r>
+              <a:rPr lang="ru-RU" sz="1600"/>
+              <a:t>	 В качестве примера использования сигналов опишем шаблон проектирования «поставщик-потребитель». Данный шаблон представляет собой очередь, в которую независимые потоки (поставщики) помещают объекты, а один поток извлекает объекты и выполняет с ними заданное действие.</a:t>
             </a:r>
             <a:endParaRPr lang="be-BY" sz="1600"/>
           </a:p>
@@ -10520,7 +11561,7 @@
       </p:sp>
       <p:sp>
         <p:nvSpPr>
-          <p:cNvPr id="39938" name="Rectangle 2"/>
+          <p:cNvPr id="14340" name="Rectangle 3"/>
           <p:cNvSpPr>
             <a:spLocks noChangeArrowheads="1"/>
           </p:cNvSpPr>
@@ -10528,543 +11569,8 @@
         </p:nvSpPr>
         <p:spPr bwMode="auto">
           <a:xfrm>
-            <a:off x="152400" y="1600200"/>
-            <a:ext cx="8839200" cy="3894138"/>
-          </a:xfrm>
-          <a:prstGeom prst="rect">
-            <a:avLst/>
-          </a:prstGeom>
-          <a:noFill/>
-          <a:ln w="9525">
-            <a:solidFill>
-              <a:schemeClr val="bg1">
-                <a:lumMod val="65000"/>
-              </a:schemeClr>
-            </a:solidFill>
-            <a:miter lim="800000"/>
-            <a:headEnd/>
-            <a:tailEnd/>
-          </a:ln>
-          <a:effectLst/>
-        </p:spPr>
-        <p:txBody>
-          <a:bodyPr anchor="ctr">
-            <a:spAutoFit/>
-          </a:bodyPr>
-          <a:lstStyle/>
-          <a:p>
-            <a:pPr eaLnBrk="0" hangingPunct="0">
-              <a:defRPr/>
-            </a:pPr>
-            <a:r>
-              <a:rPr lang="be-BY" sz="1000" dirty="0">
-                <a:solidFill>
-                  <a:schemeClr val="bg1"/>
-                </a:solidFill>
-                <a:latin typeface="Courier New" pitchFamily="49" charset="0"/>
-                <a:ea typeface="Calibri" pitchFamily="34" charset="0"/>
-                <a:cs typeface="Courier New" pitchFamily="49" charset="0"/>
-              </a:rPr>
-              <a:t>        delegate Int64 Calculate(Int64 i);</a:t>
-            </a:r>
-          </a:p>
-          <a:p>
-            <a:pPr eaLnBrk="0" hangingPunct="0">
-              <a:defRPr/>
-            </a:pPr>
-            <a:endParaRPr lang="be-BY" sz="900" dirty="0">
-              <a:solidFill>
-                <a:schemeClr val="bg1"/>
-              </a:solidFill>
-              <a:latin typeface="Arial" pitchFamily="34" charset="0"/>
-            </a:endParaRPr>
-          </a:p>
-          <a:p>
-            <a:pPr eaLnBrk="0" hangingPunct="0">
-              <a:defRPr/>
-            </a:pPr>
-            <a:r>
-              <a:rPr lang="be-BY" sz="1000" dirty="0">
-                <a:solidFill>
-                  <a:schemeClr val="bg1"/>
-                </a:solidFill>
-                <a:latin typeface="Courier New" pitchFamily="49" charset="0"/>
-                <a:ea typeface="Calibri" pitchFamily="34" charset="0"/>
-                <a:cs typeface="Courier New" pitchFamily="49" charset="0"/>
-              </a:rPr>
-              <a:t>        public static Int64 Factorial(Int64 i)</a:t>
-            </a:r>
-            <a:endParaRPr lang="be-BY" sz="900" dirty="0">
-              <a:solidFill>
-                <a:schemeClr val="bg1"/>
-              </a:solidFill>
-              <a:latin typeface="Arial" pitchFamily="34" charset="0"/>
-            </a:endParaRPr>
-          </a:p>
-          <a:p>
-            <a:pPr eaLnBrk="0" hangingPunct="0">
-              <a:defRPr/>
-            </a:pPr>
-            <a:r>
-              <a:rPr lang="be-BY" sz="1000" dirty="0">
-                <a:solidFill>
-                  <a:schemeClr val="bg1"/>
-                </a:solidFill>
-                <a:latin typeface="Courier New" pitchFamily="49" charset="0"/>
-                <a:ea typeface="Calibri" pitchFamily="34" charset="0"/>
-                <a:cs typeface="Courier New" pitchFamily="49" charset="0"/>
-              </a:rPr>
-              <a:t>        {</a:t>
-            </a:r>
-            <a:endParaRPr lang="be-BY" sz="900" dirty="0">
-              <a:solidFill>
-                <a:schemeClr val="bg1"/>
-              </a:solidFill>
-              <a:latin typeface="Arial" pitchFamily="34" charset="0"/>
-            </a:endParaRPr>
-          </a:p>
-          <a:p>
-            <a:pPr eaLnBrk="0" hangingPunct="0">
-              <a:defRPr/>
-            </a:pPr>
-            <a:r>
-              <a:rPr lang="be-BY" sz="1000" dirty="0">
-                <a:solidFill>
-                  <a:schemeClr val="bg1"/>
-                </a:solidFill>
-                <a:latin typeface="Courier New" pitchFamily="49" charset="0"/>
-                <a:ea typeface="Calibri" pitchFamily="34" charset="0"/>
-                <a:cs typeface="Courier New" pitchFamily="49" charset="0"/>
-              </a:rPr>
-              <a:t>            Int64 f = 1;</a:t>
-            </a:r>
-            <a:endParaRPr lang="be-BY" sz="900" dirty="0">
-              <a:solidFill>
-                <a:schemeClr val="bg1"/>
-              </a:solidFill>
-              <a:latin typeface="Arial" pitchFamily="34" charset="0"/>
-            </a:endParaRPr>
-          </a:p>
-          <a:p>
-            <a:pPr eaLnBrk="0" hangingPunct="0">
-              <a:defRPr/>
-            </a:pPr>
-            <a:r>
-              <a:rPr lang="be-BY" sz="1000" dirty="0">
-                <a:solidFill>
-                  <a:schemeClr val="bg1"/>
-                </a:solidFill>
-                <a:latin typeface="Courier New" pitchFamily="49" charset="0"/>
-                <a:ea typeface="Calibri" pitchFamily="34" charset="0"/>
-                <a:cs typeface="Courier New" pitchFamily="49" charset="0"/>
-              </a:rPr>
-              <a:t>            for (int t = 2; t &lt;= i; t++)</a:t>
-            </a:r>
-            <a:endParaRPr lang="be-BY" sz="900" dirty="0">
-              <a:solidFill>
-                <a:schemeClr val="bg1"/>
-              </a:solidFill>
-              <a:latin typeface="Arial" pitchFamily="34" charset="0"/>
-            </a:endParaRPr>
-          </a:p>
-          <a:p>
-            <a:pPr eaLnBrk="0" hangingPunct="0">
-              <a:defRPr/>
-            </a:pPr>
-            <a:r>
-              <a:rPr lang="be-BY" sz="1000" dirty="0">
-                <a:solidFill>
-                  <a:schemeClr val="bg1"/>
-                </a:solidFill>
-                <a:latin typeface="Courier New" pitchFamily="49" charset="0"/>
-                <a:ea typeface="Calibri" pitchFamily="34" charset="0"/>
-                <a:cs typeface="Courier New" pitchFamily="49" charset="0"/>
-              </a:rPr>
-              <a:t>            {</a:t>
-            </a:r>
-            <a:endParaRPr lang="be-BY" sz="900" dirty="0">
-              <a:solidFill>
-                <a:schemeClr val="bg1"/>
-              </a:solidFill>
-              <a:latin typeface="Arial" pitchFamily="34" charset="0"/>
-            </a:endParaRPr>
-          </a:p>
-          <a:p>
-            <a:pPr eaLnBrk="0" hangingPunct="0">
-              <a:defRPr/>
-            </a:pPr>
-            <a:r>
-              <a:rPr lang="be-BY" sz="1000" dirty="0">
-                <a:solidFill>
-                  <a:schemeClr val="bg1"/>
-                </a:solidFill>
-                <a:latin typeface="Courier New" pitchFamily="49" charset="0"/>
-                <a:ea typeface="Calibri" pitchFamily="34" charset="0"/>
-                <a:cs typeface="Courier New" pitchFamily="49" charset="0"/>
-              </a:rPr>
-              <a:t>                f *= t;</a:t>
-            </a:r>
-            <a:endParaRPr lang="be-BY" sz="900" dirty="0">
-              <a:solidFill>
-                <a:schemeClr val="bg1"/>
-              </a:solidFill>
-              <a:latin typeface="Arial" pitchFamily="34" charset="0"/>
-            </a:endParaRPr>
-          </a:p>
-          <a:p>
-            <a:pPr eaLnBrk="0" hangingPunct="0">
-              <a:defRPr/>
-            </a:pPr>
-            <a:r>
-              <a:rPr lang="be-BY" sz="1000" dirty="0">
-                <a:solidFill>
-                  <a:schemeClr val="bg1"/>
-                </a:solidFill>
-                <a:latin typeface="Courier New" pitchFamily="49" charset="0"/>
-                <a:ea typeface="Calibri" pitchFamily="34" charset="0"/>
-                <a:cs typeface="Courier New" pitchFamily="49" charset="0"/>
-              </a:rPr>
-              <a:t>                Thread.Sleep(100);</a:t>
-            </a:r>
-            <a:endParaRPr lang="be-BY" sz="900" dirty="0">
-              <a:solidFill>
-                <a:schemeClr val="bg1"/>
-              </a:solidFill>
-              <a:latin typeface="Arial" pitchFamily="34" charset="0"/>
-            </a:endParaRPr>
-          </a:p>
-          <a:p>
-            <a:pPr eaLnBrk="0" hangingPunct="0">
-              <a:defRPr/>
-            </a:pPr>
-            <a:r>
-              <a:rPr lang="be-BY" sz="1000" dirty="0">
-                <a:solidFill>
-                  <a:schemeClr val="bg1"/>
-                </a:solidFill>
-                <a:latin typeface="Courier New" pitchFamily="49" charset="0"/>
-                <a:ea typeface="Calibri" pitchFamily="34" charset="0"/>
-                <a:cs typeface="Courier New" pitchFamily="49" charset="0"/>
-              </a:rPr>
-              <a:t>            }</a:t>
-            </a:r>
-            <a:endParaRPr lang="be-BY" sz="900" dirty="0">
-              <a:solidFill>
-                <a:schemeClr val="bg1"/>
-              </a:solidFill>
-              <a:latin typeface="Arial" pitchFamily="34" charset="0"/>
-            </a:endParaRPr>
-          </a:p>
-          <a:p>
-            <a:pPr eaLnBrk="0" hangingPunct="0">
-              <a:defRPr/>
-            </a:pPr>
-            <a:r>
-              <a:rPr lang="be-BY" sz="1000" dirty="0">
-                <a:solidFill>
-                  <a:schemeClr val="bg1"/>
-                </a:solidFill>
-                <a:latin typeface="Courier New" pitchFamily="49" charset="0"/>
-                <a:ea typeface="Calibri" pitchFamily="34" charset="0"/>
-                <a:cs typeface="Courier New" pitchFamily="49" charset="0"/>
-              </a:rPr>
-              <a:t>            Console.WriteLine("{0}! = {1}", i, f);</a:t>
-            </a:r>
-            <a:endParaRPr lang="be-BY" sz="900" dirty="0">
-              <a:solidFill>
-                <a:schemeClr val="bg1"/>
-              </a:solidFill>
-              <a:latin typeface="Arial" pitchFamily="34" charset="0"/>
-            </a:endParaRPr>
-          </a:p>
-          <a:p>
-            <a:pPr eaLnBrk="0" hangingPunct="0">
-              <a:defRPr/>
-            </a:pPr>
-            <a:r>
-              <a:rPr lang="be-BY" sz="1000" dirty="0">
-                <a:solidFill>
-                  <a:schemeClr val="bg1"/>
-                </a:solidFill>
-                <a:latin typeface="Courier New" pitchFamily="49" charset="0"/>
-                <a:ea typeface="Calibri" pitchFamily="34" charset="0"/>
-                <a:cs typeface="Courier New" pitchFamily="49" charset="0"/>
-              </a:rPr>
-              <a:t>            return f;</a:t>
-            </a:r>
-            <a:endParaRPr lang="be-BY" sz="900" dirty="0">
-              <a:solidFill>
-                <a:schemeClr val="bg1"/>
-              </a:solidFill>
-              <a:latin typeface="Arial" pitchFamily="34" charset="0"/>
-            </a:endParaRPr>
-          </a:p>
-          <a:p>
-            <a:pPr eaLnBrk="0" hangingPunct="0">
-              <a:defRPr/>
-            </a:pPr>
-            <a:r>
-              <a:rPr lang="be-BY" sz="1000" dirty="0">
-                <a:solidFill>
-                  <a:schemeClr val="bg1"/>
-                </a:solidFill>
-                <a:latin typeface="Courier New" pitchFamily="49" charset="0"/>
-                <a:ea typeface="Calibri" pitchFamily="34" charset="0"/>
-                <a:cs typeface="Courier New" pitchFamily="49" charset="0"/>
-              </a:rPr>
-              <a:t>        }</a:t>
-            </a:r>
-          </a:p>
-          <a:p>
-            <a:pPr eaLnBrk="0" hangingPunct="0">
-              <a:defRPr/>
-            </a:pPr>
-            <a:endParaRPr lang="be-BY" sz="900" dirty="0">
-              <a:solidFill>
-                <a:schemeClr val="bg1"/>
-              </a:solidFill>
-              <a:latin typeface="Arial" pitchFamily="34" charset="0"/>
-            </a:endParaRPr>
-          </a:p>
-          <a:p>
-            <a:pPr eaLnBrk="0" hangingPunct="0">
-              <a:defRPr/>
-            </a:pPr>
-            <a:r>
-              <a:rPr lang="be-BY" sz="1000" dirty="0">
-                <a:solidFill>
-                  <a:schemeClr val="bg1"/>
-                </a:solidFill>
-                <a:latin typeface="Courier New" pitchFamily="49" charset="0"/>
-                <a:ea typeface="Calibri" pitchFamily="34" charset="0"/>
-                <a:cs typeface="Courier New" pitchFamily="49" charset="0"/>
-              </a:rPr>
-              <a:t>        public static void Main()</a:t>
-            </a:r>
-            <a:endParaRPr lang="be-BY" sz="900" dirty="0">
-              <a:solidFill>
-                <a:schemeClr val="bg1"/>
-              </a:solidFill>
-              <a:latin typeface="Arial" pitchFamily="34" charset="0"/>
-            </a:endParaRPr>
-          </a:p>
-          <a:p>
-            <a:pPr eaLnBrk="0" hangingPunct="0">
-              <a:defRPr/>
-            </a:pPr>
-            <a:r>
-              <a:rPr lang="be-BY" sz="1000" dirty="0">
-                <a:solidFill>
-                  <a:schemeClr val="bg1"/>
-                </a:solidFill>
-                <a:latin typeface="Courier New" pitchFamily="49" charset="0"/>
-                <a:ea typeface="Calibri" pitchFamily="34" charset="0"/>
-                <a:cs typeface="Courier New" pitchFamily="49" charset="0"/>
-              </a:rPr>
-              <a:t>        {</a:t>
-            </a:r>
-            <a:endParaRPr lang="be-BY" sz="900" dirty="0">
-              <a:solidFill>
-                <a:schemeClr val="bg1"/>
-              </a:solidFill>
-              <a:latin typeface="Arial" pitchFamily="34" charset="0"/>
-            </a:endParaRPr>
-          </a:p>
-          <a:p>
-            <a:pPr eaLnBrk="0" hangingPunct="0">
-              <a:defRPr/>
-            </a:pPr>
-            <a:r>
-              <a:rPr lang="be-BY" sz="1000" dirty="0">
-                <a:solidFill>
-                  <a:schemeClr val="bg1"/>
-                </a:solidFill>
-                <a:latin typeface="Courier New" pitchFamily="49" charset="0"/>
-                <a:ea typeface="Calibri" pitchFamily="34" charset="0"/>
-                <a:cs typeface="Courier New" pitchFamily="49" charset="0"/>
-              </a:rPr>
-              <a:t>            Calculate calc = Factorial;</a:t>
-            </a:r>
-            <a:endParaRPr lang="be-BY" sz="900" dirty="0">
-              <a:solidFill>
-                <a:schemeClr val="bg1"/>
-              </a:solidFill>
-              <a:latin typeface="Arial" pitchFamily="34" charset="0"/>
-            </a:endParaRPr>
-          </a:p>
-          <a:p>
-            <a:pPr eaLnBrk="0" hangingPunct="0">
-              <a:defRPr/>
-            </a:pPr>
-            <a:r>
-              <a:rPr lang="be-BY" sz="1000" dirty="0">
-                <a:solidFill>
-                  <a:schemeClr val="bg1"/>
-                </a:solidFill>
-                <a:latin typeface="Courier New" pitchFamily="49" charset="0"/>
-                <a:ea typeface="Calibri" pitchFamily="34" charset="0"/>
-                <a:cs typeface="Courier New" pitchFamily="49" charset="0"/>
-              </a:rPr>
-              <a:t>            calc.BeginInvoke(10, OnCalculatingFinished, null);</a:t>
-            </a:r>
-            <a:endParaRPr lang="be-BY" sz="900" dirty="0">
-              <a:solidFill>
-                <a:schemeClr val="bg1"/>
-              </a:solidFill>
-              <a:latin typeface="Arial" pitchFamily="34" charset="0"/>
-            </a:endParaRPr>
-          </a:p>
-          <a:p>
-            <a:pPr eaLnBrk="0" hangingPunct="0">
-              <a:defRPr/>
-            </a:pPr>
-            <a:r>
-              <a:rPr lang="be-BY" sz="1000" dirty="0">
-                <a:solidFill>
-                  <a:schemeClr val="bg1"/>
-                </a:solidFill>
-                <a:latin typeface="Courier New" pitchFamily="49" charset="0"/>
-                <a:ea typeface="Calibri" pitchFamily="34" charset="0"/>
-                <a:cs typeface="Courier New" pitchFamily="49" charset="0"/>
-              </a:rPr>
-              <a:t>            Console.ReadKey();</a:t>
-            </a:r>
-            <a:endParaRPr lang="be-BY" sz="900" dirty="0">
-              <a:solidFill>
-                <a:schemeClr val="bg1"/>
-              </a:solidFill>
-              <a:latin typeface="Arial" pitchFamily="34" charset="0"/>
-            </a:endParaRPr>
-          </a:p>
-          <a:p>
-            <a:pPr eaLnBrk="0" hangingPunct="0">
-              <a:defRPr/>
-            </a:pPr>
-            <a:r>
-              <a:rPr lang="be-BY" sz="1000" dirty="0">
-                <a:solidFill>
-                  <a:schemeClr val="bg1"/>
-                </a:solidFill>
-                <a:latin typeface="Courier New" pitchFamily="49" charset="0"/>
-                <a:ea typeface="Calibri" pitchFamily="34" charset="0"/>
-                <a:cs typeface="Courier New" pitchFamily="49" charset="0"/>
-              </a:rPr>
-              <a:t>        }</a:t>
-            </a:r>
-          </a:p>
-          <a:p>
-            <a:pPr eaLnBrk="0" hangingPunct="0">
-              <a:defRPr/>
-            </a:pPr>
-            <a:endParaRPr lang="be-BY" sz="900" dirty="0">
-              <a:solidFill>
-                <a:schemeClr val="bg1"/>
-              </a:solidFill>
-              <a:latin typeface="Arial" pitchFamily="34" charset="0"/>
-            </a:endParaRPr>
-          </a:p>
-          <a:p>
-            <a:pPr eaLnBrk="0" hangingPunct="0">
-              <a:defRPr/>
-            </a:pPr>
-            <a:r>
-              <a:rPr lang="be-BY" sz="1000" dirty="0">
-                <a:solidFill>
-                  <a:schemeClr val="bg1"/>
-                </a:solidFill>
-                <a:latin typeface="Courier New" pitchFamily="49" charset="0"/>
-                <a:ea typeface="Calibri" pitchFamily="34" charset="0"/>
-                <a:cs typeface="Courier New" pitchFamily="49" charset="0"/>
-              </a:rPr>
-              <a:t>        public static void OnCalculatingFinished(IAsyncResult res)</a:t>
-            </a:r>
-            <a:endParaRPr lang="be-BY" sz="900" dirty="0">
-              <a:solidFill>
-                <a:schemeClr val="bg1"/>
-              </a:solidFill>
-              <a:latin typeface="Arial" pitchFamily="34" charset="0"/>
-            </a:endParaRPr>
-          </a:p>
-          <a:p>
-            <a:pPr eaLnBrk="0" hangingPunct="0">
-              <a:defRPr/>
-            </a:pPr>
-            <a:r>
-              <a:rPr lang="be-BY" sz="1000" dirty="0">
-                <a:solidFill>
-                  <a:schemeClr val="bg1"/>
-                </a:solidFill>
-                <a:latin typeface="Courier New" pitchFamily="49" charset="0"/>
-                <a:ea typeface="Calibri" pitchFamily="34" charset="0"/>
-                <a:cs typeface="Courier New" pitchFamily="49" charset="0"/>
-              </a:rPr>
-              <a:t>        {</a:t>
-            </a:r>
-            <a:endParaRPr lang="be-BY" sz="900" dirty="0">
-              <a:solidFill>
-                <a:schemeClr val="bg1"/>
-              </a:solidFill>
-              <a:latin typeface="Arial" pitchFamily="34" charset="0"/>
-            </a:endParaRPr>
-          </a:p>
-          <a:p>
-            <a:pPr eaLnBrk="0" hangingPunct="0">
-              <a:defRPr/>
-            </a:pPr>
-            <a:r>
-              <a:rPr lang="be-BY" sz="1000" dirty="0">
-                <a:solidFill>
-                  <a:schemeClr val="bg1"/>
-                </a:solidFill>
-                <a:latin typeface="Courier New" pitchFamily="49" charset="0"/>
-                <a:ea typeface="Calibri" pitchFamily="34" charset="0"/>
-                <a:cs typeface="Courier New" pitchFamily="49" charset="0"/>
-              </a:rPr>
-              <a:t>            Console.WriteLine("Factorial completed!");</a:t>
-            </a:r>
-            <a:endParaRPr lang="be-BY" sz="900" dirty="0">
-              <a:solidFill>
-                <a:schemeClr val="bg1"/>
-              </a:solidFill>
-              <a:latin typeface="Arial" pitchFamily="34" charset="0"/>
-            </a:endParaRPr>
-          </a:p>
-          <a:p>
-            <a:pPr eaLnBrk="0" hangingPunct="0">
-              <a:defRPr/>
-            </a:pPr>
-            <a:r>
-              <a:rPr lang="be-BY" sz="1000" dirty="0">
-                <a:solidFill>
-                  <a:schemeClr val="bg1"/>
-                </a:solidFill>
-                <a:latin typeface="Courier New" pitchFamily="49" charset="0"/>
-                <a:ea typeface="Calibri" pitchFamily="34" charset="0"/>
-                <a:cs typeface="Courier New" pitchFamily="49" charset="0"/>
-              </a:rPr>
-              <a:t>        }</a:t>
-            </a:r>
-            <a:endParaRPr lang="be-BY" dirty="0">
-              <a:solidFill>
-                <a:schemeClr val="bg1"/>
-              </a:solidFill>
-              <a:latin typeface="Arial" pitchFamily="34" charset="0"/>
-            </a:endParaRPr>
-          </a:p>
-        </p:txBody>
-      </p:sp>
-      <p:sp>
-        <p:nvSpPr>
-          <p:cNvPr id="15365" name="Rectangle 3"/>
-          <p:cNvSpPr>
-            <a:spLocks noChangeArrowheads="1"/>
-          </p:cNvSpPr>
-          <p:nvPr/>
-        </p:nvSpPr>
-        <p:spPr bwMode="auto">
-          <a:xfrm>
-            <a:off x="152400" y="5638800"/>
-            <a:ext cx="8839200" cy="830263"/>
+            <a:off x="152400" y="3886200"/>
+            <a:ext cx="8839200" cy="338138"/>
           </a:xfrm>
           <a:prstGeom prst="rect">
             <a:avLst/>
@@ -11099,71 +11605,21 @@
           </a:bodyPr>
           <a:lstStyle/>
           <a:p>
-            <a:r>
-              <a:rPr lang="en-US" sz="1600" dirty="0"/>
-              <a:t>	</a:t>
-            </a:r>
-            <a:r>
-              <a:rPr lang="ru-RU" sz="1600" dirty="0"/>
-              <a:t>Метод  </a:t>
-            </a:r>
-            <a:r>
-              <a:rPr lang="be-BY" sz="1600" dirty="0">
-                <a:latin typeface="Courier New" pitchFamily="49" charset="0"/>
-                <a:ea typeface="Calibri" pitchFamily="34" charset="0"/>
-                <a:cs typeface="Courier New" pitchFamily="49" charset="0"/>
-              </a:rPr>
-              <a:t>BeginInvoke</a:t>
-            </a:r>
-            <a:r>
-              <a:rPr lang="be-BY" sz="1600" b="1" dirty="0">
-                <a:latin typeface="Courier New" pitchFamily="49" charset="0"/>
-                <a:ea typeface="Calibri" pitchFamily="34" charset="0"/>
-                <a:cs typeface="Courier New" pitchFamily="49" charset="0"/>
-              </a:rPr>
-              <a:t> </a:t>
-            </a:r>
-            <a:r>
-              <a:rPr lang="ru-RU" sz="1600" dirty="0"/>
-              <a:t>возвращает объект типа </a:t>
-            </a:r>
-            <a:r>
-              <a:rPr lang="be-BY" sz="1600" dirty="0">
-                <a:solidFill>
-                  <a:schemeClr val="bg1"/>
-                </a:solidFill>
-                <a:latin typeface="Courier New" pitchFamily="49" charset="0"/>
-                <a:cs typeface="Calibri" pitchFamily="34" charset="0"/>
-              </a:rPr>
-              <a:t>IAsyncResult</a:t>
-            </a:r>
-            <a:r>
-              <a:rPr lang="en-US" sz="1600" dirty="0">
-                <a:latin typeface="Courier New" pitchFamily="49" charset="0"/>
-                <a:cs typeface="Calibri" pitchFamily="34" charset="0"/>
-              </a:rPr>
-              <a:t>. </a:t>
-            </a:r>
-            <a:r>
-              <a:rPr lang="ru-RU" sz="1600" dirty="0"/>
-              <a:t>Используя его свойство </a:t>
-            </a:r>
-            <a:r>
-              <a:rPr lang="en-US" sz="1600" b="1" dirty="0" err="1"/>
-              <a:t>IsCompleated</a:t>
-            </a:r>
-            <a:r>
-              <a:rPr lang="ru-RU" sz="1600" dirty="0"/>
-              <a:t> можно узнать, завершилось ли выполнение асинхронно вызванного метода.</a:t>
-            </a:r>
-            <a:endParaRPr lang="be-BY" sz="1600" dirty="0"/>
+            <a:pPr algn="ctr"/>
+            <a:r>
+              <a:rPr lang="ru-RU" sz="1600">
+                <a:hlinkClick r:id="rId2" action="ppaction://hlinkfile"/>
+              </a:rPr>
+              <a:t>Код класса поставщик-потребитель</a:t>
+            </a:r>
+            <a:endParaRPr lang="be-BY" sz="1600"/>
           </a:p>
         </p:txBody>
       </p:sp>
     </p:spTree>
     <p:extLst>
       <p:ext uri="{BB962C8B-B14F-4D97-AF65-F5344CB8AC3E}">
-        <p14:creationId xmlns:p14="http://schemas.microsoft.com/office/powerpoint/2010/main" val="3557299335"/>
+        <p14:creationId xmlns:p14="http://schemas.microsoft.com/office/powerpoint/2010/main" val="205154942"/>
       </p:ext>
     </p:extLst>
   </p:cSld>
@@ -11294,10 +11750,2349 @@
   <p:clrMapOvr>
     <a:masterClrMapping/>
   </p:clrMapOvr>
+  <p:timing>
+    <p:tnLst>
+      <p:par>
+        <p:cTn id="1" dur="indefinite" restart="never" nodeType="tmRoot"/>
+      </p:par>
+    </p:tnLst>
+  </p:timing>
 </p:sld>
 </file>
 
 <file path=ppt/slides/slide20.xml><?xml version="1.0" encoding="utf-8"?>
+<p:sld xmlns:a="http://schemas.openxmlformats.org/drawingml/2006/main" xmlns:r="http://schemas.openxmlformats.org/officeDocument/2006/relationships" xmlns:p="http://schemas.openxmlformats.org/presentationml/2006/main">
+  <p:cSld>
+    <p:spTree>
+      <p:nvGrpSpPr>
+        <p:cNvPr id="1" name=""/>
+        <p:cNvGrpSpPr/>
+        <p:nvPr/>
+      </p:nvGrpSpPr>
+      <p:grpSpPr>
+        <a:xfrm>
+          <a:off x="0" y="0"/>
+          <a:ext cx="0" cy="0"/>
+          <a:chOff x="0" y="0"/>
+          <a:chExt cx="0" cy="0"/>
+        </a:xfrm>
+      </p:grpSpPr>
+      <p:sp>
+        <p:nvSpPr>
+          <p:cNvPr id="15362" name="Rectangle 3"/>
+          <p:cNvSpPr>
+            <a:spLocks noChangeArrowheads="1"/>
+          </p:cNvSpPr>
+          <p:nvPr/>
+        </p:nvSpPr>
+        <p:spPr bwMode="auto">
+          <a:xfrm>
+            <a:off x="152400" y="-4763"/>
+            <a:ext cx="8763000" cy="461963"/>
+          </a:xfrm>
+          <a:prstGeom prst="rect">
+            <a:avLst/>
+          </a:prstGeom>
+          <a:noFill/>
+          <a:ln>
+            <a:noFill/>
+          </a:ln>
+          <a:extLst>
+            <a:ext uri="{909E8E84-426E-40DD-AFC4-6F175D3DCCD1}">
+              <a14:hiddenFill xmlns:a14="http://schemas.microsoft.com/office/drawing/2010/main">
+                <a:solidFill>
+                  <a:srgbClr val="FFFFFF"/>
+                </a:solidFill>
+              </a14:hiddenFill>
+            </a:ext>
+            <a:ext uri="{91240B29-F687-4F45-9708-019B960494DF}">
+              <a14:hiddenLine xmlns:a14="http://schemas.microsoft.com/office/drawing/2010/main" w="9525">
+                <a:solidFill>
+                  <a:srgbClr val="000000"/>
+                </a:solidFill>
+                <a:miter lim="800000"/>
+                <a:headEnd/>
+                <a:tailEnd/>
+              </a14:hiddenLine>
+            </a:ext>
+          </a:extLst>
+        </p:spPr>
+        <p:txBody>
+          <a:bodyPr anchor="ctr">
+            <a:spAutoFit/>
+          </a:bodyPr>
+          <a:lstStyle/>
+          <a:p>
+            <a:pPr algn="ctr"/>
+            <a:r>
+              <a:rPr lang="ru-RU" sz="2400" b="1"/>
+              <a:t>Асинхронный вызов методов.</a:t>
+            </a:r>
+            <a:endParaRPr lang="ru-RU" sz="2400" b="1">
+              <a:solidFill>
+                <a:srgbClr val="000000"/>
+              </a:solidFill>
+              <a:cs typeface="Times New Roman" pitchFamily="18" charset="0"/>
+            </a:endParaRPr>
+          </a:p>
+        </p:txBody>
+      </p:sp>
+      <p:sp>
+        <p:nvSpPr>
+          <p:cNvPr id="15363" name="Rectangle 3"/>
+          <p:cNvSpPr>
+            <a:spLocks noChangeArrowheads="1"/>
+          </p:cNvSpPr>
+          <p:nvPr/>
+        </p:nvSpPr>
+        <p:spPr bwMode="auto">
+          <a:xfrm>
+            <a:off x="152400" y="457200"/>
+            <a:ext cx="8839200" cy="1077913"/>
+          </a:xfrm>
+          <a:prstGeom prst="rect">
+            <a:avLst/>
+          </a:prstGeom>
+          <a:noFill/>
+          <a:ln>
+            <a:noFill/>
+          </a:ln>
+          <a:extLst>
+            <a:ext uri="{909E8E84-426E-40DD-AFC4-6F175D3DCCD1}">
+              <a14:hiddenFill xmlns:a14="http://schemas.microsoft.com/office/drawing/2010/main">
+                <a:solidFill>
+                  <a:srgbClr val="FFFFFF"/>
+                </a:solidFill>
+              </a14:hiddenFill>
+            </a:ext>
+            <a:ext uri="{91240B29-F687-4F45-9708-019B960494DF}">
+              <a14:hiddenLine xmlns:a14="http://schemas.microsoft.com/office/drawing/2010/main" w="9525">
+                <a:solidFill>
+                  <a:srgbClr val="000000"/>
+                </a:solidFill>
+                <a:miter lim="800000"/>
+                <a:headEnd/>
+                <a:tailEnd/>
+              </a14:hiddenLine>
+            </a:ext>
+          </a:extLst>
+        </p:spPr>
+        <p:txBody>
+          <a:bodyPr anchor="ctr">
+            <a:spAutoFit/>
+          </a:bodyPr>
+          <a:lstStyle/>
+          <a:p>
+            <a:r>
+              <a:rPr lang="ru-RU" sz="1600"/>
+              <a:t>	Для асинхронного вызова методов применяется метод делегата </a:t>
+            </a:r>
+            <a:r>
+              <a:rPr lang="en-US" sz="1600" b="1"/>
+              <a:t>BeginInvoke()</a:t>
+            </a:r>
+          </a:p>
+          <a:p>
+            <a:r>
+              <a:rPr lang="ru-RU" sz="1600"/>
+              <a:t>При этом, метод, инкапсулированный в делегате вызывается в собственном потоке.</a:t>
+            </a:r>
+          </a:p>
+          <a:p>
+            <a:r>
+              <a:rPr lang="ru-RU" sz="1600"/>
+              <a:t>	В качестве параметра в метод </a:t>
+            </a:r>
+            <a:r>
+              <a:rPr lang="en-US" sz="1600" b="1"/>
+              <a:t>BeginInvoke()</a:t>
+            </a:r>
+            <a:r>
+              <a:rPr lang="ru-RU" sz="1600"/>
+              <a:t>  также можно передать делегат на метод, который будет вызван при завершении работы асинхронно вызванного метода.</a:t>
+            </a:r>
+            <a:endParaRPr lang="be-BY" sz="1600"/>
+          </a:p>
+        </p:txBody>
+      </p:sp>
+      <p:sp>
+        <p:nvSpPr>
+          <p:cNvPr id="39938" name="Rectangle 2"/>
+          <p:cNvSpPr>
+            <a:spLocks noChangeArrowheads="1"/>
+          </p:cNvSpPr>
+          <p:nvPr/>
+        </p:nvSpPr>
+        <p:spPr bwMode="auto">
+          <a:xfrm>
+            <a:off x="152400" y="1600200"/>
+            <a:ext cx="8839200" cy="3894138"/>
+          </a:xfrm>
+          <a:prstGeom prst="rect">
+            <a:avLst/>
+          </a:prstGeom>
+          <a:noFill/>
+          <a:ln w="9525">
+            <a:solidFill>
+              <a:schemeClr val="bg1">
+                <a:lumMod val="65000"/>
+              </a:schemeClr>
+            </a:solidFill>
+            <a:miter lim="800000"/>
+            <a:headEnd/>
+            <a:tailEnd/>
+          </a:ln>
+          <a:effectLst/>
+        </p:spPr>
+        <p:txBody>
+          <a:bodyPr anchor="ctr">
+            <a:spAutoFit/>
+          </a:bodyPr>
+          <a:lstStyle/>
+          <a:p>
+            <a:pPr eaLnBrk="0" hangingPunct="0">
+              <a:defRPr/>
+            </a:pPr>
+            <a:r>
+              <a:rPr lang="be-BY" sz="1000" dirty="0">
+                <a:solidFill>
+                  <a:schemeClr val="bg1"/>
+                </a:solidFill>
+                <a:latin typeface="Courier New" pitchFamily="49" charset="0"/>
+                <a:ea typeface="Calibri" pitchFamily="34" charset="0"/>
+                <a:cs typeface="Courier New" pitchFamily="49" charset="0"/>
+              </a:rPr>
+              <a:t>        delegate Int64 Calculate(Int64 i);</a:t>
+            </a:r>
+          </a:p>
+          <a:p>
+            <a:pPr eaLnBrk="0" hangingPunct="0">
+              <a:defRPr/>
+            </a:pPr>
+            <a:endParaRPr lang="be-BY" sz="900" dirty="0">
+              <a:solidFill>
+                <a:schemeClr val="bg1"/>
+              </a:solidFill>
+              <a:latin typeface="Arial" pitchFamily="34" charset="0"/>
+            </a:endParaRPr>
+          </a:p>
+          <a:p>
+            <a:pPr eaLnBrk="0" hangingPunct="0">
+              <a:defRPr/>
+            </a:pPr>
+            <a:r>
+              <a:rPr lang="be-BY" sz="1000" dirty="0">
+                <a:solidFill>
+                  <a:schemeClr val="bg1"/>
+                </a:solidFill>
+                <a:latin typeface="Courier New" pitchFamily="49" charset="0"/>
+                <a:ea typeface="Calibri" pitchFamily="34" charset="0"/>
+                <a:cs typeface="Courier New" pitchFamily="49" charset="0"/>
+              </a:rPr>
+              <a:t>        public static Int64 Factorial(Int64 i)</a:t>
+            </a:r>
+            <a:endParaRPr lang="be-BY" sz="900" dirty="0">
+              <a:solidFill>
+                <a:schemeClr val="bg1"/>
+              </a:solidFill>
+              <a:latin typeface="Arial" pitchFamily="34" charset="0"/>
+            </a:endParaRPr>
+          </a:p>
+          <a:p>
+            <a:pPr eaLnBrk="0" hangingPunct="0">
+              <a:defRPr/>
+            </a:pPr>
+            <a:r>
+              <a:rPr lang="be-BY" sz="1000" dirty="0">
+                <a:solidFill>
+                  <a:schemeClr val="bg1"/>
+                </a:solidFill>
+                <a:latin typeface="Courier New" pitchFamily="49" charset="0"/>
+                <a:ea typeface="Calibri" pitchFamily="34" charset="0"/>
+                <a:cs typeface="Courier New" pitchFamily="49" charset="0"/>
+              </a:rPr>
+              <a:t>        {</a:t>
+            </a:r>
+            <a:endParaRPr lang="be-BY" sz="900" dirty="0">
+              <a:solidFill>
+                <a:schemeClr val="bg1"/>
+              </a:solidFill>
+              <a:latin typeface="Arial" pitchFamily="34" charset="0"/>
+            </a:endParaRPr>
+          </a:p>
+          <a:p>
+            <a:pPr eaLnBrk="0" hangingPunct="0">
+              <a:defRPr/>
+            </a:pPr>
+            <a:r>
+              <a:rPr lang="be-BY" sz="1000" dirty="0">
+                <a:solidFill>
+                  <a:schemeClr val="bg1"/>
+                </a:solidFill>
+                <a:latin typeface="Courier New" pitchFamily="49" charset="0"/>
+                <a:ea typeface="Calibri" pitchFamily="34" charset="0"/>
+                <a:cs typeface="Courier New" pitchFamily="49" charset="0"/>
+              </a:rPr>
+              <a:t>            Int64 f = 1;</a:t>
+            </a:r>
+            <a:endParaRPr lang="be-BY" sz="900" dirty="0">
+              <a:solidFill>
+                <a:schemeClr val="bg1"/>
+              </a:solidFill>
+              <a:latin typeface="Arial" pitchFamily="34" charset="0"/>
+            </a:endParaRPr>
+          </a:p>
+          <a:p>
+            <a:pPr eaLnBrk="0" hangingPunct="0">
+              <a:defRPr/>
+            </a:pPr>
+            <a:r>
+              <a:rPr lang="be-BY" sz="1000" dirty="0">
+                <a:solidFill>
+                  <a:schemeClr val="bg1"/>
+                </a:solidFill>
+                <a:latin typeface="Courier New" pitchFamily="49" charset="0"/>
+                <a:ea typeface="Calibri" pitchFamily="34" charset="0"/>
+                <a:cs typeface="Courier New" pitchFamily="49" charset="0"/>
+              </a:rPr>
+              <a:t>            for (int t = 2; t &lt;= i; t++)</a:t>
+            </a:r>
+            <a:endParaRPr lang="be-BY" sz="900" dirty="0">
+              <a:solidFill>
+                <a:schemeClr val="bg1"/>
+              </a:solidFill>
+              <a:latin typeface="Arial" pitchFamily="34" charset="0"/>
+            </a:endParaRPr>
+          </a:p>
+          <a:p>
+            <a:pPr eaLnBrk="0" hangingPunct="0">
+              <a:defRPr/>
+            </a:pPr>
+            <a:r>
+              <a:rPr lang="be-BY" sz="1000" dirty="0">
+                <a:solidFill>
+                  <a:schemeClr val="bg1"/>
+                </a:solidFill>
+                <a:latin typeface="Courier New" pitchFamily="49" charset="0"/>
+                <a:ea typeface="Calibri" pitchFamily="34" charset="0"/>
+                <a:cs typeface="Courier New" pitchFamily="49" charset="0"/>
+              </a:rPr>
+              <a:t>            {</a:t>
+            </a:r>
+            <a:endParaRPr lang="be-BY" sz="900" dirty="0">
+              <a:solidFill>
+                <a:schemeClr val="bg1"/>
+              </a:solidFill>
+              <a:latin typeface="Arial" pitchFamily="34" charset="0"/>
+            </a:endParaRPr>
+          </a:p>
+          <a:p>
+            <a:pPr eaLnBrk="0" hangingPunct="0">
+              <a:defRPr/>
+            </a:pPr>
+            <a:r>
+              <a:rPr lang="be-BY" sz="1000" dirty="0">
+                <a:solidFill>
+                  <a:schemeClr val="bg1"/>
+                </a:solidFill>
+                <a:latin typeface="Courier New" pitchFamily="49" charset="0"/>
+                <a:ea typeface="Calibri" pitchFamily="34" charset="0"/>
+                <a:cs typeface="Courier New" pitchFamily="49" charset="0"/>
+              </a:rPr>
+              <a:t>                f *= t;</a:t>
+            </a:r>
+            <a:endParaRPr lang="be-BY" sz="900" dirty="0">
+              <a:solidFill>
+                <a:schemeClr val="bg1"/>
+              </a:solidFill>
+              <a:latin typeface="Arial" pitchFamily="34" charset="0"/>
+            </a:endParaRPr>
+          </a:p>
+          <a:p>
+            <a:pPr eaLnBrk="0" hangingPunct="0">
+              <a:defRPr/>
+            </a:pPr>
+            <a:r>
+              <a:rPr lang="be-BY" sz="1000" dirty="0">
+                <a:solidFill>
+                  <a:schemeClr val="bg1"/>
+                </a:solidFill>
+                <a:latin typeface="Courier New" pitchFamily="49" charset="0"/>
+                <a:ea typeface="Calibri" pitchFamily="34" charset="0"/>
+                <a:cs typeface="Courier New" pitchFamily="49" charset="0"/>
+              </a:rPr>
+              <a:t>                Thread.Sleep(100);</a:t>
+            </a:r>
+            <a:endParaRPr lang="be-BY" sz="900" dirty="0">
+              <a:solidFill>
+                <a:schemeClr val="bg1"/>
+              </a:solidFill>
+              <a:latin typeface="Arial" pitchFamily="34" charset="0"/>
+            </a:endParaRPr>
+          </a:p>
+          <a:p>
+            <a:pPr eaLnBrk="0" hangingPunct="0">
+              <a:defRPr/>
+            </a:pPr>
+            <a:r>
+              <a:rPr lang="be-BY" sz="1000" dirty="0">
+                <a:solidFill>
+                  <a:schemeClr val="bg1"/>
+                </a:solidFill>
+                <a:latin typeface="Courier New" pitchFamily="49" charset="0"/>
+                <a:ea typeface="Calibri" pitchFamily="34" charset="0"/>
+                <a:cs typeface="Courier New" pitchFamily="49" charset="0"/>
+              </a:rPr>
+              <a:t>            }</a:t>
+            </a:r>
+            <a:endParaRPr lang="be-BY" sz="900" dirty="0">
+              <a:solidFill>
+                <a:schemeClr val="bg1"/>
+              </a:solidFill>
+              <a:latin typeface="Arial" pitchFamily="34" charset="0"/>
+            </a:endParaRPr>
+          </a:p>
+          <a:p>
+            <a:pPr eaLnBrk="0" hangingPunct="0">
+              <a:defRPr/>
+            </a:pPr>
+            <a:r>
+              <a:rPr lang="be-BY" sz="1000" dirty="0">
+                <a:solidFill>
+                  <a:schemeClr val="bg1"/>
+                </a:solidFill>
+                <a:latin typeface="Courier New" pitchFamily="49" charset="0"/>
+                <a:ea typeface="Calibri" pitchFamily="34" charset="0"/>
+                <a:cs typeface="Courier New" pitchFamily="49" charset="0"/>
+              </a:rPr>
+              <a:t>            Console.WriteLine("{0}! = {1}", i, f);</a:t>
+            </a:r>
+            <a:endParaRPr lang="be-BY" sz="900" dirty="0">
+              <a:solidFill>
+                <a:schemeClr val="bg1"/>
+              </a:solidFill>
+              <a:latin typeface="Arial" pitchFamily="34" charset="0"/>
+            </a:endParaRPr>
+          </a:p>
+          <a:p>
+            <a:pPr eaLnBrk="0" hangingPunct="0">
+              <a:defRPr/>
+            </a:pPr>
+            <a:r>
+              <a:rPr lang="be-BY" sz="1000" dirty="0">
+                <a:solidFill>
+                  <a:schemeClr val="bg1"/>
+                </a:solidFill>
+                <a:latin typeface="Courier New" pitchFamily="49" charset="0"/>
+                <a:ea typeface="Calibri" pitchFamily="34" charset="0"/>
+                <a:cs typeface="Courier New" pitchFamily="49" charset="0"/>
+              </a:rPr>
+              <a:t>            return f;</a:t>
+            </a:r>
+            <a:endParaRPr lang="be-BY" sz="900" dirty="0">
+              <a:solidFill>
+                <a:schemeClr val="bg1"/>
+              </a:solidFill>
+              <a:latin typeface="Arial" pitchFamily="34" charset="0"/>
+            </a:endParaRPr>
+          </a:p>
+          <a:p>
+            <a:pPr eaLnBrk="0" hangingPunct="0">
+              <a:defRPr/>
+            </a:pPr>
+            <a:r>
+              <a:rPr lang="be-BY" sz="1000" dirty="0">
+                <a:solidFill>
+                  <a:schemeClr val="bg1"/>
+                </a:solidFill>
+                <a:latin typeface="Courier New" pitchFamily="49" charset="0"/>
+                <a:ea typeface="Calibri" pitchFamily="34" charset="0"/>
+                <a:cs typeface="Courier New" pitchFamily="49" charset="0"/>
+              </a:rPr>
+              <a:t>        }</a:t>
+            </a:r>
+          </a:p>
+          <a:p>
+            <a:pPr eaLnBrk="0" hangingPunct="0">
+              <a:defRPr/>
+            </a:pPr>
+            <a:endParaRPr lang="be-BY" sz="900" dirty="0">
+              <a:solidFill>
+                <a:schemeClr val="bg1"/>
+              </a:solidFill>
+              <a:latin typeface="Arial" pitchFamily="34" charset="0"/>
+            </a:endParaRPr>
+          </a:p>
+          <a:p>
+            <a:pPr eaLnBrk="0" hangingPunct="0">
+              <a:defRPr/>
+            </a:pPr>
+            <a:r>
+              <a:rPr lang="be-BY" sz="1000" dirty="0">
+                <a:solidFill>
+                  <a:schemeClr val="bg1"/>
+                </a:solidFill>
+                <a:latin typeface="Courier New" pitchFamily="49" charset="0"/>
+                <a:ea typeface="Calibri" pitchFamily="34" charset="0"/>
+                <a:cs typeface="Courier New" pitchFamily="49" charset="0"/>
+              </a:rPr>
+              <a:t>        public static void Main()</a:t>
+            </a:r>
+            <a:endParaRPr lang="be-BY" sz="900" dirty="0">
+              <a:solidFill>
+                <a:schemeClr val="bg1"/>
+              </a:solidFill>
+              <a:latin typeface="Arial" pitchFamily="34" charset="0"/>
+            </a:endParaRPr>
+          </a:p>
+          <a:p>
+            <a:pPr eaLnBrk="0" hangingPunct="0">
+              <a:defRPr/>
+            </a:pPr>
+            <a:r>
+              <a:rPr lang="be-BY" sz="1000" dirty="0">
+                <a:solidFill>
+                  <a:schemeClr val="bg1"/>
+                </a:solidFill>
+                <a:latin typeface="Courier New" pitchFamily="49" charset="0"/>
+                <a:ea typeface="Calibri" pitchFamily="34" charset="0"/>
+                <a:cs typeface="Courier New" pitchFamily="49" charset="0"/>
+              </a:rPr>
+              <a:t>        {</a:t>
+            </a:r>
+            <a:endParaRPr lang="be-BY" sz="900" dirty="0">
+              <a:solidFill>
+                <a:schemeClr val="bg1"/>
+              </a:solidFill>
+              <a:latin typeface="Arial" pitchFamily="34" charset="0"/>
+            </a:endParaRPr>
+          </a:p>
+          <a:p>
+            <a:pPr eaLnBrk="0" hangingPunct="0">
+              <a:defRPr/>
+            </a:pPr>
+            <a:r>
+              <a:rPr lang="be-BY" sz="1000" dirty="0">
+                <a:solidFill>
+                  <a:schemeClr val="bg1"/>
+                </a:solidFill>
+                <a:latin typeface="Courier New" pitchFamily="49" charset="0"/>
+                <a:ea typeface="Calibri" pitchFamily="34" charset="0"/>
+                <a:cs typeface="Courier New" pitchFamily="49" charset="0"/>
+              </a:rPr>
+              <a:t>            Calculate calc = Factorial;</a:t>
+            </a:r>
+            <a:endParaRPr lang="be-BY" sz="900" dirty="0">
+              <a:solidFill>
+                <a:schemeClr val="bg1"/>
+              </a:solidFill>
+              <a:latin typeface="Arial" pitchFamily="34" charset="0"/>
+            </a:endParaRPr>
+          </a:p>
+          <a:p>
+            <a:pPr eaLnBrk="0" hangingPunct="0">
+              <a:defRPr/>
+            </a:pPr>
+            <a:r>
+              <a:rPr lang="be-BY" sz="1000" dirty="0">
+                <a:solidFill>
+                  <a:schemeClr val="bg1"/>
+                </a:solidFill>
+                <a:latin typeface="Courier New" pitchFamily="49" charset="0"/>
+                <a:ea typeface="Calibri" pitchFamily="34" charset="0"/>
+                <a:cs typeface="Courier New" pitchFamily="49" charset="0"/>
+              </a:rPr>
+              <a:t>            calc.BeginInvoke(10, OnCalculatingFinished, null);</a:t>
+            </a:r>
+            <a:endParaRPr lang="be-BY" sz="900" dirty="0">
+              <a:solidFill>
+                <a:schemeClr val="bg1"/>
+              </a:solidFill>
+              <a:latin typeface="Arial" pitchFamily="34" charset="0"/>
+            </a:endParaRPr>
+          </a:p>
+          <a:p>
+            <a:pPr eaLnBrk="0" hangingPunct="0">
+              <a:defRPr/>
+            </a:pPr>
+            <a:r>
+              <a:rPr lang="be-BY" sz="1000" dirty="0">
+                <a:solidFill>
+                  <a:schemeClr val="bg1"/>
+                </a:solidFill>
+                <a:latin typeface="Courier New" pitchFamily="49" charset="0"/>
+                <a:ea typeface="Calibri" pitchFamily="34" charset="0"/>
+                <a:cs typeface="Courier New" pitchFamily="49" charset="0"/>
+              </a:rPr>
+              <a:t>            Console.ReadKey();</a:t>
+            </a:r>
+            <a:endParaRPr lang="be-BY" sz="900" dirty="0">
+              <a:solidFill>
+                <a:schemeClr val="bg1"/>
+              </a:solidFill>
+              <a:latin typeface="Arial" pitchFamily="34" charset="0"/>
+            </a:endParaRPr>
+          </a:p>
+          <a:p>
+            <a:pPr eaLnBrk="0" hangingPunct="0">
+              <a:defRPr/>
+            </a:pPr>
+            <a:r>
+              <a:rPr lang="be-BY" sz="1000" dirty="0">
+                <a:solidFill>
+                  <a:schemeClr val="bg1"/>
+                </a:solidFill>
+                <a:latin typeface="Courier New" pitchFamily="49" charset="0"/>
+                <a:ea typeface="Calibri" pitchFamily="34" charset="0"/>
+                <a:cs typeface="Courier New" pitchFamily="49" charset="0"/>
+              </a:rPr>
+              <a:t>        }</a:t>
+            </a:r>
+          </a:p>
+          <a:p>
+            <a:pPr eaLnBrk="0" hangingPunct="0">
+              <a:defRPr/>
+            </a:pPr>
+            <a:endParaRPr lang="be-BY" sz="900" dirty="0">
+              <a:solidFill>
+                <a:schemeClr val="bg1"/>
+              </a:solidFill>
+              <a:latin typeface="Arial" pitchFamily="34" charset="0"/>
+            </a:endParaRPr>
+          </a:p>
+          <a:p>
+            <a:pPr eaLnBrk="0" hangingPunct="0">
+              <a:defRPr/>
+            </a:pPr>
+            <a:r>
+              <a:rPr lang="be-BY" sz="1000" dirty="0">
+                <a:solidFill>
+                  <a:schemeClr val="bg1"/>
+                </a:solidFill>
+                <a:latin typeface="Courier New" pitchFamily="49" charset="0"/>
+                <a:ea typeface="Calibri" pitchFamily="34" charset="0"/>
+                <a:cs typeface="Courier New" pitchFamily="49" charset="0"/>
+              </a:rPr>
+              <a:t>        public static void OnCalculatingFinished(IAsyncResult res)</a:t>
+            </a:r>
+            <a:endParaRPr lang="be-BY" sz="900" dirty="0">
+              <a:solidFill>
+                <a:schemeClr val="bg1"/>
+              </a:solidFill>
+              <a:latin typeface="Arial" pitchFamily="34" charset="0"/>
+            </a:endParaRPr>
+          </a:p>
+          <a:p>
+            <a:pPr eaLnBrk="0" hangingPunct="0">
+              <a:defRPr/>
+            </a:pPr>
+            <a:r>
+              <a:rPr lang="be-BY" sz="1000" dirty="0">
+                <a:solidFill>
+                  <a:schemeClr val="bg1"/>
+                </a:solidFill>
+                <a:latin typeface="Courier New" pitchFamily="49" charset="0"/>
+                <a:ea typeface="Calibri" pitchFamily="34" charset="0"/>
+                <a:cs typeface="Courier New" pitchFamily="49" charset="0"/>
+              </a:rPr>
+              <a:t>        {</a:t>
+            </a:r>
+            <a:endParaRPr lang="be-BY" sz="900" dirty="0">
+              <a:solidFill>
+                <a:schemeClr val="bg1"/>
+              </a:solidFill>
+              <a:latin typeface="Arial" pitchFamily="34" charset="0"/>
+            </a:endParaRPr>
+          </a:p>
+          <a:p>
+            <a:pPr eaLnBrk="0" hangingPunct="0">
+              <a:defRPr/>
+            </a:pPr>
+            <a:r>
+              <a:rPr lang="be-BY" sz="1000" dirty="0">
+                <a:solidFill>
+                  <a:schemeClr val="bg1"/>
+                </a:solidFill>
+                <a:latin typeface="Courier New" pitchFamily="49" charset="0"/>
+                <a:ea typeface="Calibri" pitchFamily="34" charset="0"/>
+                <a:cs typeface="Courier New" pitchFamily="49" charset="0"/>
+              </a:rPr>
+              <a:t>            Console.WriteLine("Factorial completed!");</a:t>
+            </a:r>
+            <a:endParaRPr lang="be-BY" sz="900" dirty="0">
+              <a:solidFill>
+                <a:schemeClr val="bg1"/>
+              </a:solidFill>
+              <a:latin typeface="Arial" pitchFamily="34" charset="0"/>
+            </a:endParaRPr>
+          </a:p>
+          <a:p>
+            <a:pPr eaLnBrk="0" hangingPunct="0">
+              <a:defRPr/>
+            </a:pPr>
+            <a:r>
+              <a:rPr lang="be-BY" sz="1000" dirty="0">
+                <a:solidFill>
+                  <a:schemeClr val="bg1"/>
+                </a:solidFill>
+                <a:latin typeface="Courier New" pitchFamily="49" charset="0"/>
+                <a:ea typeface="Calibri" pitchFamily="34" charset="0"/>
+                <a:cs typeface="Courier New" pitchFamily="49" charset="0"/>
+              </a:rPr>
+              <a:t>        }</a:t>
+            </a:r>
+            <a:endParaRPr lang="be-BY" dirty="0">
+              <a:solidFill>
+                <a:schemeClr val="bg1"/>
+              </a:solidFill>
+              <a:latin typeface="Arial" pitchFamily="34" charset="0"/>
+            </a:endParaRPr>
+          </a:p>
+        </p:txBody>
+      </p:sp>
+      <p:sp>
+        <p:nvSpPr>
+          <p:cNvPr id="15365" name="Rectangle 3"/>
+          <p:cNvSpPr>
+            <a:spLocks noChangeArrowheads="1"/>
+          </p:cNvSpPr>
+          <p:nvPr/>
+        </p:nvSpPr>
+        <p:spPr bwMode="auto">
+          <a:xfrm>
+            <a:off x="152400" y="5638800"/>
+            <a:ext cx="8839200" cy="830263"/>
+          </a:xfrm>
+          <a:prstGeom prst="rect">
+            <a:avLst/>
+          </a:prstGeom>
+          <a:noFill/>
+          <a:ln>
+            <a:noFill/>
+          </a:ln>
+          <a:extLst>
+            <a:ext uri="{909E8E84-426E-40DD-AFC4-6F175D3DCCD1}">
+              <a14:hiddenFill xmlns:a14="http://schemas.microsoft.com/office/drawing/2010/main">
+                <a:solidFill>
+                  <a:srgbClr val="FFFFFF"/>
+                </a:solidFill>
+              </a14:hiddenFill>
+            </a:ext>
+            <a:ext uri="{91240B29-F687-4F45-9708-019B960494DF}">
+              <a14:hiddenLine xmlns:a14="http://schemas.microsoft.com/office/drawing/2010/main" w="9525">
+                <a:solidFill>
+                  <a:srgbClr val="000000"/>
+                </a:solidFill>
+                <a:miter lim="800000"/>
+                <a:headEnd/>
+                <a:tailEnd/>
+              </a14:hiddenLine>
+            </a:ext>
+          </a:extLst>
+        </p:spPr>
+        <p:txBody>
+          <a:bodyPr anchor="ctr">
+            <a:spAutoFit/>
+          </a:bodyPr>
+          <a:lstStyle/>
+          <a:p>
+            <a:r>
+              <a:rPr lang="en-US" sz="1600" dirty="0"/>
+              <a:t>	</a:t>
+            </a:r>
+            <a:r>
+              <a:rPr lang="ru-RU" sz="1600" dirty="0"/>
+              <a:t>Метод  </a:t>
+            </a:r>
+            <a:r>
+              <a:rPr lang="be-BY" sz="1600" dirty="0">
+                <a:latin typeface="Courier New" pitchFamily="49" charset="0"/>
+                <a:ea typeface="Calibri" pitchFamily="34" charset="0"/>
+                <a:cs typeface="Courier New" pitchFamily="49" charset="0"/>
+              </a:rPr>
+              <a:t>BeginInvoke</a:t>
+            </a:r>
+            <a:r>
+              <a:rPr lang="be-BY" sz="1600" b="1" dirty="0">
+                <a:latin typeface="Courier New" pitchFamily="49" charset="0"/>
+                <a:ea typeface="Calibri" pitchFamily="34" charset="0"/>
+                <a:cs typeface="Courier New" pitchFamily="49" charset="0"/>
+              </a:rPr>
+              <a:t> </a:t>
+            </a:r>
+            <a:r>
+              <a:rPr lang="ru-RU" sz="1600" dirty="0"/>
+              <a:t>возвращает объект типа </a:t>
+            </a:r>
+            <a:r>
+              <a:rPr lang="be-BY" sz="1600" dirty="0">
+                <a:solidFill>
+                  <a:schemeClr val="bg1"/>
+                </a:solidFill>
+                <a:latin typeface="Courier New" pitchFamily="49" charset="0"/>
+                <a:cs typeface="Calibri" pitchFamily="34" charset="0"/>
+              </a:rPr>
+              <a:t>IAsyncResult</a:t>
+            </a:r>
+            <a:r>
+              <a:rPr lang="en-US" sz="1600" dirty="0">
+                <a:latin typeface="Courier New" pitchFamily="49" charset="0"/>
+                <a:cs typeface="Calibri" pitchFamily="34" charset="0"/>
+              </a:rPr>
+              <a:t>. </a:t>
+            </a:r>
+            <a:r>
+              <a:rPr lang="ru-RU" sz="1600" dirty="0"/>
+              <a:t>Используя его свойство </a:t>
+            </a:r>
+            <a:r>
+              <a:rPr lang="en-US" sz="1600" b="1" dirty="0" err="1"/>
+              <a:t>IsCompleated</a:t>
+            </a:r>
+            <a:r>
+              <a:rPr lang="ru-RU" sz="1600" dirty="0"/>
+              <a:t> можно узнать, завершилось ли выполнение асинхронно вызванного метода.</a:t>
+            </a:r>
+            <a:endParaRPr lang="be-BY" sz="1600" dirty="0"/>
+          </a:p>
+        </p:txBody>
+      </p:sp>
+    </p:spTree>
+    <p:extLst>
+      <p:ext uri="{BB962C8B-B14F-4D97-AF65-F5344CB8AC3E}">
+        <p14:creationId xmlns:p14="http://schemas.microsoft.com/office/powerpoint/2010/main" val="3557299335"/>
+      </p:ext>
+    </p:extLst>
+  </p:cSld>
+  <p:clrMapOvr>
+    <a:masterClrMapping/>
+  </p:clrMapOvr>
+  <p:timing>
+    <p:tnLst>
+      <p:par>
+        <p:cTn id="1" dur="indefinite" restart="never" nodeType="tmRoot"/>
+      </p:par>
+    </p:tnLst>
+  </p:timing>
+</p:sld>
+</file>
+
+<file path=ppt/slides/slide21.xml><?xml version="1.0" encoding="utf-8"?>
+<p:sld xmlns:a="http://schemas.openxmlformats.org/drawingml/2006/main" xmlns:r="http://schemas.openxmlformats.org/officeDocument/2006/relationships" xmlns:p="http://schemas.openxmlformats.org/presentationml/2006/main">
+  <p:cSld>
+    <p:spTree>
+      <p:nvGrpSpPr>
+        <p:cNvPr id="1" name=""/>
+        <p:cNvGrpSpPr/>
+        <p:nvPr/>
+      </p:nvGrpSpPr>
+      <p:grpSpPr>
+        <a:xfrm>
+          <a:off x="0" y="0"/>
+          <a:ext cx="0" cy="0"/>
+          <a:chOff x="0" y="0"/>
+          <a:chExt cx="0" cy="0"/>
+        </a:xfrm>
+      </p:grpSpPr>
+      <p:sp>
+        <p:nvSpPr>
+          <p:cNvPr id="2" name="TextBox 1"/>
+          <p:cNvSpPr txBox="1"/>
+          <p:nvPr/>
+        </p:nvSpPr>
+        <p:spPr>
+          <a:xfrm>
+            <a:off x="323528" y="764704"/>
+            <a:ext cx="8424936" cy="5262979"/>
+          </a:xfrm>
+          <a:prstGeom prst="rect">
+            <a:avLst/>
+          </a:prstGeom>
+          <a:noFill/>
+        </p:spPr>
+        <p:txBody>
+          <a:bodyPr wrap="square" rtlCol="0">
+            <a:spAutoFit/>
+          </a:bodyPr>
+          <a:lstStyle/>
+          <a:p>
+            <a:r>
+              <a:rPr lang="ru-RU" sz="2400" dirty="0" smtClean="0"/>
+              <a:t>Коллекции из пространств имен </a:t>
+            </a:r>
+            <a:r>
+              <a:rPr lang="en-US" sz="2400" dirty="0" err="1" smtClean="0"/>
+              <a:t>System.Collections</a:t>
+            </a:r>
+            <a:r>
+              <a:rPr lang="en-US" sz="2400" dirty="0" smtClean="0"/>
+              <a:t> </a:t>
+            </a:r>
+            <a:r>
+              <a:rPr lang="ru-RU" sz="2400" dirty="0" smtClean="0"/>
+              <a:t>частично обеспечивают потоко-безопасный доступ с помощью свойства </a:t>
+            </a:r>
+            <a:r>
+              <a:rPr lang="en-US" sz="2400" dirty="0" smtClean="0">
+                <a:solidFill>
+                  <a:srgbClr val="99CC00"/>
+                </a:solidFill>
+              </a:rPr>
+              <a:t>Synchronized</a:t>
+            </a:r>
+            <a:r>
+              <a:rPr lang="en-US" sz="2400" dirty="0" smtClean="0"/>
+              <a:t>.</a:t>
+            </a:r>
+            <a:r>
+              <a:rPr lang="ru-RU" sz="2400" dirty="0" smtClean="0"/>
+              <a:t> Однако ее реализация использует одну блокировку для всех операций, что приводит к плохой масштабируемости и может серъезно замедлить работу с большими коллекциями.</a:t>
+            </a:r>
+            <a:endParaRPr lang="en-US" sz="2400" dirty="0"/>
+          </a:p>
+          <a:p>
+            <a:endParaRPr lang="en-US" sz="2400" dirty="0" smtClean="0"/>
+          </a:p>
+          <a:p>
+            <a:r>
+              <a:rPr lang="ru-RU" sz="2400" dirty="0"/>
+              <a:t>Коллекции из пространств имен </a:t>
+            </a:r>
+            <a:r>
+              <a:rPr lang="en-US" sz="2400" dirty="0" err="1" smtClean="0"/>
+              <a:t>System.Collections.Generic</a:t>
+            </a:r>
+            <a:r>
+              <a:rPr lang="en-US" sz="2400" dirty="0" smtClean="0"/>
+              <a:t> </a:t>
+            </a:r>
+            <a:r>
+              <a:rPr lang="ru-RU" sz="2400" dirty="0" smtClean="0"/>
+              <a:t>не предназначены для использования из разных потоков. Программист обязан самостоятельно синхронизировать доступ к ним.</a:t>
+            </a:r>
+          </a:p>
+          <a:p>
+            <a:endParaRPr lang="ru-RU" sz="2400" dirty="0"/>
+          </a:p>
+          <a:p>
+            <a:r>
+              <a:rPr lang="ru-RU" sz="2400" dirty="0" smtClean="0"/>
+              <a:t>В </a:t>
+            </a:r>
+            <a:r>
+              <a:rPr lang="en-US" sz="2400" dirty="0" smtClean="0"/>
+              <a:t>.NET 4 </a:t>
+            </a:r>
+            <a:r>
+              <a:rPr lang="ru-RU" sz="2400" dirty="0" smtClean="0"/>
+              <a:t>добавлены новые классы в пространстве имен </a:t>
+            </a:r>
+            <a:r>
+              <a:rPr lang="en-US" sz="2400" dirty="0" err="1" smtClean="0"/>
+              <a:t>System.Collections.Concurrent</a:t>
+            </a:r>
+            <a:r>
+              <a:rPr lang="ru-RU" sz="2400" dirty="0"/>
+              <a:t>.</a:t>
+            </a:r>
+            <a:endParaRPr lang="en-US" sz="2400" dirty="0" smtClean="0"/>
+          </a:p>
+        </p:txBody>
+      </p:sp>
+      <p:sp>
+        <p:nvSpPr>
+          <p:cNvPr id="3" name="TextBox 2"/>
+          <p:cNvSpPr txBox="1"/>
+          <p:nvPr/>
+        </p:nvSpPr>
+        <p:spPr>
+          <a:xfrm>
+            <a:off x="251520" y="44624"/>
+            <a:ext cx="8568952" cy="584775"/>
+          </a:xfrm>
+          <a:prstGeom prst="rect">
+            <a:avLst/>
+          </a:prstGeom>
+          <a:noFill/>
+        </p:spPr>
+        <p:txBody>
+          <a:bodyPr wrap="square" rtlCol="0">
+            <a:spAutoFit/>
+          </a:bodyPr>
+          <a:lstStyle/>
+          <a:p>
+            <a:pPr algn="ctr"/>
+            <a:r>
+              <a:rPr lang="ru-RU" sz="3200" dirty="0" smtClean="0"/>
+              <a:t>Коллекции и многопоточность</a:t>
+            </a:r>
+            <a:endParaRPr lang="en-US" sz="3200" dirty="0" smtClean="0"/>
+          </a:p>
+        </p:txBody>
+      </p:sp>
+    </p:spTree>
+    <p:extLst>
+      <p:ext uri="{BB962C8B-B14F-4D97-AF65-F5344CB8AC3E}">
+        <p14:creationId xmlns:p14="http://schemas.microsoft.com/office/powerpoint/2010/main" val="4075062194"/>
+      </p:ext>
+    </p:extLst>
+  </p:cSld>
+  <p:clrMapOvr>
+    <a:masterClrMapping/>
+  </p:clrMapOvr>
+  <p:timing>
+    <p:tnLst>
+      <p:par>
+        <p:cTn id="1" dur="indefinite" restart="never" nodeType="tmRoot"/>
+      </p:par>
+    </p:tnLst>
+  </p:timing>
+</p:sld>
+</file>
+
+<file path=ppt/slides/slide22.xml><?xml version="1.0" encoding="utf-8"?>
+<p:sld xmlns:a="http://schemas.openxmlformats.org/drawingml/2006/main" xmlns:r="http://schemas.openxmlformats.org/officeDocument/2006/relationships" xmlns:p="http://schemas.openxmlformats.org/presentationml/2006/main">
+  <p:cSld>
+    <p:spTree>
+      <p:nvGrpSpPr>
+        <p:cNvPr id="1" name=""/>
+        <p:cNvGrpSpPr/>
+        <p:nvPr/>
+      </p:nvGrpSpPr>
+      <p:grpSpPr>
+        <a:xfrm>
+          <a:off x="0" y="0"/>
+          <a:ext cx="0" cy="0"/>
+          <a:chOff x="0" y="0"/>
+          <a:chExt cx="0" cy="0"/>
+        </a:xfrm>
+      </p:grpSpPr>
+      <p:sp>
+        <p:nvSpPr>
+          <p:cNvPr id="3" name="TextBox 2"/>
+          <p:cNvSpPr txBox="1"/>
+          <p:nvPr/>
+        </p:nvSpPr>
+        <p:spPr>
+          <a:xfrm>
+            <a:off x="251520" y="44624"/>
+            <a:ext cx="8568952" cy="584775"/>
+          </a:xfrm>
+          <a:prstGeom prst="rect">
+            <a:avLst/>
+          </a:prstGeom>
+          <a:noFill/>
+        </p:spPr>
+        <p:txBody>
+          <a:bodyPr wrap="square" rtlCol="0">
+            <a:spAutoFit/>
+          </a:bodyPr>
+          <a:lstStyle/>
+          <a:p>
+            <a:pPr algn="ctr"/>
+            <a:r>
+              <a:rPr lang="en-US" sz="3200" dirty="0" err="1"/>
+              <a:t>System.Collections.Concurrent</a:t>
+            </a:r>
+            <a:endParaRPr lang="en-US" sz="3200" dirty="0" smtClean="0"/>
+          </a:p>
+        </p:txBody>
+      </p:sp>
+      <p:graphicFrame>
+        <p:nvGraphicFramePr>
+          <p:cNvPr id="4" name="Table 3"/>
+          <p:cNvGraphicFramePr>
+            <a:graphicFrameLocks noGrp="1"/>
+          </p:cNvGraphicFramePr>
+          <p:nvPr>
+            <p:extLst>
+              <p:ext uri="{D42A27DB-BD31-4B8C-83A1-F6EECF244321}">
+                <p14:modId xmlns:p14="http://schemas.microsoft.com/office/powerpoint/2010/main" val="3533972134"/>
+              </p:ext>
+            </p:extLst>
+          </p:nvPr>
+        </p:nvGraphicFramePr>
+        <p:xfrm>
+          <a:off x="251520" y="980728"/>
+          <a:ext cx="8568952" cy="4023131"/>
+        </p:xfrm>
+        <a:graphic>
+          <a:graphicData uri="http://schemas.openxmlformats.org/drawingml/2006/table">
+            <a:tbl>
+              <a:tblPr/>
+              <a:tblGrid>
+                <a:gridCol w="3312368"/>
+                <a:gridCol w="5256584"/>
+              </a:tblGrid>
+              <a:tr h="329161">
+                <a:tc>
+                  <a:txBody>
+                    <a:bodyPr/>
+                    <a:lstStyle/>
+                    <a:p>
+                      <a:r>
+                        <a:rPr lang="ru-RU" sz="1600" u="none" dirty="0" smtClean="0">
+                          <a:latin typeface="+mn-lt"/>
+                        </a:rPr>
+                        <a:t>Имя</a:t>
+                      </a:r>
+                      <a:r>
+                        <a:rPr lang="ru-RU" sz="1600" u="none" baseline="0" dirty="0" smtClean="0">
+                          <a:latin typeface="+mn-lt"/>
+                        </a:rPr>
+                        <a:t> типа</a:t>
+                      </a:r>
+                      <a:endParaRPr lang="en-US" sz="1600" u="none" dirty="0">
+                        <a:latin typeface="+mn-lt"/>
+                      </a:endParaRPr>
+                    </a:p>
+                  </a:txBody>
+                  <a:tcPr marL="82290" marR="82290" marT="41145" marB="41145" anchor="ctr">
+                    <a:lnL w="12700" cap="flat" cmpd="sng" algn="ctr">
+                      <a:solidFill>
+                        <a:schemeClr val="tx1"/>
+                      </a:solidFill>
+                      <a:prstDash val="solid"/>
+                      <a:round/>
+                      <a:headEnd type="none" w="med" len="med"/>
+                      <a:tailEnd type="none" w="med" len="med"/>
+                    </a:lnL>
+                    <a:lnR w="12700" cap="flat" cmpd="sng" algn="ctr">
+                      <a:solidFill>
+                        <a:schemeClr val="tx1"/>
+                      </a:solidFill>
+                      <a:prstDash val="solid"/>
+                      <a:round/>
+                      <a:headEnd type="none" w="med" len="med"/>
+                      <a:tailEnd type="none" w="med" len="med"/>
+                    </a:lnR>
+                    <a:lnT w="12700" cap="flat" cmpd="sng" algn="ctr">
+                      <a:solidFill>
+                        <a:schemeClr val="tx1"/>
+                      </a:solidFill>
+                      <a:prstDash val="solid"/>
+                      <a:round/>
+                      <a:headEnd type="none" w="med" len="med"/>
+                      <a:tailEnd type="none" w="med" len="med"/>
+                    </a:lnT>
+                    <a:lnB w="12700" cap="flat" cmpd="sng" algn="ctr">
+                      <a:solidFill>
+                        <a:schemeClr val="tx1"/>
+                      </a:solidFill>
+                      <a:prstDash val="solid"/>
+                      <a:round/>
+                      <a:headEnd type="none" w="med" len="med"/>
+                      <a:tailEnd type="none" w="med" len="med"/>
+                    </a:lnB>
+                    <a:solidFill>
+                      <a:schemeClr val="bg1">
+                        <a:lumMod val="50000"/>
+                      </a:schemeClr>
+                    </a:solidFill>
+                  </a:tcPr>
+                </a:tc>
+                <a:tc>
+                  <a:txBody>
+                    <a:bodyPr/>
+                    <a:lstStyle/>
+                    <a:p>
+                      <a:r>
+                        <a:rPr lang="ru-RU" sz="1600" u="none" dirty="0" smtClean="0">
+                          <a:latin typeface="+mn-lt"/>
+                        </a:rPr>
+                        <a:t>Описание</a:t>
+                      </a:r>
+                      <a:endParaRPr lang="en-US" sz="1600" u="none" dirty="0">
+                        <a:latin typeface="+mn-lt"/>
+                      </a:endParaRPr>
+                    </a:p>
+                  </a:txBody>
+                  <a:tcPr marL="82290" marR="82290" marT="41145" marB="41145" anchor="ctr">
+                    <a:lnL w="12700" cap="flat" cmpd="sng" algn="ctr">
+                      <a:solidFill>
+                        <a:schemeClr val="tx1"/>
+                      </a:solidFill>
+                      <a:prstDash val="solid"/>
+                      <a:round/>
+                      <a:headEnd type="none" w="med" len="med"/>
+                      <a:tailEnd type="none" w="med" len="med"/>
+                    </a:lnL>
+                    <a:lnR w="12700" cap="flat" cmpd="sng" algn="ctr">
+                      <a:solidFill>
+                        <a:schemeClr val="tx1"/>
+                      </a:solidFill>
+                      <a:prstDash val="solid"/>
+                      <a:round/>
+                      <a:headEnd type="none" w="med" len="med"/>
+                      <a:tailEnd type="none" w="med" len="med"/>
+                    </a:lnR>
+                    <a:lnT w="12700" cap="flat" cmpd="sng" algn="ctr">
+                      <a:solidFill>
+                        <a:schemeClr val="tx1"/>
+                      </a:solidFill>
+                      <a:prstDash val="solid"/>
+                      <a:round/>
+                      <a:headEnd type="none" w="med" len="med"/>
+                      <a:tailEnd type="none" w="med" len="med"/>
+                    </a:lnT>
+                    <a:lnB w="12700" cap="flat" cmpd="sng" algn="ctr">
+                      <a:solidFill>
+                        <a:schemeClr val="tx1"/>
+                      </a:solidFill>
+                      <a:prstDash val="solid"/>
+                      <a:round/>
+                      <a:headEnd type="none" w="med" len="med"/>
+                      <a:tailEnd type="none" w="med" len="med"/>
+                    </a:lnB>
+                    <a:solidFill>
+                      <a:schemeClr val="bg1">
+                        <a:lumMod val="50000"/>
+                      </a:schemeClr>
+                    </a:solidFill>
+                  </a:tcPr>
+                </a:tc>
+              </a:tr>
+              <a:tr h="750959">
+                <a:tc>
+                  <a:txBody>
+                    <a:bodyPr/>
+                    <a:lstStyle/>
+                    <a:p>
+                      <a:r>
+                        <a:rPr lang="en-US" sz="1600" u="none" dirty="0">
+                          <a:latin typeface="+mn-lt"/>
+                        </a:rPr>
+                        <a:t>BlockingCollection&lt;T&gt; </a:t>
+                      </a:r>
+                    </a:p>
+                  </a:txBody>
+                  <a:tcPr marL="82290" marR="82290" marT="41145" marB="41145" anchor="ctr">
+                    <a:lnL w="12700" cap="flat" cmpd="sng" algn="ctr">
+                      <a:solidFill>
+                        <a:schemeClr val="tx1"/>
+                      </a:solidFill>
+                      <a:prstDash val="solid"/>
+                      <a:round/>
+                      <a:headEnd type="none" w="med" len="med"/>
+                      <a:tailEnd type="none" w="med" len="med"/>
+                    </a:lnL>
+                    <a:lnR w="12700" cap="flat" cmpd="sng" algn="ctr">
+                      <a:solidFill>
+                        <a:schemeClr val="tx1"/>
+                      </a:solidFill>
+                      <a:prstDash val="solid"/>
+                      <a:round/>
+                      <a:headEnd type="none" w="med" len="med"/>
+                      <a:tailEnd type="none" w="med" len="med"/>
+                    </a:lnR>
+                    <a:lnT w="12700" cap="flat" cmpd="sng" algn="ctr">
+                      <a:solidFill>
+                        <a:schemeClr val="tx1"/>
+                      </a:solidFill>
+                      <a:prstDash val="solid"/>
+                      <a:round/>
+                      <a:headEnd type="none" w="med" len="med"/>
+                      <a:tailEnd type="none" w="med" len="med"/>
+                    </a:lnT>
+                    <a:lnB w="12700" cap="flat" cmpd="sng" algn="ctr">
+                      <a:solidFill>
+                        <a:schemeClr val="tx1"/>
+                      </a:solidFill>
+                      <a:prstDash val="solid"/>
+                      <a:round/>
+                      <a:headEnd type="none" w="med" len="med"/>
+                      <a:tailEnd type="none" w="med" len="med"/>
+                    </a:lnB>
+                  </a:tcPr>
+                </a:tc>
+                <a:tc>
+                  <a:txBody>
+                    <a:bodyPr/>
+                    <a:lstStyle/>
+                    <a:p>
+                      <a:r>
+                        <a:rPr lang="ru-RU" sz="1600" u="none" dirty="0" smtClean="0">
+                          <a:latin typeface="+mn-lt"/>
+                        </a:rPr>
+                        <a:t>Коллекция</a:t>
+                      </a:r>
+                      <a:r>
+                        <a:rPr lang="ru-RU" sz="1600" u="none" baseline="0" dirty="0" smtClean="0">
+                          <a:latin typeface="+mn-lt"/>
+                        </a:rPr>
+                        <a:t> реализующая шаблон проектирования </a:t>
+                      </a:r>
+                      <a:r>
+                        <a:rPr lang="en-US" sz="1600" dirty="0" smtClean="0"/>
+                        <a:t>Producer-Consumer</a:t>
+                      </a:r>
+                      <a:r>
+                        <a:rPr lang="ru-RU" sz="1600" dirty="0" smtClean="0"/>
+                        <a:t> с</a:t>
+                      </a:r>
+                      <a:r>
+                        <a:rPr lang="ru-RU" sz="1600" baseline="0" dirty="0" smtClean="0"/>
+                        <a:t> возможностью ограничения максимального размера коллекции.</a:t>
+                      </a:r>
+                      <a:endParaRPr lang="en-US" sz="1600" u="none" dirty="0">
+                        <a:latin typeface="+mn-lt"/>
+                      </a:endParaRPr>
+                    </a:p>
+                  </a:txBody>
+                  <a:tcPr marL="82290" marR="82290" marT="41145" marB="41145" anchor="ctr">
+                    <a:lnL w="12700" cap="flat" cmpd="sng" algn="ctr">
+                      <a:solidFill>
+                        <a:schemeClr val="tx1"/>
+                      </a:solidFill>
+                      <a:prstDash val="solid"/>
+                      <a:round/>
+                      <a:headEnd type="none" w="med" len="med"/>
+                      <a:tailEnd type="none" w="med" len="med"/>
+                    </a:lnL>
+                    <a:lnR w="12700" cap="flat" cmpd="sng" algn="ctr">
+                      <a:solidFill>
+                        <a:schemeClr val="tx1"/>
+                      </a:solidFill>
+                      <a:prstDash val="solid"/>
+                      <a:round/>
+                      <a:headEnd type="none" w="med" len="med"/>
+                      <a:tailEnd type="none" w="med" len="med"/>
+                    </a:lnR>
+                    <a:lnT w="12700" cap="flat" cmpd="sng" algn="ctr">
+                      <a:solidFill>
+                        <a:schemeClr val="tx1"/>
+                      </a:solidFill>
+                      <a:prstDash val="solid"/>
+                      <a:round/>
+                      <a:headEnd type="none" w="med" len="med"/>
+                      <a:tailEnd type="none" w="med" len="med"/>
+                    </a:lnT>
+                    <a:lnB w="12700" cap="flat" cmpd="sng" algn="ctr">
+                      <a:solidFill>
+                        <a:schemeClr val="tx1"/>
+                      </a:solidFill>
+                      <a:prstDash val="solid"/>
+                      <a:round/>
+                      <a:headEnd type="none" w="med" len="med"/>
+                      <a:tailEnd type="none" w="med" len="med"/>
+                    </a:lnB>
+                  </a:tcPr>
+                </a:tc>
+              </a:tr>
+              <a:tr h="576032">
+                <a:tc>
+                  <a:txBody>
+                    <a:bodyPr/>
+                    <a:lstStyle/>
+                    <a:p>
+                      <a:r>
+                        <a:rPr lang="en-US" sz="1600" u="none" dirty="0" err="1">
+                          <a:latin typeface="+mn-lt"/>
+                        </a:rPr>
+                        <a:t>ConcurrentDictionary</a:t>
+                      </a:r>
+                      <a:r>
+                        <a:rPr lang="en-US" sz="1600" u="none" dirty="0">
+                          <a:latin typeface="+mn-lt"/>
+                        </a:rPr>
+                        <a:t>&lt;</a:t>
+                      </a:r>
+                      <a:r>
+                        <a:rPr lang="en-US" sz="1600" u="none" dirty="0" err="1">
+                          <a:latin typeface="+mn-lt"/>
+                        </a:rPr>
+                        <a:t>TKey</a:t>
+                      </a:r>
+                      <a:r>
+                        <a:rPr lang="en-US" sz="1600" u="none" dirty="0">
+                          <a:latin typeface="+mn-lt"/>
+                        </a:rPr>
+                        <a:t>, </a:t>
+                      </a:r>
+                      <a:r>
+                        <a:rPr lang="en-US" sz="1600" u="none" dirty="0" err="1">
+                          <a:latin typeface="+mn-lt"/>
+                        </a:rPr>
+                        <a:t>TValue</a:t>
+                      </a:r>
+                      <a:r>
+                        <a:rPr lang="en-US" sz="1600" u="none" dirty="0">
+                          <a:latin typeface="+mn-lt"/>
+                        </a:rPr>
+                        <a:t>&gt; </a:t>
+                      </a:r>
+                    </a:p>
+                  </a:txBody>
+                  <a:tcPr marL="82290" marR="82290" marT="41145" marB="41145" anchor="ctr">
+                    <a:lnL w="12700" cap="flat" cmpd="sng" algn="ctr">
+                      <a:solidFill>
+                        <a:schemeClr val="tx1"/>
+                      </a:solidFill>
+                      <a:prstDash val="solid"/>
+                      <a:round/>
+                      <a:headEnd type="none" w="med" len="med"/>
+                      <a:tailEnd type="none" w="med" len="med"/>
+                    </a:lnL>
+                    <a:lnR w="12700" cap="flat" cmpd="sng" algn="ctr">
+                      <a:solidFill>
+                        <a:schemeClr val="tx1"/>
+                      </a:solidFill>
+                      <a:prstDash val="solid"/>
+                      <a:round/>
+                      <a:headEnd type="none" w="med" len="med"/>
+                      <a:tailEnd type="none" w="med" len="med"/>
+                    </a:lnR>
+                    <a:lnT w="12700" cap="flat" cmpd="sng" algn="ctr">
+                      <a:solidFill>
+                        <a:schemeClr val="tx1"/>
+                      </a:solidFill>
+                      <a:prstDash val="solid"/>
+                      <a:round/>
+                      <a:headEnd type="none" w="med" len="med"/>
+                      <a:tailEnd type="none" w="med" len="med"/>
+                    </a:lnT>
+                    <a:lnB w="12700" cap="flat" cmpd="sng" algn="ctr">
+                      <a:solidFill>
+                        <a:schemeClr val="tx1"/>
+                      </a:solidFill>
+                      <a:prstDash val="solid"/>
+                      <a:round/>
+                      <a:headEnd type="none" w="med" len="med"/>
+                      <a:tailEnd type="none" w="med" len="med"/>
+                    </a:lnB>
+                  </a:tcPr>
+                </a:tc>
+                <a:tc>
+                  <a:txBody>
+                    <a:bodyPr/>
+                    <a:lstStyle/>
+                    <a:p>
+                      <a:r>
+                        <a:rPr lang="ru-RU" sz="1600" u="none" dirty="0" smtClean="0">
+                          <a:latin typeface="+mn-lt"/>
+                        </a:rPr>
+                        <a:t>Потоко-безопасная</a:t>
+                      </a:r>
+                      <a:r>
+                        <a:rPr lang="ru-RU" sz="1600" u="none" baseline="0" dirty="0" smtClean="0">
+                          <a:latin typeface="+mn-lt"/>
+                        </a:rPr>
+                        <a:t> </a:t>
+                      </a:r>
+                      <a:r>
+                        <a:rPr lang="en-US" sz="1600" u="none" baseline="0" dirty="0" smtClean="0">
+                          <a:latin typeface="+mn-lt"/>
+                        </a:rPr>
+                        <a:t>(thread-safe) </a:t>
+                      </a:r>
+                      <a:r>
+                        <a:rPr lang="ru-RU" sz="1600" u="none" baseline="0" dirty="0" smtClean="0">
+                          <a:latin typeface="+mn-lt"/>
+                        </a:rPr>
+                        <a:t>реализация словаря из пары ключ/значение.</a:t>
+                      </a:r>
+                      <a:endParaRPr lang="en-US" sz="1600" u="none" dirty="0">
+                        <a:latin typeface="+mn-lt"/>
+                      </a:endParaRPr>
+                    </a:p>
+                  </a:txBody>
+                  <a:tcPr marL="82290" marR="82290" marT="41145" marB="41145" anchor="ctr">
+                    <a:lnL w="12700" cap="flat" cmpd="sng" algn="ctr">
+                      <a:solidFill>
+                        <a:schemeClr val="tx1"/>
+                      </a:solidFill>
+                      <a:prstDash val="solid"/>
+                      <a:round/>
+                      <a:headEnd type="none" w="med" len="med"/>
+                      <a:tailEnd type="none" w="med" len="med"/>
+                    </a:lnL>
+                    <a:lnR w="12700" cap="flat" cmpd="sng" algn="ctr">
+                      <a:solidFill>
+                        <a:schemeClr val="tx1"/>
+                      </a:solidFill>
+                      <a:prstDash val="solid"/>
+                      <a:round/>
+                      <a:headEnd type="none" w="med" len="med"/>
+                      <a:tailEnd type="none" w="med" len="med"/>
+                    </a:lnR>
+                    <a:lnT w="12700" cap="flat" cmpd="sng" algn="ctr">
+                      <a:solidFill>
+                        <a:schemeClr val="tx1"/>
+                      </a:solidFill>
+                      <a:prstDash val="solid"/>
+                      <a:round/>
+                      <a:headEnd type="none" w="med" len="med"/>
+                      <a:tailEnd type="none" w="med" len="med"/>
+                    </a:lnT>
+                    <a:lnB w="12700" cap="flat" cmpd="sng" algn="ctr">
+                      <a:solidFill>
+                        <a:schemeClr val="tx1"/>
+                      </a:solidFill>
+                      <a:prstDash val="solid"/>
+                      <a:round/>
+                      <a:headEnd type="none" w="med" len="med"/>
+                      <a:tailEnd type="none" w="med" len="med"/>
+                    </a:lnB>
+                  </a:tcPr>
+                </a:tc>
+              </a:tr>
+              <a:tr h="576032">
+                <a:tc>
+                  <a:txBody>
+                    <a:bodyPr/>
+                    <a:lstStyle/>
+                    <a:p>
+                      <a:r>
+                        <a:rPr lang="en-US" sz="1600" u="none" dirty="0" err="1">
+                          <a:latin typeface="+mn-lt"/>
+                        </a:rPr>
+                        <a:t>ConcurrentQueue</a:t>
+                      </a:r>
+                      <a:r>
+                        <a:rPr lang="en-US" sz="1600" u="none" dirty="0">
+                          <a:latin typeface="+mn-lt"/>
+                        </a:rPr>
+                        <a:t>&lt;T&gt; </a:t>
+                      </a:r>
+                    </a:p>
+                  </a:txBody>
+                  <a:tcPr marL="82290" marR="82290" marT="41145" marB="41145" anchor="ctr">
+                    <a:lnL w="12700" cap="flat" cmpd="sng" algn="ctr">
+                      <a:solidFill>
+                        <a:schemeClr val="tx1"/>
+                      </a:solidFill>
+                      <a:prstDash val="solid"/>
+                      <a:round/>
+                      <a:headEnd type="none" w="med" len="med"/>
+                      <a:tailEnd type="none" w="med" len="med"/>
+                    </a:lnL>
+                    <a:lnR w="12700" cap="flat" cmpd="sng" algn="ctr">
+                      <a:solidFill>
+                        <a:schemeClr val="tx1"/>
+                      </a:solidFill>
+                      <a:prstDash val="solid"/>
+                      <a:round/>
+                      <a:headEnd type="none" w="med" len="med"/>
+                      <a:tailEnd type="none" w="med" len="med"/>
+                    </a:lnR>
+                    <a:lnT w="12700" cap="flat" cmpd="sng" algn="ctr">
+                      <a:solidFill>
+                        <a:schemeClr val="tx1"/>
+                      </a:solidFill>
+                      <a:prstDash val="solid"/>
+                      <a:round/>
+                      <a:headEnd type="none" w="med" len="med"/>
+                      <a:tailEnd type="none" w="med" len="med"/>
+                    </a:lnT>
+                    <a:lnB w="12700" cap="flat" cmpd="sng" algn="ctr">
+                      <a:solidFill>
+                        <a:schemeClr val="tx1"/>
+                      </a:solidFill>
+                      <a:prstDash val="solid"/>
+                      <a:round/>
+                      <a:headEnd type="none" w="med" len="med"/>
+                      <a:tailEnd type="none" w="med" len="med"/>
+                    </a:lnB>
+                  </a:tcPr>
+                </a:tc>
+                <a:tc>
+                  <a:txBody>
+                    <a:bodyPr/>
+                    <a:lstStyle/>
+                    <a:p>
+                      <a:r>
+                        <a:rPr lang="ru-RU" sz="1600" u="none" dirty="0" smtClean="0">
+                          <a:latin typeface="+mn-lt"/>
+                        </a:rPr>
+                        <a:t>Потоко-безопасная</a:t>
+                      </a:r>
+                      <a:r>
+                        <a:rPr lang="ru-RU" sz="1600" u="none" baseline="0" dirty="0" smtClean="0">
+                          <a:latin typeface="+mn-lt"/>
+                        </a:rPr>
+                        <a:t> </a:t>
+                      </a:r>
+                      <a:r>
+                        <a:rPr lang="en-US" sz="1600" u="none" baseline="0" dirty="0" smtClean="0">
+                          <a:latin typeface="+mn-lt"/>
+                        </a:rPr>
+                        <a:t>(thread-safe) </a:t>
+                      </a:r>
+                      <a:r>
+                        <a:rPr lang="ru-RU" sz="1600" u="none" baseline="0" dirty="0" smtClean="0">
+                          <a:latin typeface="+mn-lt"/>
+                        </a:rPr>
+                        <a:t>реализация </a:t>
+                      </a:r>
+                      <a:r>
+                        <a:rPr lang="en-US" sz="1600" u="none" dirty="0" smtClean="0">
+                          <a:latin typeface="+mn-lt"/>
+                        </a:rPr>
+                        <a:t>FIFO </a:t>
+                      </a:r>
+                      <a:r>
+                        <a:rPr lang="en-US" sz="1600" u="none" dirty="0">
+                          <a:latin typeface="+mn-lt"/>
+                        </a:rPr>
+                        <a:t>(first-in, first-out) </a:t>
+                      </a:r>
+                      <a:r>
+                        <a:rPr lang="ru-RU" sz="1600" u="none" dirty="0" smtClean="0">
+                          <a:latin typeface="+mn-lt"/>
+                        </a:rPr>
+                        <a:t>очереди</a:t>
+                      </a:r>
+                      <a:r>
+                        <a:rPr lang="en-US" sz="1600" u="none" dirty="0" smtClean="0">
+                          <a:latin typeface="+mn-lt"/>
+                        </a:rPr>
+                        <a:t>.</a:t>
+                      </a:r>
+                      <a:endParaRPr lang="en-US" sz="1600" u="none" dirty="0">
+                        <a:latin typeface="+mn-lt"/>
+                      </a:endParaRPr>
+                    </a:p>
+                  </a:txBody>
+                  <a:tcPr marL="82290" marR="82290" marT="41145" marB="41145" anchor="ctr">
+                    <a:lnL w="12700" cap="flat" cmpd="sng" algn="ctr">
+                      <a:solidFill>
+                        <a:schemeClr val="tx1"/>
+                      </a:solidFill>
+                      <a:prstDash val="solid"/>
+                      <a:round/>
+                      <a:headEnd type="none" w="med" len="med"/>
+                      <a:tailEnd type="none" w="med" len="med"/>
+                    </a:lnL>
+                    <a:lnR w="12700" cap="flat" cmpd="sng" algn="ctr">
+                      <a:solidFill>
+                        <a:schemeClr val="tx1"/>
+                      </a:solidFill>
+                      <a:prstDash val="solid"/>
+                      <a:round/>
+                      <a:headEnd type="none" w="med" len="med"/>
+                      <a:tailEnd type="none" w="med" len="med"/>
+                    </a:lnR>
+                    <a:lnT w="12700" cap="flat" cmpd="sng" algn="ctr">
+                      <a:solidFill>
+                        <a:schemeClr val="tx1"/>
+                      </a:solidFill>
+                      <a:prstDash val="solid"/>
+                      <a:round/>
+                      <a:headEnd type="none" w="med" len="med"/>
+                      <a:tailEnd type="none" w="med" len="med"/>
+                    </a:lnT>
+                    <a:lnB w="12700" cap="flat" cmpd="sng" algn="ctr">
+                      <a:solidFill>
+                        <a:schemeClr val="tx1"/>
+                      </a:solidFill>
+                      <a:prstDash val="solid"/>
+                      <a:round/>
+                      <a:headEnd type="none" w="med" len="med"/>
+                      <a:tailEnd type="none" w="med" len="med"/>
+                    </a:lnB>
+                  </a:tcPr>
+                </a:tc>
+              </a:tr>
+              <a:tr h="576032">
+                <a:tc>
+                  <a:txBody>
+                    <a:bodyPr/>
+                    <a:lstStyle/>
+                    <a:p>
+                      <a:r>
+                        <a:rPr lang="en-US" sz="1600" u="none" dirty="0" err="1">
+                          <a:latin typeface="+mn-lt"/>
+                        </a:rPr>
+                        <a:t>ConcurrentStack</a:t>
+                      </a:r>
+                      <a:r>
+                        <a:rPr lang="en-US" sz="1600" u="none" dirty="0">
+                          <a:latin typeface="+mn-lt"/>
+                        </a:rPr>
+                        <a:t>&lt;T&gt; </a:t>
+                      </a:r>
+                    </a:p>
+                  </a:txBody>
+                  <a:tcPr marL="82290" marR="82290" marT="41145" marB="41145" anchor="ctr">
+                    <a:lnL w="12700" cap="flat" cmpd="sng" algn="ctr">
+                      <a:solidFill>
+                        <a:schemeClr val="tx1"/>
+                      </a:solidFill>
+                      <a:prstDash val="solid"/>
+                      <a:round/>
+                      <a:headEnd type="none" w="med" len="med"/>
+                      <a:tailEnd type="none" w="med" len="med"/>
+                    </a:lnL>
+                    <a:lnR w="12700" cap="flat" cmpd="sng" algn="ctr">
+                      <a:solidFill>
+                        <a:schemeClr val="tx1"/>
+                      </a:solidFill>
+                      <a:prstDash val="solid"/>
+                      <a:round/>
+                      <a:headEnd type="none" w="med" len="med"/>
+                      <a:tailEnd type="none" w="med" len="med"/>
+                    </a:lnR>
+                    <a:lnT w="12700" cap="flat" cmpd="sng" algn="ctr">
+                      <a:solidFill>
+                        <a:schemeClr val="tx1"/>
+                      </a:solidFill>
+                      <a:prstDash val="solid"/>
+                      <a:round/>
+                      <a:headEnd type="none" w="med" len="med"/>
+                      <a:tailEnd type="none" w="med" len="med"/>
+                    </a:lnT>
+                    <a:lnB w="12700" cap="flat" cmpd="sng" algn="ctr">
+                      <a:solidFill>
+                        <a:schemeClr val="tx1"/>
+                      </a:solidFill>
+                      <a:prstDash val="solid"/>
+                      <a:round/>
+                      <a:headEnd type="none" w="med" len="med"/>
+                      <a:tailEnd type="none" w="med" len="med"/>
+                    </a:lnB>
+                  </a:tcPr>
+                </a:tc>
+                <a:tc>
+                  <a:txBody>
+                    <a:bodyPr/>
+                    <a:lstStyle/>
+                    <a:p>
+                      <a:r>
+                        <a:rPr lang="ru-RU" sz="1600" u="none" dirty="0" smtClean="0">
+                          <a:latin typeface="+mn-lt"/>
+                        </a:rPr>
+                        <a:t>Потоко-безопасная</a:t>
+                      </a:r>
+                      <a:r>
+                        <a:rPr lang="ru-RU" sz="1600" u="none" baseline="0" dirty="0" smtClean="0">
+                          <a:latin typeface="+mn-lt"/>
+                        </a:rPr>
+                        <a:t> </a:t>
+                      </a:r>
+                      <a:r>
+                        <a:rPr lang="en-US" sz="1600" u="none" baseline="0" dirty="0" smtClean="0">
+                          <a:latin typeface="+mn-lt"/>
+                        </a:rPr>
+                        <a:t>(thread-safe) </a:t>
+                      </a:r>
+                      <a:r>
+                        <a:rPr lang="ru-RU" sz="1600" u="none" baseline="0" dirty="0" smtClean="0">
+                          <a:latin typeface="+mn-lt"/>
+                        </a:rPr>
+                        <a:t>реализация </a:t>
+                      </a:r>
+                      <a:r>
+                        <a:rPr lang="en-US" sz="1600" u="none" dirty="0" smtClean="0">
+                          <a:latin typeface="+mn-lt"/>
+                        </a:rPr>
+                        <a:t>LIFO </a:t>
+                      </a:r>
+                      <a:r>
+                        <a:rPr lang="en-US" sz="1600" u="none" dirty="0">
+                          <a:latin typeface="+mn-lt"/>
+                        </a:rPr>
+                        <a:t>(last-in, first-out) </a:t>
+                      </a:r>
+                      <a:r>
+                        <a:rPr lang="ru-RU" sz="1600" u="none" dirty="0" smtClean="0">
+                          <a:latin typeface="+mn-lt"/>
+                        </a:rPr>
+                        <a:t>стека</a:t>
+                      </a:r>
+                      <a:r>
+                        <a:rPr lang="en-US" sz="1600" u="none" dirty="0" smtClean="0">
+                          <a:latin typeface="+mn-lt"/>
+                        </a:rPr>
+                        <a:t>.</a:t>
+                      </a:r>
+                      <a:endParaRPr lang="en-US" sz="1600" u="none" dirty="0">
+                        <a:latin typeface="+mn-lt"/>
+                      </a:endParaRPr>
+                    </a:p>
+                  </a:txBody>
+                  <a:tcPr marL="82290" marR="82290" marT="41145" marB="41145" anchor="ctr">
+                    <a:lnL w="12700" cap="flat" cmpd="sng" algn="ctr">
+                      <a:solidFill>
+                        <a:schemeClr val="tx1"/>
+                      </a:solidFill>
+                      <a:prstDash val="solid"/>
+                      <a:round/>
+                      <a:headEnd type="none" w="med" len="med"/>
+                      <a:tailEnd type="none" w="med" len="med"/>
+                    </a:lnL>
+                    <a:lnR w="12700" cap="flat" cmpd="sng" algn="ctr">
+                      <a:solidFill>
+                        <a:schemeClr val="tx1"/>
+                      </a:solidFill>
+                      <a:prstDash val="solid"/>
+                      <a:round/>
+                      <a:headEnd type="none" w="med" len="med"/>
+                      <a:tailEnd type="none" w="med" len="med"/>
+                    </a:lnR>
+                    <a:lnT w="12700" cap="flat" cmpd="sng" algn="ctr">
+                      <a:solidFill>
+                        <a:schemeClr val="tx1"/>
+                      </a:solidFill>
+                      <a:prstDash val="solid"/>
+                      <a:round/>
+                      <a:headEnd type="none" w="med" len="med"/>
+                      <a:tailEnd type="none" w="med" len="med"/>
+                    </a:lnT>
+                    <a:lnB w="12700" cap="flat" cmpd="sng" algn="ctr">
+                      <a:solidFill>
+                        <a:schemeClr val="tx1"/>
+                      </a:solidFill>
+                      <a:prstDash val="solid"/>
+                      <a:round/>
+                      <a:headEnd type="none" w="med" len="med"/>
+                      <a:tailEnd type="none" w="med" len="med"/>
+                    </a:lnB>
+                  </a:tcPr>
+                </a:tc>
+              </a:tr>
+              <a:tr h="576032">
+                <a:tc>
+                  <a:txBody>
+                    <a:bodyPr/>
+                    <a:lstStyle/>
+                    <a:p>
+                      <a:r>
+                        <a:rPr lang="en-US" sz="1600" u="none" dirty="0">
+                          <a:latin typeface="+mn-lt"/>
+                        </a:rPr>
+                        <a:t>ConcurrentBag&lt;T&gt; </a:t>
+                      </a:r>
+                    </a:p>
+                  </a:txBody>
+                  <a:tcPr marL="82290" marR="82290" marT="41145" marB="41145" anchor="ctr">
+                    <a:lnL w="12700" cap="flat" cmpd="sng" algn="ctr">
+                      <a:solidFill>
+                        <a:schemeClr val="tx1"/>
+                      </a:solidFill>
+                      <a:prstDash val="solid"/>
+                      <a:round/>
+                      <a:headEnd type="none" w="med" len="med"/>
+                      <a:tailEnd type="none" w="med" len="med"/>
+                    </a:lnL>
+                    <a:lnR w="12700" cap="flat" cmpd="sng" algn="ctr">
+                      <a:solidFill>
+                        <a:schemeClr val="tx1"/>
+                      </a:solidFill>
+                      <a:prstDash val="solid"/>
+                      <a:round/>
+                      <a:headEnd type="none" w="med" len="med"/>
+                      <a:tailEnd type="none" w="med" len="med"/>
+                    </a:lnR>
+                    <a:lnT w="12700" cap="flat" cmpd="sng" algn="ctr">
+                      <a:solidFill>
+                        <a:schemeClr val="tx1"/>
+                      </a:solidFill>
+                      <a:prstDash val="solid"/>
+                      <a:round/>
+                      <a:headEnd type="none" w="med" len="med"/>
+                      <a:tailEnd type="none" w="med" len="med"/>
+                    </a:lnT>
+                    <a:lnB w="12700" cap="flat" cmpd="sng" algn="ctr">
+                      <a:solidFill>
+                        <a:schemeClr val="tx1"/>
+                      </a:solidFill>
+                      <a:prstDash val="solid"/>
+                      <a:round/>
+                      <a:headEnd type="none" w="med" len="med"/>
+                      <a:tailEnd type="none" w="med" len="med"/>
+                    </a:lnB>
+                  </a:tcPr>
+                </a:tc>
+                <a:tc>
+                  <a:txBody>
+                    <a:bodyPr/>
+                    <a:lstStyle/>
+                    <a:p>
+                      <a:r>
+                        <a:rPr lang="ru-RU" sz="1600" u="none" dirty="0" smtClean="0">
+                          <a:latin typeface="+mn-lt"/>
+                        </a:rPr>
+                        <a:t>Потоко-безопасная</a:t>
+                      </a:r>
+                      <a:r>
+                        <a:rPr lang="ru-RU" sz="1600" u="none" baseline="0" dirty="0" smtClean="0">
+                          <a:latin typeface="+mn-lt"/>
+                        </a:rPr>
+                        <a:t> </a:t>
+                      </a:r>
+                      <a:r>
+                        <a:rPr lang="en-US" sz="1600" u="none" baseline="0" dirty="0" smtClean="0">
+                          <a:latin typeface="+mn-lt"/>
+                        </a:rPr>
+                        <a:t>(thread-safe) </a:t>
+                      </a:r>
+                      <a:r>
+                        <a:rPr lang="ru-RU" sz="1600" u="none" baseline="0" dirty="0" smtClean="0">
+                          <a:latin typeface="+mn-lt"/>
+                        </a:rPr>
+                        <a:t>реализация неупорядоченной коллекции элементов</a:t>
+                      </a:r>
+                      <a:r>
+                        <a:rPr lang="en-US" sz="1600" u="none" dirty="0" smtClean="0">
+                          <a:latin typeface="+mn-lt"/>
+                        </a:rPr>
+                        <a:t>.</a:t>
+                      </a:r>
+                      <a:endParaRPr lang="en-US" sz="1600" u="none" dirty="0">
+                        <a:latin typeface="+mn-lt"/>
+                      </a:endParaRPr>
+                    </a:p>
+                  </a:txBody>
+                  <a:tcPr marL="82290" marR="82290" marT="41145" marB="41145" anchor="ctr">
+                    <a:lnL w="12700" cap="flat" cmpd="sng" algn="ctr">
+                      <a:solidFill>
+                        <a:schemeClr val="tx1"/>
+                      </a:solidFill>
+                      <a:prstDash val="solid"/>
+                      <a:round/>
+                      <a:headEnd type="none" w="med" len="med"/>
+                      <a:tailEnd type="none" w="med" len="med"/>
+                    </a:lnL>
+                    <a:lnR w="12700" cap="flat" cmpd="sng" algn="ctr">
+                      <a:solidFill>
+                        <a:schemeClr val="tx1"/>
+                      </a:solidFill>
+                      <a:prstDash val="solid"/>
+                      <a:round/>
+                      <a:headEnd type="none" w="med" len="med"/>
+                      <a:tailEnd type="none" w="med" len="med"/>
+                    </a:lnR>
+                    <a:lnT w="12700" cap="flat" cmpd="sng" algn="ctr">
+                      <a:solidFill>
+                        <a:schemeClr val="tx1"/>
+                      </a:solidFill>
+                      <a:prstDash val="solid"/>
+                      <a:round/>
+                      <a:headEnd type="none" w="med" len="med"/>
+                      <a:tailEnd type="none" w="med" len="med"/>
+                    </a:lnT>
+                    <a:lnB w="12700" cap="flat" cmpd="sng" algn="ctr">
+                      <a:solidFill>
+                        <a:schemeClr val="tx1"/>
+                      </a:solidFill>
+                      <a:prstDash val="solid"/>
+                      <a:round/>
+                      <a:headEnd type="none" w="med" len="med"/>
+                      <a:tailEnd type="none" w="med" len="med"/>
+                    </a:lnB>
+                  </a:tcPr>
+                </a:tc>
+              </a:tr>
+              <a:tr h="576032">
+                <a:tc>
+                  <a:txBody>
+                    <a:bodyPr/>
+                    <a:lstStyle/>
+                    <a:p>
+                      <a:r>
+                        <a:rPr lang="en-US" sz="1600" u="none" dirty="0">
+                          <a:latin typeface="+mn-lt"/>
+                        </a:rPr>
+                        <a:t>IProducerConsumerCollection&lt;T&gt; </a:t>
+                      </a:r>
+                    </a:p>
+                  </a:txBody>
+                  <a:tcPr marL="82290" marR="82290" marT="41145" marB="41145" anchor="ctr">
+                    <a:lnL w="12700" cap="flat" cmpd="sng" algn="ctr">
+                      <a:solidFill>
+                        <a:schemeClr val="tx1"/>
+                      </a:solidFill>
+                      <a:prstDash val="solid"/>
+                      <a:round/>
+                      <a:headEnd type="none" w="med" len="med"/>
+                      <a:tailEnd type="none" w="med" len="med"/>
+                    </a:lnL>
+                    <a:lnR w="12700" cap="flat" cmpd="sng" algn="ctr">
+                      <a:solidFill>
+                        <a:schemeClr val="tx1"/>
+                      </a:solidFill>
+                      <a:prstDash val="solid"/>
+                      <a:round/>
+                      <a:headEnd type="none" w="med" len="med"/>
+                      <a:tailEnd type="none" w="med" len="med"/>
+                    </a:lnR>
+                    <a:lnT w="12700" cap="flat" cmpd="sng" algn="ctr">
+                      <a:solidFill>
+                        <a:schemeClr val="tx1"/>
+                      </a:solidFill>
+                      <a:prstDash val="solid"/>
+                      <a:round/>
+                      <a:headEnd type="none" w="med" len="med"/>
+                      <a:tailEnd type="none" w="med" len="med"/>
+                    </a:lnT>
+                    <a:lnB w="12700" cap="flat" cmpd="sng" algn="ctr">
+                      <a:solidFill>
+                        <a:schemeClr val="tx1"/>
+                      </a:solidFill>
+                      <a:prstDash val="solid"/>
+                      <a:round/>
+                      <a:headEnd type="none" w="med" len="med"/>
+                      <a:tailEnd type="none" w="med" len="med"/>
+                    </a:lnB>
+                  </a:tcPr>
+                </a:tc>
+                <a:tc>
+                  <a:txBody>
+                    <a:bodyPr/>
+                    <a:lstStyle/>
+                    <a:p>
+                      <a:r>
+                        <a:rPr lang="ru-RU" sz="1600" u="none" dirty="0" smtClean="0">
+                          <a:latin typeface="+mn-lt"/>
+                        </a:rPr>
+                        <a:t>Интерфейс который</a:t>
+                      </a:r>
+                      <a:r>
+                        <a:rPr lang="ru-RU" sz="1600" u="none" baseline="0" dirty="0" smtClean="0">
+                          <a:latin typeface="+mn-lt"/>
+                        </a:rPr>
+                        <a:t> необходимо реализовать типу предназначенному для хранения в </a:t>
+                      </a:r>
+                      <a:r>
+                        <a:rPr lang="en-US" sz="1600" b="0" u="none" dirty="0" smtClean="0">
+                          <a:solidFill>
+                            <a:srgbClr val="00B050"/>
+                          </a:solidFill>
+                          <a:latin typeface="+mn-lt"/>
+                        </a:rPr>
+                        <a:t>BlockingCollection</a:t>
+                      </a:r>
+                      <a:r>
+                        <a:rPr lang="en-US" sz="1600" u="none" dirty="0">
+                          <a:latin typeface="+mn-lt"/>
+                        </a:rPr>
+                        <a:t>.</a:t>
+                      </a:r>
+                    </a:p>
+                  </a:txBody>
+                  <a:tcPr marL="82290" marR="82290" marT="41145" marB="41145" anchor="ctr">
+                    <a:lnL w="12700" cap="flat" cmpd="sng" algn="ctr">
+                      <a:solidFill>
+                        <a:schemeClr val="tx1"/>
+                      </a:solidFill>
+                      <a:prstDash val="solid"/>
+                      <a:round/>
+                      <a:headEnd type="none" w="med" len="med"/>
+                      <a:tailEnd type="none" w="med" len="med"/>
+                    </a:lnL>
+                    <a:lnR w="12700" cap="flat" cmpd="sng" algn="ctr">
+                      <a:solidFill>
+                        <a:schemeClr val="tx1"/>
+                      </a:solidFill>
+                      <a:prstDash val="solid"/>
+                      <a:round/>
+                      <a:headEnd type="none" w="med" len="med"/>
+                      <a:tailEnd type="none" w="med" len="med"/>
+                    </a:lnR>
+                    <a:lnT w="12700" cap="flat" cmpd="sng" algn="ctr">
+                      <a:solidFill>
+                        <a:schemeClr val="tx1"/>
+                      </a:solidFill>
+                      <a:prstDash val="solid"/>
+                      <a:round/>
+                      <a:headEnd type="none" w="med" len="med"/>
+                      <a:tailEnd type="none" w="med" len="med"/>
+                    </a:lnT>
+                    <a:lnB w="12700" cap="flat" cmpd="sng" algn="ctr">
+                      <a:solidFill>
+                        <a:schemeClr val="tx1"/>
+                      </a:solidFill>
+                      <a:prstDash val="solid"/>
+                      <a:round/>
+                      <a:headEnd type="none" w="med" len="med"/>
+                      <a:tailEnd type="none" w="med" len="med"/>
+                    </a:lnB>
+                  </a:tcPr>
+                </a:tc>
+              </a:tr>
+            </a:tbl>
+          </a:graphicData>
+        </a:graphic>
+      </p:graphicFrame>
+    </p:spTree>
+    <p:extLst>
+      <p:ext uri="{BB962C8B-B14F-4D97-AF65-F5344CB8AC3E}">
+        <p14:creationId xmlns:p14="http://schemas.microsoft.com/office/powerpoint/2010/main" val="829816238"/>
+      </p:ext>
+    </p:extLst>
+  </p:cSld>
+  <p:clrMapOvr>
+    <a:masterClrMapping/>
+  </p:clrMapOvr>
+  <p:timing>
+    <p:tnLst>
+      <p:par>
+        <p:cTn id="1" dur="indefinite" restart="never" nodeType="tmRoot"/>
+      </p:par>
+    </p:tnLst>
+  </p:timing>
+</p:sld>
+</file>
+
+<file path=ppt/slides/slide23.xml><?xml version="1.0" encoding="utf-8"?>
+<p:sld xmlns:a="http://schemas.openxmlformats.org/drawingml/2006/main" xmlns:r="http://schemas.openxmlformats.org/officeDocument/2006/relationships" xmlns:p="http://schemas.openxmlformats.org/presentationml/2006/main">
+  <p:cSld>
+    <p:spTree>
+      <p:nvGrpSpPr>
+        <p:cNvPr id="1" name=""/>
+        <p:cNvGrpSpPr/>
+        <p:nvPr/>
+      </p:nvGrpSpPr>
+      <p:grpSpPr>
+        <a:xfrm>
+          <a:off x="0" y="0"/>
+          <a:ext cx="0" cy="0"/>
+          <a:chOff x="0" y="0"/>
+          <a:chExt cx="0" cy="0"/>
+        </a:xfrm>
+      </p:grpSpPr>
+      <p:sp>
+        <p:nvSpPr>
+          <p:cNvPr id="2" name="TextBox 1"/>
+          <p:cNvSpPr txBox="1"/>
+          <p:nvPr/>
+        </p:nvSpPr>
+        <p:spPr>
+          <a:xfrm>
+            <a:off x="323528" y="764704"/>
+            <a:ext cx="8424936" cy="1938992"/>
+          </a:xfrm>
+          <a:prstGeom prst="rect">
+            <a:avLst/>
+          </a:prstGeom>
+          <a:noFill/>
+        </p:spPr>
+        <p:txBody>
+          <a:bodyPr wrap="square" rtlCol="0">
+            <a:spAutoFit/>
+          </a:bodyPr>
+          <a:lstStyle/>
+          <a:p>
+            <a:r>
+              <a:rPr lang="ru-RU" sz="2400" dirty="0" smtClean="0"/>
+              <a:t>Набор классов предназначенных для облегчения многопоточной программирования. Представлена в </a:t>
+            </a:r>
+            <a:r>
+              <a:rPr lang="en-US" sz="2400" dirty="0" smtClean="0"/>
+              <a:t>.NET 4. </a:t>
+            </a:r>
+            <a:r>
+              <a:rPr lang="ru-RU" sz="2400" dirty="0" smtClean="0"/>
+              <a:t>Пространство имен - </a:t>
+            </a:r>
+            <a:r>
+              <a:rPr lang="en-US" sz="2400" dirty="0" err="1" smtClean="0"/>
+              <a:t>System.Threading.Tasks</a:t>
+            </a:r>
+            <a:r>
+              <a:rPr lang="ru-RU" sz="2400" dirty="0" smtClean="0"/>
+              <a:t>.</a:t>
+            </a:r>
+          </a:p>
+          <a:p>
+            <a:endParaRPr lang="ru-RU" sz="2400" dirty="0"/>
+          </a:p>
+          <a:p>
+            <a:r>
+              <a:rPr lang="ru-RU" sz="2400" dirty="0" smtClean="0"/>
+              <a:t>Классы: </a:t>
+            </a:r>
+            <a:r>
+              <a:rPr lang="en-US" sz="2400" dirty="0" smtClean="0"/>
+              <a:t>Parallel, Task, </a:t>
+            </a:r>
+            <a:r>
+              <a:rPr lang="en-US" sz="2400" dirty="0" err="1" smtClean="0"/>
+              <a:t>TaskFactory</a:t>
+            </a:r>
+            <a:r>
+              <a:rPr lang="en-US" sz="2400" dirty="0" smtClean="0"/>
+              <a:t> </a:t>
+            </a:r>
+            <a:r>
+              <a:rPr lang="ru-RU" sz="2400" dirty="0" smtClean="0"/>
+              <a:t>и другие.</a:t>
+            </a:r>
+            <a:endParaRPr lang="en-US" sz="2400" dirty="0" smtClean="0"/>
+          </a:p>
+        </p:txBody>
+      </p:sp>
+      <p:sp>
+        <p:nvSpPr>
+          <p:cNvPr id="3" name="TextBox 2"/>
+          <p:cNvSpPr txBox="1"/>
+          <p:nvPr/>
+        </p:nvSpPr>
+        <p:spPr>
+          <a:xfrm>
+            <a:off x="251520" y="44624"/>
+            <a:ext cx="8568952" cy="584775"/>
+          </a:xfrm>
+          <a:prstGeom prst="rect">
+            <a:avLst/>
+          </a:prstGeom>
+          <a:noFill/>
+        </p:spPr>
+        <p:txBody>
+          <a:bodyPr wrap="square" rtlCol="0">
+            <a:spAutoFit/>
+          </a:bodyPr>
+          <a:lstStyle/>
+          <a:p>
+            <a:pPr algn="ctr"/>
+            <a:r>
+              <a:rPr lang="en-US" sz="3200" dirty="0" smtClean="0"/>
+              <a:t>Task Parallel Library (TPL)</a:t>
+            </a:r>
+            <a:endParaRPr lang="en-US" sz="3200" dirty="0" smtClean="0"/>
+          </a:p>
+        </p:txBody>
+      </p:sp>
+    </p:spTree>
+    <p:extLst>
+      <p:ext uri="{BB962C8B-B14F-4D97-AF65-F5344CB8AC3E}">
+        <p14:creationId xmlns:p14="http://schemas.microsoft.com/office/powerpoint/2010/main" val="3772773505"/>
+      </p:ext>
+    </p:extLst>
+  </p:cSld>
+  <p:clrMapOvr>
+    <a:masterClrMapping/>
+  </p:clrMapOvr>
+  <p:timing>
+    <p:tnLst>
+      <p:par>
+        <p:cTn id="1" dur="indefinite" restart="never" nodeType="tmRoot"/>
+      </p:par>
+    </p:tnLst>
+  </p:timing>
+</p:sld>
+</file>
+
+<file path=ppt/slides/slide24.xml><?xml version="1.0" encoding="utf-8"?>
+<p:sld xmlns:a="http://schemas.openxmlformats.org/drawingml/2006/main" xmlns:r="http://schemas.openxmlformats.org/officeDocument/2006/relationships" xmlns:p="http://schemas.openxmlformats.org/presentationml/2006/main">
+  <p:cSld>
+    <p:spTree>
+      <p:nvGrpSpPr>
+        <p:cNvPr id="1" name=""/>
+        <p:cNvGrpSpPr/>
+        <p:nvPr/>
+      </p:nvGrpSpPr>
+      <p:grpSpPr>
+        <a:xfrm>
+          <a:off x="0" y="0"/>
+          <a:ext cx="0" cy="0"/>
+          <a:chOff x="0" y="0"/>
+          <a:chExt cx="0" cy="0"/>
+        </a:xfrm>
+      </p:grpSpPr>
+      <p:sp>
+        <p:nvSpPr>
+          <p:cNvPr id="2" name="TextBox 1"/>
+          <p:cNvSpPr txBox="1"/>
+          <p:nvPr/>
+        </p:nvSpPr>
+        <p:spPr>
+          <a:xfrm>
+            <a:off x="323528" y="764704"/>
+            <a:ext cx="8424936" cy="1200329"/>
+          </a:xfrm>
+          <a:prstGeom prst="rect">
+            <a:avLst/>
+          </a:prstGeom>
+          <a:noFill/>
+        </p:spPr>
+        <p:txBody>
+          <a:bodyPr wrap="square" rtlCol="0">
+            <a:spAutoFit/>
+          </a:bodyPr>
+          <a:lstStyle/>
+          <a:p>
+            <a:r>
+              <a:rPr lang="en-US" sz="2400" dirty="0"/>
+              <a:t>v</a:t>
+            </a:r>
+            <a:r>
+              <a:rPr lang="en-US" sz="2400" dirty="0" smtClean="0"/>
+              <a:t>olatile</a:t>
+            </a:r>
+          </a:p>
+          <a:p>
+            <a:endParaRPr lang="en-US" sz="2400" dirty="0"/>
+          </a:p>
+          <a:p>
+            <a:r>
+              <a:rPr lang="en-US" sz="2400" dirty="0" err="1" smtClean="0"/>
+              <a:t>a</a:t>
+            </a:r>
+            <a:r>
+              <a:rPr lang="en-US" sz="2400" dirty="0" err="1" smtClean="0"/>
+              <a:t>sync</a:t>
+            </a:r>
+            <a:r>
+              <a:rPr lang="en-US" sz="2400" dirty="0" smtClean="0"/>
+              <a:t>/await - .NET 4.5</a:t>
+            </a:r>
+            <a:endParaRPr lang="en-US" sz="2400" dirty="0" smtClean="0"/>
+          </a:p>
+        </p:txBody>
+      </p:sp>
+      <p:sp>
+        <p:nvSpPr>
+          <p:cNvPr id="3" name="TextBox 2"/>
+          <p:cNvSpPr txBox="1"/>
+          <p:nvPr/>
+        </p:nvSpPr>
+        <p:spPr>
+          <a:xfrm>
+            <a:off x="251520" y="44624"/>
+            <a:ext cx="8568952" cy="584775"/>
+          </a:xfrm>
+          <a:prstGeom prst="rect">
+            <a:avLst/>
+          </a:prstGeom>
+          <a:noFill/>
+        </p:spPr>
+        <p:txBody>
+          <a:bodyPr wrap="square" rtlCol="0">
+            <a:spAutoFit/>
+          </a:bodyPr>
+          <a:lstStyle/>
+          <a:p>
+            <a:pPr algn="ctr"/>
+            <a:r>
+              <a:rPr lang="ru-RU" sz="3200" dirty="0" smtClean="0"/>
+              <a:t>Ключевые слова</a:t>
+            </a:r>
+            <a:endParaRPr lang="en-US" sz="3200" dirty="0" smtClean="0"/>
+          </a:p>
+        </p:txBody>
+      </p:sp>
+    </p:spTree>
+    <p:extLst>
+      <p:ext uri="{BB962C8B-B14F-4D97-AF65-F5344CB8AC3E}">
+        <p14:creationId xmlns:p14="http://schemas.microsoft.com/office/powerpoint/2010/main" val="2729432619"/>
+      </p:ext>
+    </p:extLst>
+  </p:cSld>
+  <p:clrMapOvr>
+    <a:masterClrMapping/>
+  </p:clrMapOvr>
+  <p:timing>
+    <p:tnLst>
+      <p:par>
+        <p:cTn id="1" dur="indefinite" restart="never" nodeType="tmRoot"/>
+      </p:par>
+    </p:tnLst>
+  </p:timing>
+</p:sld>
+</file>
+
+<file path=ppt/slides/slide25.xml><?xml version="1.0" encoding="utf-8"?>
 <p:sld xmlns:a="http://schemas.openxmlformats.org/drawingml/2006/main" xmlns:r="http://schemas.openxmlformats.org/officeDocument/2006/relationships" xmlns:p="http://schemas.openxmlformats.org/presentationml/2006/main">
   <p:cSld>
     <p:spTree>
@@ -11576,7 +14371,7 @@
     </p:spTree>
     <p:extLst>
       <p:ext uri="{BB962C8B-B14F-4D97-AF65-F5344CB8AC3E}">
-        <p14:creationId xmlns:p14="http://schemas.microsoft.com/office/powerpoint/2010/main" val="4075062194"/>
+        <p14:creationId xmlns:p14="http://schemas.microsoft.com/office/powerpoint/2010/main" val="3384782994"/>
       </p:ext>
     </p:extLst>
   </p:cSld>
@@ -13783,7 +16578,7 @@
         </p:nvSpPr>
         <p:spPr bwMode="auto">
           <a:xfrm>
-            <a:off x="152400" y="411163"/>
+            <a:off x="152400" y="798538"/>
             <a:ext cx="8839200" cy="830262"/>
           </a:xfrm>
           <a:prstGeom prst="rect">
@@ -13820,23 +16615,23 @@
           <a:lstStyle/>
           <a:p>
             <a:r>
-              <a:rPr lang="en-US" sz="1600"/>
+              <a:rPr lang="en-US" sz="1600" dirty="0"/>
               <a:t>	</a:t>
             </a:r>
             <a:r>
-              <a:rPr lang="ru-RU" sz="1600"/>
+              <a:rPr lang="ru-RU" sz="1600" dirty="0"/>
               <a:t>Особенность этого метода заключается в том, что при его вызове происходит генерация исключения </a:t>
             </a:r>
             <a:r>
-              <a:rPr lang="en-US" sz="1600"/>
+              <a:rPr lang="en-US" sz="1600" dirty="0" err="1"/>
               <a:t>ThreadAbortException</a:t>
             </a:r>
             <a:r>
-              <a:rPr lang="ru-RU" sz="1600"/>
+              <a:rPr lang="ru-RU" sz="1600" dirty="0"/>
               <a:t>, причем исключение генерируется в том потоке, для которого вызван метод </a:t>
             </a:r>
             <a:r>
-              <a:rPr lang="en-US" sz="1600"/>
+              <a:rPr lang="en-US" sz="1600" dirty="0"/>
               <a:t>Abort().</a:t>
             </a:r>
           </a:p>
@@ -13852,8 +16647,8 @@
         </p:nvSpPr>
         <p:spPr bwMode="auto">
           <a:xfrm>
-            <a:off x="152400" y="-4763"/>
-            <a:ext cx="8763000" cy="461963"/>
+            <a:off x="152400" y="44624"/>
+            <a:ext cx="8763000" cy="830997"/>
           </a:xfrm>
           <a:prstGeom prst="rect">
             <a:avLst/>
@@ -13890,18 +16685,49 @@
           <a:p>
             <a:pPr algn="ctr"/>
             <a:r>
-              <a:rPr lang="ru-RU" sz="2400" b="1"/>
+              <a:rPr lang="ru-RU" sz="2400" b="1" dirty="0"/>
               <a:t>Метод </a:t>
             </a:r>
             <a:r>
-              <a:rPr lang="en-US" sz="2400" b="1"/>
+              <a:rPr lang="en-US" sz="2400" b="1" dirty="0"/>
               <a:t>Abort()</a:t>
             </a:r>
             <a:r>
-              <a:rPr lang="ru-RU" sz="2400" b="1"/>
+              <a:rPr lang="ru-RU" sz="2400" b="1" dirty="0" smtClean="0"/>
               <a:t>.</a:t>
             </a:r>
-            <a:endParaRPr lang="en-US" sz="2400" b="1"/>
+          </a:p>
+          <a:p>
+            <a:pPr algn="ctr"/>
+            <a:r>
+              <a:rPr lang="ru-RU" sz="2400" dirty="0" smtClean="0">
+                <a:solidFill>
+                  <a:srgbClr val="FF0000"/>
+                </a:solidFill>
+              </a:rPr>
+              <a:t>(Внимание! </a:t>
+            </a:r>
+            <a:r>
+              <a:rPr lang="ru-RU" sz="2400" dirty="0" smtClean="0">
+                <a:solidFill>
+                  <a:srgbClr val="FF0000"/>
+                </a:solidFill>
+              </a:rPr>
+              <a:t>Опасный метод.</a:t>
+            </a:r>
+            <a:r>
+              <a:rPr lang="ru-RU" sz="2400" dirty="0" smtClean="0">
+                <a:solidFill>
+                  <a:srgbClr val="FF0000"/>
+                </a:solidFill>
+              </a:rPr>
+              <a:t>)</a:t>
+            </a:r>
+            <a:endParaRPr lang="en-US" sz="2400" dirty="0">
+              <a:solidFill>
+                <a:srgbClr val="FF0000"/>
+              </a:solidFill>
+            </a:endParaRPr>
           </a:p>
         </p:txBody>
       </p:sp>
@@ -13915,7 +16741,7 @@
         </p:nvSpPr>
         <p:spPr bwMode="auto">
           <a:xfrm>
-            <a:off x="152400" y="1295400"/>
+            <a:off x="152400" y="1674911"/>
             <a:ext cx="8839200" cy="3770313"/>
           </a:xfrm>
           <a:prstGeom prst="rect">
@@ -14520,7 +17346,7 @@
         </p:nvSpPr>
         <p:spPr bwMode="auto">
           <a:xfrm>
-            <a:off x="152400" y="5181600"/>
+            <a:off x="152400" y="5539134"/>
             <a:ext cx="8839200" cy="338138"/>
           </a:xfrm>
           <a:prstGeom prst="rect">
@@ -14557,20 +17383,24 @@
           <a:lstStyle/>
           <a:p>
             <a:r>
-              <a:rPr lang="ru-RU" sz="1600"/>
+              <a:rPr lang="ru-RU" sz="1600" dirty="0"/>
               <a:t>Для отмены команды </a:t>
             </a:r>
             <a:r>
-              <a:rPr lang="en-US" sz="1600"/>
+              <a:rPr lang="en-US" sz="1600" dirty="0"/>
               <a:t>Abort() </a:t>
             </a:r>
             <a:r>
-              <a:rPr lang="ru-RU" sz="1600"/>
+              <a:rPr lang="ru-RU" sz="1600" dirty="0"/>
               <a:t>можно воспользоваться методом </a:t>
             </a:r>
             <a:r>
-              <a:rPr lang="en-US" sz="1600"/>
-              <a:t>Thread.ResetAbort().</a:t>
+              <a:rPr lang="en-US" sz="1600" dirty="0" err="1"/>
+              <a:t>Thread.ResetAbort</a:t>
+            </a:r>
+            <a:r>
+              <a:rPr lang="en-US" sz="1600" dirty="0"/>
+              <a:t>().</a:t>
             </a:r>
           </a:p>
         </p:txBody>

</xml_diff>